<commit_message>
finish single file transmission from Android to PC
</commit_message>
<xml_diff>
--- a/idea.pptx
+++ b/idea.pptx
@@ -259,7 +259,7 @@
           <a:p>
             <a:fld id="{E285B31C-AA9C-4047-994F-30DECD687B70}" type="datetimeFigureOut">
               <a:rPr lang="zh-CN" altLang="en-US" smtClean="0"/>
-              <a:t>2019/11/18</a:t>
+              <a:t>2019/11/22</a:t>
             </a:fld>
             <a:endParaRPr lang="zh-CN" altLang="en-US"/>
           </a:p>
@@ -457,7 +457,7 @@
           <a:p>
             <a:fld id="{E285B31C-AA9C-4047-994F-30DECD687B70}" type="datetimeFigureOut">
               <a:rPr lang="zh-CN" altLang="en-US" smtClean="0"/>
-              <a:t>2019/11/18</a:t>
+              <a:t>2019/11/22</a:t>
             </a:fld>
             <a:endParaRPr lang="zh-CN" altLang="en-US"/>
           </a:p>
@@ -665,7 +665,7 @@
           <a:p>
             <a:fld id="{E285B31C-AA9C-4047-994F-30DECD687B70}" type="datetimeFigureOut">
               <a:rPr lang="zh-CN" altLang="en-US" smtClean="0"/>
-              <a:t>2019/11/18</a:t>
+              <a:t>2019/11/22</a:t>
             </a:fld>
             <a:endParaRPr lang="zh-CN" altLang="en-US"/>
           </a:p>
@@ -863,7 +863,7 @@
           <a:p>
             <a:fld id="{E285B31C-AA9C-4047-994F-30DECD687B70}" type="datetimeFigureOut">
               <a:rPr lang="zh-CN" altLang="en-US" smtClean="0"/>
-              <a:t>2019/11/18</a:t>
+              <a:t>2019/11/22</a:t>
             </a:fld>
             <a:endParaRPr lang="zh-CN" altLang="en-US"/>
           </a:p>
@@ -1138,7 +1138,7 @@
           <a:p>
             <a:fld id="{E285B31C-AA9C-4047-994F-30DECD687B70}" type="datetimeFigureOut">
               <a:rPr lang="zh-CN" altLang="en-US" smtClean="0"/>
-              <a:t>2019/11/18</a:t>
+              <a:t>2019/11/22</a:t>
             </a:fld>
             <a:endParaRPr lang="zh-CN" altLang="en-US"/>
           </a:p>
@@ -1403,7 +1403,7 @@
           <a:p>
             <a:fld id="{E285B31C-AA9C-4047-994F-30DECD687B70}" type="datetimeFigureOut">
               <a:rPr lang="zh-CN" altLang="en-US" smtClean="0"/>
-              <a:t>2019/11/18</a:t>
+              <a:t>2019/11/22</a:t>
             </a:fld>
             <a:endParaRPr lang="zh-CN" altLang="en-US"/>
           </a:p>
@@ -1815,7 +1815,7 @@
           <a:p>
             <a:fld id="{E285B31C-AA9C-4047-994F-30DECD687B70}" type="datetimeFigureOut">
               <a:rPr lang="zh-CN" altLang="en-US" smtClean="0"/>
-              <a:t>2019/11/18</a:t>
+              <a:t>2019/11/22</a:t>
             </a:fld>
             <a:endParaRPr lang="zh-CN" altLang="en-US"/>
           </a:p>
@@ -1956,7 +1956,7 @@
           <a:p>
             <a:fld id="{E285B31C-AA9C-4047-994F-30DECD687B70}" type="datetimeFigureOut">
               <a:rPr lang="zh-CN" altLang="en-US" smtClean="0"/>
-              <a:t>2019/11/18</a:t>
+              <a:t>2019/11/22</a:t>
             </a:fld>
             <a:endParaRPr lang="zh-CN" altLang="en-US"/>
           </a:p>
@@ -2069,7 +2069,7 @@
           <a:p>
             <a:fld id="{E285B31C-AA9C-4047-994F-30DECD687B70}" type="datetimeFigureOut">
               <a:rPr lang="zh-CN" altLang="en-US" smtClean="0"/>
-              <a:t>2019/11/18</a:t>
+              <a:t>2019/11/22</a:t>
             </a:fld>
             <a:endParaRPr lang="zh-CN" altLang="en-US"/>
           </a:p>
@@ -2380,7 +2380,7 @@
           <a:p>
             <a:fld id="{E285B31C-AA9C-4047-994F-30DECD687B70}" type="datetimeFigureOut">
               <a:rPr lang="zh-CN" altLang="en-US" smtClean="0"/>
-              <a:t>2019/11/18</a:t>
+              <a:t>2019/11/22</a:t>
             </a:fld>
             <a:endParaRPr lang="zh-CN" altLang="en-US"/>
           </a:p>
@@ -2668,7 +2668,7 @@
           <a:p>
             <a:fld id="{E285B31C-AA9C-4047-994F-30DECD687B70}" type="datetimeFigureOut">
               <a:rPr lang="zh-CN" altLang="en-US" smtClean="0"/>
-              <a:t>2019/11/18</a:t>
+              <a:t>2019/11/22</a:t>
             </a:fld>
             <a:endParaRPr lang="zh-CN" altLang="en-US"/>
           </a:p>
@@ -2909,7 +2909,7 @@
           <a:p>
             <a:fld id="{E285B31C-AA9C-4047-994F-30DECD687B70}" type="datetimeFigureOut">
               <a:rPr lang="zh-CN" altLang="en-US" smtClean="0"/>
-              <a:t>2019/11/18</a:t>
+              <a:t>2019/11/22</a:t>
             </a:fld>
             <a:endParaRPr lang="zh-CN" altLang="en-US"/>
           </a:p>
@@ -3340,7 +3340,7 @@
         </p:nvSpPr>
         <p:spPr>
           <a:xfrm>
-            <a:off x="616015" y="1097895"/>
+            <a:off x="179275" y="373948"/>
             <a:ext cx="927035" cy="305455"/>
           </a:xfrm>
           <a:prstGeom prst="rect">
@@ -3390,7 +3390,7 @@
         </p:nvSpPr>
         <p:spPr>
           <a:xfrm>
-            <a:off x="765207" y="1758950"/>
+            <a:off x="328468" y="1145632"/>
             <a:ext cx="628650" cy="285750"/>
           </a:xfrm>
           <a:prstGeom prst="rect">
@@ -3442,9 +3442,9 @@
           <p:nvPr/>
         </p:nvCxnSpPr>
         <p:spPr>
-          <a:xfrm flipH="1">
-            <a:off x="1079532" y="1403350"/>
-            <a:ext cx="1" cy="355600"/>
+          <a:xfrm>
+            <a:off x="642793" y="679403"/>
+            <a:ext cx="0" cy="466229"/>
           </a:xfrm>
           <a:prstGeom prst="straightConnector1">
             <a:avLst/>
@@ -3482,7 +3482,7 @@
         </p:nvSpPr>
         <p:spPr>
           <a:xfrm>
-            <a:off x="765207" y="5110277"/>
+            <a:off x="328468" y="5045494"/>
             <a:ext cx="628650" cy="285750"/>
           </a:xfrm>
           <a:prstGeom prst="rect">
@@ -3535,9 +3535,9 @@
           <p:nvPr/>
         </p:nvCxnSpPr>
         <p:spPr>
-          <a:xfrm>
-            <a:off x="1079532" y="2044700"/>
-            <a:ext cx="0" cy="1424989"/>
+          <a:xfrm flipH="1">
+            <a:off x="635190" y="1431382"/>
+            <a:ext cx="7603" cy="497100"/>
           </a:xfrm>
           <a:prstGeom prst="straightConnector1">
             <a:avLst/>
@@ -3575,8 +3575,8 @@
         </p:nvSpPr>
         <p:spPr>
           <a:xfrm>
-            <a:off x="1708150" y="2190750"/>
-            <a:ext cx="1187419" cy="584200"/>
+            <a:off x="1117555" y="993554"/>
+            <a:ext cx="1340690" cy="584200"/>
           </a:xfrm>
           <a:prstGeom prst="roundRect">
             <a:avLst/>
@@ -3612,137 +3612,27 @@
             <a:pPr algn="ctr"/>
             <a:r>
               <a:rPr lang="zh-CN" altLang="en-US" sz="1000" dirty="0"/>
-              <a:t>开启服务，监听广播，随时建立连接设备</a:t>
-            </a:r>
-          </a:p>
-        </p:txBody>
-      </p:sp>
-      <p:sp>
-        <p:nvSpPr>
-          <p:cNvPr id="13" name="文本框 12">
-            <a:extLst>
-              <a:ext uri="{FF2B5EF4-FFF2-40B4-BE49-F238E27FC236}">
-                <a16:creationId xmlns:a16="http://schemas.microsoft.com/office/drawing/2014/main" id="{DCE478BC-5129-40E8-AC39-A6CC51F27BF5}"/>
-              </a:ext>
-            </a:extLst>
-          </p:cNvPr>
-          <p:cNvSpPr txBox="1"/>
-          <p:nvPr/>
-        </p:nvSpPr>
-        <p:spPr>
-          <a:xfrm>
-            <a:off x="0" y="-1032"/>
-            <a:ext cx="4338047" cy="369332"/>
-          </a:xfrm>
-          <a:prstGeom prst="rect">
-            <a:avLst/>
-          </a:prstGeom>
-          <a:noFill/>
-        </p:spPr>
-        <p:txBody>
-          <a:bodyPr wrap="none" rtlCol="0">
-            <a:spAutoFit/>
-          </a:bodyPr>
-          <a:lstStyle/>
-          <a:p>
-            <a:r>
-              <a:rPr lang="en-US" altLang="zh-CN" dirty="0"/>
-              <a:t>Step 1</a:t>
-            </a:r>
-            <a:r>
-              <a:rPr lang="zh-CN" altLang="en-US" dirty="0"/>
-              <a:t>： 最简单的功能（必须做出来的）</a:t>
-            </a:r>
-          </a:p>
-        </p:txBody>
-      </p:sp>
-      <p:cxnSp>
-        <p:nvCxnSpPr>
-          <p:cNvPr id="15" name="连接符: 肘形 14">
-            <a:extLst>
-              <a:ext uri="{FF2B5EF4-FFF2-40B4-BE49-F238E27FC236}">
-                <a16:creationId xmlns:a16="http://schemas.microsoft.com/office/drawing/2014/main" id="{E03C0AA4-D621-4FDC-83BE-0A89B6D73EEA}"/>
-              </a:ext>
-            </a:extLst>
-          </p:cNvPr>
-          <p:cNvCxnSpPr>
-            <a:stCxn id="5" idx="3"/>
-            <a:endCxn id="12" idx="0"/>
-          </p:cNvCxnSpPr>
-          <p:nvPr/>
-        </p:nvCxnSpPr>
-        <p:spPr>
-          <a:xfrm>
-            <a:off x="1393857" y="1901825"/>
-            <a:ext cx="908003" cy="288925"/>
-          </a:xfrm>
-          <a:prstGeom prst="bentConnector2">
-            <a:avLst/>
-          </a:prstGeom>
-          <a:ln>
-            <a:tailEnd type="triangle"/>
-          </a:ln>
-        </p:spPr>
-        <p:style>
-          <a:lnRef idx="1">
-            <a:schemeClr val="accent1"/>
-          </a:lnRef>
-          <a:fillRef idx="0">
-            <a:schemeClr val="accent1"/>
-          </a:fillRef>
-          <a:effectRef idx="0">
-            <a:schemeClr val="accent1"/>
-          </a:effectRef>
-          <a:fontRef idx="minor">
-            <a:schemeClr val="tx1"/>
-          </a:fontRef>
-        </p:style>
-      </p:cxnSp>
-      <p:cxnSp>
-        <p:nvCxnSpPr>
-          <p:cNvPr id="17" name="连接符: 肘形 16">
-            <a:extLst>
-              <a:ext uri="{FF2B5EF4-FFF2-40B4-BE49-F238E27FC236}">
-                <a16:creationId xmlns:a16="http://schemas.microsoft.com/office/drawing/2014/main" id="{C499B4B9-8A73-4DFD-871C-F96E1984999D}"/>
-              </a:ext>
-            </a:extLst>
-          </p:cNvPr>
-          <p:cNvCxnSpPr>
-            <a:stCxn id="12" idx="2"/>
-            <a:endCxn id="12" idx="1"/>
-          </p:cNvCxnSpPr>
-          <p:nvPr/>
-        </p:nvCxnSpPr>
-        <p:spPr>
-          <a:xfrm rot="5400000" flipH="1">
-            <a:off x="1858955" y="2332045"/>
-            <a:ext cx="292100" cy="593710"/>
-          </a:xfrm>
-          <a:prstGeom prst="bentConnector4">
-            <a:avLst>
-              <a:gd name="adj1" fmla="val -78261"/>
-              <a:gd name="adj2" fmla="val 138504"/>
-            </a:avLst>
-          </a:prstGeom>
-          <a:ln>
-            <a:tailEnd type="triangle"/>
-          </a:ln>
-        </p:spPr>
-        <p:style>
-          <a:lnRef idx="1">
-            <a:schemeClr val="accent1"/>
-          </a:lnRef>
-          <a:fillRef idx="0">
-            <a:schemeClr val="accent1"/>
-          </a:fillRef>
-          <a:effectRef idx="0">
-            <a:schemeClr val="accent1"/>
-          </a:effectRef>
-          <a:fontRef idx="minor">
-            <a:schemeClr val="tx1"/>
-          </a:fontRef>
-        </p:style>
-      </p:cxnSp>
+              <a:t>开启服务，定时使用</a:t>
+            </a:r>
+            <a:r>
+              <a:rPr lang="en-US" altLang="zh-CN" sz="1000" dirty="0"/>
+              <a:t>UDP</a:t>
+            </a:r>
+            <a:r>
+              <a:rPr lang="zh-CN" altLang="en-US" sz="1000" dirty="0"/>
+              <a:t>广播本机</a:t>
+            </a:r>
+            <a:r>
+              <a:rPr lang="en-US" altLang="zh-CN" sz="1000" dirty="0"/>
+              <a:t>IP</a:t>
+            </a:r>
+            <a:r>
+              <a:rPr lang="zh-CN" altLang="en-US" sz="1000" dirty="0"/>
+              <a:t>和端口</a:t>
+            </a:r>
+          </a:p>
+        </p:txBody>
+      </p:sp>
       <p:sp>
         <p:nvSpPr>
           <p:cNvPr id="18" name="矩形: 圆角 17">
@@ -3757,7 +3647,7 @@
         </p:nvSpPr>
         <p:spPr>
           <a:xfrm>
-            <a:off x="4528924" y="2029299"/>
+            <a:off x="3826482" y="1864334"/>
             <a:ext cx="1187419" cy="369332"/>
           </a:xfrm>
           <a:prstGeom prst="roundRect">
@@ -3807,53 +3697,6 @@
           </a:p>
         </p:txBody>
       </p:sp>
-      <p:cxnSp>
-        <p:nvCxnSpPr>
-          <p:cNvPr id="20" name="连接符: 肘形 19">
-            <a:extLst>
-              <a:ext uri="{FF2B5EF4-FFF2-40B4-BE49-F238E27FC236}">
-                <a16:creationId xmlns:a16="http://schemas.microsoft.com/office/drawing/2014/main" id="{3B096180-7E23-4053-AA30-8042EF7243A7}"/>
-              </a:ext>
-            </a:extLst>
-          </p:cNvPr>
-          <p:cNvCxnSpPr>
-            <a:cxnSpLocks/>
-            <a:stCxn id="103" idx="2"/>
-            <a:endCxn id="18" idx="0"/>
-          </p:cNvCxnSpPr>
-          <p:nvPr/>
-        </p:nvCxnSpPr>
-        <p:spPr>
-          <a:xfrm rot="5400000" flipH="1" flipV="1">
-            <a:off x="2238013" y="870818"/>
-            <a:ext cx="1726140" cy="4043102"/>
-          </a:xfrm>
-          <a:prstGeom prst="bentConnector5">
-            <a:avLst>
-              <a:gd name="adj1" fmla="val -13243"/>
-              <a:gd name="adj2" fmla="val 50000"/>
-              <a:gd name="adj3" fmla="val 113243"/>
-            </a:avLst>
-          </a:prstGeom>
-          <a:ln>
-            <a:tailEnd type="triangle"/>
-          </a:ln>
-        </p:spPr>
-        <p:style>
-          <a:lnRef idx="1">
-            <a:schemeClr val="accent1"/>
-          </a:lnRef>
-          <a:fillRef idx="0">
-            <a:schemeClr val="accent1"/>
-          </a:fillRef>
-          <a:effectRef idx="0">
-            <a:schemeClr val="accent1"/>
-          </a:effectRef>
-          <a:fontRef idx="minor">
-            <a:schemeClr val="tx1"/>
-          </a:fontRef>
-        </p:style>
-      </p:cxnSp>
       <p:cxnSp>
         <p:nvCxnSpPr>
           <p:cNvPr id="22" name="连接符: 肘形 21">
@@ -3872,7 +3715,7 @@
         </p:nvCxnSpPr>
         <p:spPr>
           <a:xfrm rot="5400000" flipH="1">
-            <a:off x="4733446" y="2009443"/>
+            <a:off x="4031004" y="1844478"/>
             <a:ext cx="184666" cy="593710"/>
           </a:xfrm>
           <a:prstGeom prst="bentConnector4">
@@ -3914,7 +3757,7 @@
         </p:nvSpPr>
         <p:spPr>
           <a:xfrm>
-            <a:off x="1940422" y="1317625"/>
+            <a:off x="1592318" y="0"/>
             <a:ext cx="1088527" cy="285750"/>
           </a:xfrm>
           <a:prstGeom prst="rect">
@@ -3970,12 +3813,15 @@
           <p:nvPr/>
         </p:nvCxnSpPr>
         <p:spPr>
-          <a:xfrm rot="16200000" flipH="1">
-            <a:off x="1481402" y="1001480"/>
-            <a:ext cx="57150" cy="860889"/>
-          </a:xfrm>
-          <a:prstGeom prst="bentConnector2">
-            <a:avLst/>
+          <a:xfrm rot="5400000" flipH="1" flipV="1">
+            <a:off x="849291" y="-63624"/>
+            <a:ext cx="536528" cy="949525"/>
+          </a:xfrm>
+          <a:prstGeom prst="bentConnector4">
+            <a:avLst>
+              <a:gd name="adj1" fmla="val -42607"/>
+              <a:gd name="adj2" fmla="val 74408"/>
+            </a:avLst>
           </a:prstGeom>
           <a:ln>
             <a:tailEnd type="triangle"/>
@@ -4010,7 +3856,7 @@
         </p:nvSpPr>
         <p:spPr>
           <a:xfrm>
-            <a:off x="60413" y="404295"/>
+            <a:off x="0" y="848"/>
             <a:ext cx="1111202" cy="369332"/>
           </a:xfrm>
           <a:prstGeom prst="rect">
@@ -4045,7 +3891,7 @@
         </p:nvSpPr>
         <p:spPr>
           <a:xfrm>
-            <a:off x="4330483" y="3368850"/>
+            <a:off x="3628041" y="3203885"/>
             <a:ext cx="774797" cy="369332"/>
           </a:xfrm>
           <a:prstGeom prst="roundRect">
@@ -4101,7 +3947,7 @@
         </p:nvSpPr>
         <p:spPr>
           <a:xfrm>
-            <a:off x="4592283" y="2785682"/>
+            <a:off x="3889841" y="2620717"/>
             <a:ext cx="1088527" cy="285750"/>
           </a:xfrm>
           <a:prstGeom prst="rect">
@@ -4150,7 +3996,7 @@
         </p:nvSpPr>
         <p:spPr>
           <a:xfrm>
-            <a:off x="5212698" y="3368850"/>
+            <a:off x="4510256" y="3203885"/>
             <a:ext cx="774797" cy="369332"/>
           </a:xfrm>
           <a:prstGeom prst="roundRect">
@@ -4206,7 +4052,7 @@
         </p:nvSpPr>
         <p:spPr>
           <a:xfrm>
-            <a:off x="6101618" y="3368850"/>
+            <a:off x="5399176" y="3203885"/>
             <a:ext cx="774797" cy="369332"/>
           </a:xfrm>
           <a:prstGeom prst="roundRect">
@@ -4262,7 +4108,7 @@
         </p:nvSpPr>
         <p:spPr>
           <a:xfrm>
-            <a:off x="3209862" y="3368850"/>
+            <a:off x="2507420" y="3203885"/>
             <a:ext cx="1006498" cy="369332"/>
           </a:xfrm>
           <a:prstGeom prst="roundRect">
@@ -4321,7 +4167,7 @@
         </p:nvCxnSpPr>
         <p:spPr>
           <a:xfrm>
-            <a:off x="5122634" y="2398631"/>
+            <a:off x="4420192" y="2233666"/>
             <a:ext cx="13913" cy="387051"/>
           </a:xfrm>
           <a:prstGeom prst="straightConnector1">
@@ -4364,7 +4210,7 @@
         </p:nvCxnSpPr>
         <p:spPr>
           <a:xfrm rot="5400000">
-            <a:off x="4276120" y="2508423"/>
+            <a:off x="3573678" y="2343458"/>
             <a:ext cx="297418" cy="1423436"/>
           </a:xfrm>
           <a:prstGeom prst="bentConnector3">
@@ -4406,7 +4252,7 @@
         </p:nvCxnSpPr>
         <p:spPr>
           <a:xfrm rot="5400000">
-            <a:off x="4778506" y="3010809"/>
+            <a:off x="4076064" y="2845844"/>
             <a:ext cx="297418" cy="418665"/>
           </a:xfrm>
           <a:prstGeom prst="bentConnector3">
@@ -4448,7 +4294,7 @@
         </p:nvCxnSpPr>
         <p:spPr>
           <a:xfrm rot="16200000" flipH="1">
-            <a:off x="5219613" y="2988366"/>
+            <a:off x="4517171" y="2823401"/>
             <a:ext cx="297418" cy="463550"/>
           </a:xfrm>
           <a:prstGeom prst="bentConnector3">
@@ -4490,7 +4336,7 @@
         </p:nvCxnSpPr>
         <p:spPr>
           <a:xfrm rot="16200000" flipH="1">
-            <a:off x="5664073" y="2543906"/>
+            <a:off x="4961631" y="2378941"/>
             <a:ext cx="297418" cy="1352470"/>
           </a:xfrm>
           <a:prstGeom prst="bentConnector3">
@@ -4792,14 +4638,14 @@
           <p:cNvCxnSpPr>
             <a:cxnSpLocks/>
             <a:stCxn id="60" idx="2"/>
-            <a:endCxn id="97" idx="0"/>
+            <a:endCxn id="61" idx="0"/>
           </p:cNvCxnSpPr>
           <p:nvPr/>
         </p:nvCxnSpPr>
         <p:spPr>
-          <a:xfrm flipH="1">
-            <a:off x="11575984" y="1290865"/>
-            <a:ext cx="1" cy="2779965"/>
+          <a:xfrm>
+            <a:off x="11575985" y="1290865"/>
+            <a:ext cx="10259" cy="4858859"/>
           </a:xfrm>
           <a:prstGeom prst="straightConnector1">
             <a:avLst/>
@@ -4865,12 +4711,55 @@
           </a:fontRef>
         </p:style>
       </p:cxnSp>
-      <p:sp>
-        <p:nvSpPr>
-          <p:cNvPr id="66" name="矩形: 圆角 65">
-            <a:extLst>
-              <a:ext uri="{FF2B5EF4-FFF2-40B4-BE49-F238E27FC236}">
-                <a16:creationId xmlns:a16="http://schemas.microsoft.com/office/drawing/2014/main" id="{62015108-F4FB-426D-B55D-511B65193887}"/>
+      <p:cxnSp>
+        <p:nvCxnSpPr>
+          <p:cNvPr id="68" name="连接符: 肘形 67">
+            <a:extLst>
+              <a:ext uri="{FF2B5EF4-FFF2-40B4-BE49-F238E27FC236}">
+                <a16:creationId xmlns:a16="http://schemas.microsoft.com/office/drawing/2014/main" id="{779B442C-CBD9-4086-A1DE-F7D332417D6E}"/>
+              </a:ext>
+            </a:extLst>
+          </p:cNvPr>
+          <p:cNvCxnSpPr>
+            <a:cxnSpLocks/>
+            <a:stCxn id="60" idx="1"/>
+            <a:endCxn id="120" idx="0"/>
+          </p:cNvCxnSpPr>
+          <p:nvPr/>
+        </p:nvCxnSpPr>
+        <p:spPr>
+          <a:xfrm rot="10800000" flipV="1">
+            <a:off x="9745402" y="1147990"/>
+            <a:ext cx="1516259" cy="386904"/>
+          </a:xfrm>
+          <a:prstGeom prst="bentConnector2">
+            <a:avLst/>
+          </a:prstGeom>
+          <a:ln>
+            <a:tailEnd type="triangle"/>
+          </a:ln>
+        </p:spPr>
+        <p:style>
+          <a:lnRef idx="1">
+            <a:schemeClr val="accent1"/>
+          </a:lnRef>
+          <a:fillRef idx="0">
+            <a:schemeClr val="accent1"/>
+          </a:fillRef>
+          <a:effectRef idx="0">
+            <a:schemeClr val="accent1"/>
+          </a:effectRef>
+          <a:fontRef idx="minor">
+            <a:schemeClr val="tx1"/>
+          </a:fontRef>
+        </p:style>
+      </p:cxnSp>
+      <p:sp>
+        <p:nvSpPr>
+          <p:cNvPr id="81" name="矩形 80">
+            <a:extLst>
+              <a:ext uri="{FF2B5EF4-FFF2-40B4-BE49-F238E27FC236}">
+                <a16:creationId xmlns:a16="http://schemas.microsoft.com/office/drawing/2014/main" id="{89884B19-DBB6-4E5F-BD89-745476FECF0E}"/>
               </a:ext>
             </a:extLst>
           </p:cNvPr>
@@ -4879,10 +4768,10 @@
         </p:nvSpPr>
         <p:spPr>
           <a:xfrm>
-            <a:off x="9093614" y="1519738"/>
-            <a:ext cx="1187419" cy="396359"/>
-          </a:xfrm>
-          <a:prstGeom prst="roundRect">
+            <a:off x="7743107" y="0"/>
+            <a:ext cx="1088527" cy="285750"/>
+          </a:xfrm>
+          <a:prstGeom prst="rect">
             <a:avLst/>
           </a:prstGeom>
           <a:solidFill>
@@ -4913,113 +4802,80 @@
           <a:p>
             <a:pPr algn="ctr"/>
             <a:r>
+              <a:rPr lang="zh-CN" altLang="en-US" sz="1000" dirty="0"/>
+              <a:t>与</a:t>
+            </a:r>
+            <a:r>
               <a:rPr lang="en-US" altLang="zh-CN" sz="1000" dirty="0"/>
-              <a:t>Thread1: </a:t>
-            </a:r>
-          </a:p>
+              <a:t>Server</a:t>
+            </a:r>
+            <a:r>
+              <a:rPr lang="zh-CN" altLang="en-US" sz="1000" dirty="0"/>
+              <a:t>配对</a:t>
+            </a:r>
+          </a:p>
+        </p:txBody>
+      </p:sp>
+      <p:sp>
+        <p:nvSpPr>
+          <p:cNvPr id="85" name="矩形 84">
+            <a:extLst>
+              <a:ext uri="{FF2B5EF4-FFF2-40B4-BE49-F238E27FC236}">
+                <a16:creationId xmlns:a16="http://schemas.microsoft.com/office/drawing/2014/main" id="{0C2C9C86-4287-4D9E-B14F-AD84A2C9E002}"/>
+              </a:ext>
+            </a:extLst>
+          </p:cNvPr>
+          <p:cNvSpPr/>
+          <p:nvPr/>
+        </p:nvSpPr>
+        <p:spPr>
+          <a:xfrm>
+            <a:off x="3225108" y="-1"/>
+            <a:ext cx="1088527" cy="285750"/>
+          </a:xfrm>
+          <a:prstGeom prst="rect">
+            <a:avLst/>
+          </a:prstGeom>
+        </p:spPr>
+        <p:style>
+          <a:lnRef idx="2">
+            <a:schemeClr val="accent1">
+              <a:shade val="50000"/>
+            </a:schemeClr>
+          </a:lnRef>
+          <a:fillRef idx="1">
+            <a:schemeClr val="accent1"/>
+          </a:fillRef>
+          <a:effectRef idx="0">
+            <a:schemeClr val="accent1"/>
+          </a:effectRef>
+          <a:fontRef idx="minor">
+            <a:schemeClr val="lt1"/>
+          </a:fontRef>
+        </p:style>
+        <p:txBody>
+          <a:bodyPr rtlCol="0" anchor="ctr"/>
+          <a:lstStyle/>
           <a:p>
             <a:pPr algn="ctr"/>
             <a:r>
               <a:rPr lang="zh-CN" altLang="en-US" sz="1000" dirty="0"/>
-              <a:t>监听局域网状态</a:t>
-            </a:r>
-          </a:p>
-        </p:txBody>
-      </p:sp>
-      <p:cxnSp>
-        <p:nvCxnSpPr>
-          <p:cNvPr id="68" name="连接符: 肘形 67">
-            <a:extLst>
-              <a:ext uri="{FF2B5EF4-FFF2-40B4-BE49-F238E27FC236}">
-                <a16:creationId xmlns:a16="http://schemas.microsoft.com/office/drawing/2014/main" id="{779B442C-CBD9-4086-A1DE-F7D332417D6E}"/>
-              </a:ext>
-            </a:extLst>
-          </p:cNvPr>
-          <p:cNvCxnSpPr>
-            <a:cxnSpLocks/>
-            <a:stCxn id="60" idx="1"/>
-            <a:endCxn id="66" idx="0"/>
-          </p:cNvCxnSpPr>
-          <p:nvPr/>
-        </p:nvCxnSpPr>
-        <p:spPr>
-          <a:xfrm rot="10800000" flipV="1">
-            <a:off x="9687324" y="1147990"/>
-            <a:ext cx="1574336" cy="371748"/>
-          </a:xfrm>
-          <a:prstGeom prst="bentConnector2">
-            <a:avLst/>
-          </a:prstGeom>
-          <a:ln>
-            <a:tailEnd type="triangle"/>
-          </a:ln>
-        </p:spPr>
-        <p:style>
-          <a:lnRef idx="1">
-            <a:schemeClr val="accent1"/>
-          </a:lnRef>
-          <a:fillRef idx="0">
-            <a:schemeClr val="accent1"/>
-          </a:fillRef>
-          <a:effectRef idx="0">
-            <a:schemeClr val="accent1"/>
-          </a:effectRef>
-          <a:fontRef idx="minor">
-            <a:schemeClr val="tx1"/>
-          </a:fontRef>
-        </p:style>
-      </p:cxnSp>
-      <p:cxnSp>
-        <p:nvCxnSpPr>
-          <p:cNvPr id="73" name="连接符: 肘形 72">
-            <a:extLst>
-              <a:ext uri="{FF2B5EF4-FFF2-40B4-BE49-F238E27FC236}">
-                <a16:creationId xmlns:a16="http://schemas.microsoft.com/office/drawing/2014/main" id="{80842B03-47DE-445B-B62A-B8FFE9DC5C5D}"/>
-              </a:ext>
-            </a:extLst>
-          </p:cNvPr>
-          <p:cNvCxnSpPr>
-            <a:stCxn id="66" idx="2"/>
-            <a:endCxn id="66" idx="1"/>
-          </p:cNvCxnSpPr>
-          <p:nvPr/>
-        </p:nvCxnSpPr>
-        <p:spPr>
-          <a:xfrm rot="5400000" flipH="1">
-            <a:off x="9291379" y="1520153"/>
-            <a:ext cx="198179" cy="593710"/>
-          </a:xfrm>
-          <a:prstGeom prst="bentConnector4">
-            <a:avLst>
-              <a:gd name="adj1" fmla="val -115350"/>
-              <a:gd name="adj2" fmla="val 138504"/>
-            </a:avLst>
-          </a:prstGeom>
-          <a:ln>
-            <a:tailEnd type="triangle"/>
-          </a:ln>
-        </p:spPr>
-        <p:style>
-          <a:lnRef idx="1">
-            <a:schemeClr val="accent1"/>
-          </a:lnRef>
-          <a:fillRef idx="0">
-            <a:schemeClr val="accent1"/>
-          </a:fillRef>
-          <a:effectRef idx="0">
-            <a:schemeClr val="accent1"/>
-          </a:effectRef>
-          <a:fontRef idx="minor">
-            <a:schemeClr val="tx1"/>
-          </a:fontRef>
-        </p:style>
-      </p:cxnSp>
-      <p:sp>
-        <p:nvSpPr>
-          <p:cNvPr id="74" name="矩形 73">
-            <a:extLst>
-              <a:ext uri="{FF2B5EF4-FFF2-40B4-BE49-F238E27FC236}">
-                <a16:creationId xmlns:a16="http://schemas.microsoft.com/office/drawing/2014/main" id="{9BA7D245-50FE-477F-AA86-4A3B94513041}"/>
+              <a:t>注册新的</a:t>
+            </a:r>
+            <a:r>
+              <a:rPr lang="en-US" altLang="zh-CN" sz="1000" dirty="0"/>
+              <a:t>Client</a:t>
+            </a:r>
+            <a:endParaRPr lang="zh-CN" altLang="en-US" sz="1000" dirty="0"/>
+          </a:p>
+        </p:txBody>
+      </p:sp>
+      <p:sp>
+        <p:nvSpPr>
+          <p:cNvPr id="92" name="矩形 91">
+            <a:extLst>
+              <a:ext uri="{FF2B5EF4-FFF2-40B4-BE49-F238E27FC236}">
+                <a16:creationId xmlns:a16="http://schemas.microsoft.com/office/drawing/2014/main" id="{3DE96E19-06EC-49CE-9B43-493077F5A26F}"/>
               </a:ext>
             </a:extLst>
           </p:cNvPr>
@@ -5028,8 +4884,8 @@
         </p:nvSpPr>
         <p:spPr>
           <a:xfrm>
-            <a:off x="9319391" y="2351573"/>
-            <a:ext cx="735864" cy="285750"/>
+            <a:off x="9176423" y="3329611"/>
+            <a:ext cx="1187416" cy="285750"/>
           </a:xfrm>
           <a:prstGeom prst="rect">
             <a:avLst/>
@@ -5063,60 +4919,30 @@
             <a:pPr algn="ctr"/>
             <a:r>
               <a:rPr lang="zh-CN" altLang="en-US" sz="1000" dirty="0"/>
-              <a:t>接入网络</a:t>
-            </a:r>
-          </a:p>
-        </p:txBody>
-      </p:sp>
-      <p:cxnSp>
-        <p:nvCxnSpPr>
-          <p:cNvPr id="76" name="直接箭头连接符 75">
-            <a:extLst>
-              <a:ext uri="{FF2B5EF4-FFF2-40B4-BE49-F238E27FC236}">
-                <a16:creationId xmlns:a16="http://schemas.microsoft.com/office/drawing/2014/main" id="{55A8D19E-A83D-497E-8BEA-39834C3461EB}"/>
-              </a:ext>
-            </a:extLst>
-          </p:cNvPr>
-          <p:cNvCxnSpPr>
-            <a:cxnSpLocks/>
-            <a:stCxn id="66" idx="2"/>
-            <a:endCxn id="74" idx="0"/>
-          </p:cNvCxnSpPr>
-          <p:nvPr/>
-        </p:nvCxnSpPr>
-        <p:spPr>
-          <a:xfrm flipH="1">
-            <a:off x="9687323" y="1916097"/>
-            <a:ext cx="1" cy="435476"/>
-          </a:xfrm>
-          <a:prstGeom prst="straightConnector1">
-            <a:avLst/>
-          </a:prstGeom>
-          <a:ln>
-            <a:tailEnd type="triangle"/>
-          </a:ln>
-        </p:spPr>
-        <p:style>
-          <a:lnRef idx="1">
-            <a:schemeClr val="accent1"/>
-          </a:lnRef>
-          <a:fillRef idx="0">
-            <a:schemeClr val="accent1"/>
-          </a:fillRef>
-          <a:effectRef idx="0">
-            <a:schemeClr val="accent1"/>
-          </a:effectRef>
-          <a:fontRef idx="minor">
-            <a:schemeClr val="tx1"/>
-          </a:fontRef>
-        </p:style>
-      </p:cxnSp>
-      <p:sp>
-        <p:nvSpPr>
-          <p:cNvPr id="80" name="矩形 79">
-            <a:extLst>
-              <a:ext uri="{FF2B5EF4-FFF2-40B4-BE49-F238E27FC236}">
-                <a16:creationId xmlns:a16="http://schemas.microsoft.com/office/drawing/2014/main" id="{5F81C3CC-563F-4246-8F8E-6542C0482EB4}"/>
+              <a:t>收到</a:t>
+            </a:r>
+            <a:r>
+              <a:rPr lang="en-US" altLang="zh-CN" sz="1000" dirty="0"/>
+              <a:t>Server</a:t>
+            </a:r>
+            <a:r>
+              <a:rPr lang="zh-CN" altLang="en-US" sz="1000" dirty="0"/>
+              <a:t>广播</a:t>
+            </a:r>
+            <a:r>
+              <a:rPr lang="en-US" altLang="zh-CN" sz="1000" dirty="0"/>
+              <a:t>?</a:t>
+            </a:r>
+            <a:endParaRPr lang="zh-CN" altLang="en-US" sz="1000" dirty="0"/>
+          </a:p>
+        </p:txBody>
+      </p:sp>
+      <p:sp>
+        <p:nvSpPr>
+          <p:cNvPr id="103" name="矩形 102">
+            <a:extLst>
+              <a:ext uri="{FF2B5EF4-FFF2-40B4-BE49-F238E27FC236}">
+                <a16:creationId xmlns:a16="http://schemas.microsoft.com/office/drawing/2014/main" id="{A1473793-4503-4C1D-8E25-4A106AC0EF71}"/>
               </a:ext>
             </a:extLst>
           </p:cNvPr>
@@ -5125,8 +4951,57 @@
         </p:nvSpPr>
         <p:spPr>
           <a:xfrm>
-            <a:off x="9206504" y="2929923"/>
-            <a:ext cx="961637" cy="285750"/>
+            <a:off x="41482" y="1928482"/>
+            <a:ext cx="1187416" cy="285750"/>
+          </a:xfrm>
+          <a:prstGeom prst="rect">
+            <a:avLst/>
+          </a:prstGeom>
+        </p:spPr>
+        <p:style>
+          <a:lnRef idx="2">
+            <a:schemeClr val="accent1">
+              <a:shade val="50000"/>
+            </a:schemeClr>
+          </a:lnRef>
+          <a:fillRef idx="1">
+            <a:schemeClr val="accent1"/>
+          </a:fillRef>
+          <a:effectRef idx="0">
+            <a:schemeClr val="accent1"/>
+          </a:effectRef>
+          <a:fontRef idx="minor">
+            <a:schemeClr val="lt1"/>
+          </a:fontRef>
+        </p:style>
+        <p:txBody>
+          <a:bodyPr rtlCol="0" anchor="ctr"/>
+          <a:lstStyle/>
+          <a:p>
+            <a:pPr algn="ctr"/>
+            <a:r>
+              <a:rPr lang="zh-CN" altLang="en-US" sz="1000" dirty="0"/>
+              <a:t>开启服务</a:t>
+            </a:r>
+          </a:p>
+        </p:txBody>
+      </p:sp>
+      <p:sp>
+        <p:nvSpPr>
+          <p:cNvPr id="131" name="矩形 130">
+            <a:extLst>
+              <a:ext uri="{FF2B5EF4-FFF2-40B4-BE49-F238E27FC236}">
+                <a16:creationId xmlns:a16="http://schemas.microsoft.com/office/drawing/2014/main" id="{78206EED-DCD5-4A2E-9566-762E0F4894B8}"/>
+              </a:ext>
+            </a:extLst>
+          </p:cNvPr>
+          <p:cNvSpPr/>
+          <p:nvPr/>
+        </p:nvSpPr>
+        <p:spPr>
+          <a:xfrm>
+            <a:off x="4715213" y="5578117"/>
+            <a:ext cx="731090" cy="285750"/>
           </a:xfrm>
           <a:prstGeom prst="rect">
             <a:avLst/>
@@ -5160,17 +5035,197 @@
             <a:pPr algn="ctr"/>
             <a:r>
               <a:rPr lang="zh-CN" altLang="en-US" sz="1000" dirty="0"/>
-              <a:t>发送全局广播</a:t>
-            </a:r>
-          </a:p>
-        </p:txBody>
-      </p:sp>
-      <p:sp>
-        <p:nvSpPr>
-          <p:cNvPr id="81" name="矩形 80">
-            <a:extLst>
-              <a:ext uri="{FF2B5EF4-FFF2-40B4-BE49-F238E27FC236}">
-                <a16:creationId xmlns:a16="http://schemas.microsoft.com/office/drawing/2014/main" id="{89884B19-DBB6-4E5F-BD89-745476FECF0E}"/>
+              <a:t>发送请求</a:t>
+            </a:r>
+          </a:p>
+        </p:txBody>
+      </p:sp>
+      <p:cxnSp>
+        <p:nvCxnSpPr>
+          <p:cNvPr id="155" name="连接符: 肘形 154">
+            <a:extLst>
+              <a:ext uri="{FF2B5EF4-FFF2-40B4-BE49-F238E27FC236}">
+                <a16:creationId xmlns:a16="http://schemas.microsoft.com/office/drawing/2014/main" id="{9666DC92-5204-4478-9031-4EC451C69E7F}"/>
+              </a:ext>
+            </a:extLst>
+          </p:cNvPr>
+          <p:cNvCxnSpPr>
+            <a:cxnSpLocks/>
+            <a:stCxn id="42" idx="2"/>
+            <a:endCxn id="131" idx="0"/>
+          </p:cNvCxnSpPr>
+          <p:nvPr/>
+        </p:nvCxnSpPr>
+        <p:spPr>
+          <a:xfrm rot="16200000" flipH="1">
+            <a:off x="3043263" y="3540622"/>
+            <a:ext cx="2004900" cy="2070089"/>
+          </a:xfrm>
+          <a:prstGeom prst="bentConnector3">
+            <a:avLst>
+              <a:gd name="adj1" fmla="val 50000"/>
+            </a:avLst>
+          </a:prstGeom>
+          <a:ln>
+            <a:prstDash val="dash"/>
+          </a:ln>
+        </p:spPr>
+        <p:style>
+          <a:lnRef idx="1">
+            <a:schemeClr val="accent1"/>
+          </a:lnRef>
+          <a:fillRef idx="0">
+            <a:schemeClr val="accent1"/>
+          </a:fillRef>
+          <a:effectRef idx="0">
+            <a:schemeClr val="accent1"/>
+          </a:effectRef>
+          <a:fontRef idx="minor">
+            <a:schemeClr val="tx1"/>
+          </a:fontRef>
+        </p:style>
+      </p:cxnSp>
+      <p:cxnSp>
+        <p:nvCxnSpPr>
+          <p:cNvPr id="157" name="连接符: 肘形 156">
+            <a:extLst>
+              <a:ext uri="{FF2B5EF4-FFF2-40B4-BE49-F238E27FC236}">
+                <a16:creationId xmlns:a16="http://schemas.microsoft.com/office/drawing/2014/main" id="{1D273203-51FE-4372-8818-7468A339F1DA}"/>
+              </a:ext>
+            </a:extLst>
+          </p:cNvPr>
+          <p:cNvCxnSpPr>
+            <a:cxnSpLocks/>
+            <a:stCxn id="36" idx="2"/>
+            <a:endCxn id="131" idx="0"/>
+          </p:cNvCxnSpPr>
+          <p:nvPr/>
+        </p:nvCxnSpPr>
+        <p:spPr>
+          <a:xfrm rot="16200000" flipH="1">
+            <a:off x="3545649" y="4043008"/>
+            <a:ext cx="2004900" cy="1065318"/>
+          </a:xfrm>
+          <a:prstGeom prst="bentConnector3">
+            <a:avLst>
+              <a:gd name="adj1" fmla="val 50000"/>
+            </a:avLst>
+          </a:prstGeom>
+          <a:ln>
+            <a:prstDash val="dash"/>
+          </a:ln>
+        </p:spPr>
+        <p:style>
+          <a:lnRef idx="1">
+            <a:schemeClr val="accent1"/>
+          </a:lnRef>
+          <a:fillRef idx="0">
+            <a:schemeClr val="accent1"/>
+          </a:fillRef>
+          <a:effectRef idx="0">
+            <a:schemeClr val="accent1"/>
+          </a:effectRef>
+          <a:fontRef idx="minor">
+            <a:schemeClr val="tx1"/>
+          </a:fontRef>
+        </p:style>
+      </p:cxnSp>
+      <p:cxnSp>
+        <p:nvCxnSpPr>
+          <p:cNvPr id="159" name="连接符: 肘形 158">
+            <a:extLst>
+              <a:ext uri="{FF2B5EF4-FFF2-40B4-BE49-F238E27FC236}">
+                <a16:creationId xmlns:a16="http://schemas.microsoft.com/office/drawing/2014/main" id="{E393B572-96B1-4376-B93B-B5AF1E115FD0}"/>
+              </a:ext>
+            </a:extLst>
+          </p:cNvPr>
+          <p:cNvCxnSpPr>
+            <a:cxnSpLocks/>
+            <a:stCxn id="40" idx="2"/>
+            <a:endCxn id="131" idx="0"/>
+          </p:cNvCxnSpPr>
+          <p:nvPr/>
+        </p:nvCxnSpPr>
+        <p:spPr>
+          <a:xfrm rot="16200000" flipH="1">
+            <a:off x="3986756" y="4484115"/>
+            <a:ext cx="2004900" cy="183103"/>
+          </a:xfrm>
+          <a:prstGeom prst="bentConnector3">
+            <a:avLst>
+              <a:gd name="adj1" fmla="val 50000"/>
+            </a:avLst>
+          </a:prstGeom>
+          <a:ln>
+            <a:prstDash val="dash"/>
+          </a:ln>
+        </p:spPr>
+        <p:style>
+          <a:lnRef idx="1">
+            <a:schemeClr val="accent1"/>
+          </a:lnRef>
+          <a:fillRef idx="0">
+            <a:schemeClr val="accent1"/>
+          </a:fillRef>
+          <a:effectRef idx="0">
+            <a:schemeClr val="accent1"/>
+          </a:effectRef>
+          <a:fontRef idx="minor">
+            <a:schemeClr val="tx1"/>
+          </a:fontRef>
+        </p:style>
+      </p:cxnSp>
+      <p:cxnSp>
+        <p:nvCxnSpPr>
+          <p:cNvPr id="161" name="连接符: 肘形 160">
+            <a:extLst>
+              <a:ext uri="{FF2B5EF4-FFF2-40B4-BE49-F238E27FC236}">
+                <a16:creationId xmlns:a16="http://schemas.microsoft.com/office/drawing/2014/main" id="{3D260AF5-F896-434A-8572-020AB5CD083F}"/>
+              </a:ext>
+            </a:extLst>
+          </p:cNvPr>
+          <p:cNvCxnSpPr>
+            <a:cxnSpLocks/>
+            <a:stCxn id="41" idx="2"/>
+            <a:endCxn id="131" idx="0"/>
+          </p:cNvCxnSpPr>
+          <p:nvPr/>
+        </p:nvCxnSpPr>
+        <p:spPr>
+          <a:xfrm rot="5400000">
+            <a:off x="4431217" y="4222759"/>
+            <a:ext cx="2004900" cy="705817"/>
+          </a:xfrm>
+          <a:prstGeom prst="bentConnector3">
+            <a:avLst>
+              <a:gd name="adj1" fmla="val 50000"/>
+            </a:avLst>
+          </a:prstGeom>
+          <a:ln>
+            <a:prstDash val="dash"/>
+          </a:ln>
+        </p:spPr>
+        <p:style>
+          <a:lnRef idx="1">
+            <a:schemeClr val="accent1"/>
+          </a:lnRef>
+          <a:fillRef idx="0">
+            <a:schemeClr val="accent1"/>
+          </a:fillRef>
+          <a:effectRef idx="0">
+            <a:schemeClr val="accent1"/>
+          </a:effectRef>
+          <a:fontRef idx="minor">
+            <a:schemeClr val="tx1"/>
+          </a:fontRef>
+        </p:style>
+      </p:cxnSp>
+      <p:sp>
+        <p:nvSpPr>
+          <p:cNvPr id="164" name="矩形 163">
+            <a:extLst>
+              <a:ext uri="{FF2B5EF4-FFF2-40B4-BE49-F238E27FC236}">
+                <a16:creationId xmlns:a16="http://schemas.microsoft.com/office/drawing/2014/main" id="{7ED956A3-A2D1-489D-8EB4-CC0C082A8BBF}"/>
               </a:ext>
             </a:extLst>
           </p:cNvPr>
@@ -5179,7 +5234,7 @@
         </p:nvSpPr>
         <p:spPr>
           <a:xfrm>
-            <a:off x="7779397" y="638194"/>
+            <a:off x="7743107" y="322709"/>
             <a:ext cx="1088527" cy="285750"/>
           </a:xfrm>
           <a:prstGeom prst="rect">
@@ -5214,67 +5269,17 @@
             <a:pPr algn="ctr"/>
             <a:r>
               <a:rPr lang="zh-CN" altLang="en-US" sz="1000" dirty="0"/>
-              <a:t>与</a:t>
-            </a:r>
-            <a:r>
-              <a:rPr lang="en-US" altLang="zh-CN" sz="1000" dirty="0"/>
-              <a:t>Server</a:t>
-            </a:r>
-            <a:r>
-              <a:rPr lang="zh-CN" altLang="en-US" sz="1000" dirty="0"/>
-              <a:t>配对</a:t>
-            </a:r>
-          </a:p>
-        </p:txBody>
-      </p:sp>
-      <p:cxnSp>
-        <p:nvCxnSpPr>
-          <p:cNvPr id="83" name="直接箭头连接符 82">
-            <a:extLst>
-              <a:ext uri="{FF2B5EF4-FFF2-40B4-BE49-F238E27FC236}">
-                <a16:creationId xmlns:a16="http://schemas.microsoft.com/office/drawing/2014/main" id="{117AD926-3EDA-490E-BF57-47755C25602C}"/>
-              </a:ext>
-            </a:extLst>
-          </p:cNvPr>
-          <p:cNvCxnSpPr>
-            <a:stCxn id="57" idx="1"/>
-            <a:endCxn id="81" idx="3"/>
-          </p:cNvCxnSpPr>
-          <p:nvPr/>
-        </p:nvCxnSpPr>
-        <p:spPr>
-          <a:xfrm flipH="1">
-            <a:off x="8867924" y="770353"/>
-            <a:ext cx="819400" cy="10716"/>
-          </a:xfrm>
-          <a:prstGeom prst="straightConnector1">
-            <a:avLst/>
-          </a:prstGeom>
-          <a:ln>
-            <a:tailEnd type="triangle"/>
-          </a:ln>
-        </p:spPr>
-        <p:style>
-          <a:lnRef idx="1">
-            <a:schemeClr val="accent1"/>
-          </a:lnRef>
-          <a:fillRef idx="0">
-            <a:schemeClr val="accent1"/>
-          </a:fillRef>
-          <a:effectRef idx="0">
-            <a:schemeClr val="accent1"/>
-          </a:effectRef>
-          <a:fontRef idx="minor">
-            <a:schemeClr val="tx1"/>
-          </a:fontRef>
-        </p:style>
-      </p:cxnSp>
-      <p:sp>
-        <p:nvSpPr>
-          <p:cNvPr id="85" name="矩形 84">
-            <a:extLst>
-              <a:ext uri="{FF2B5EF4-FFF2-40B4-BE49-F238E27FC236}">
-                <a16:creationId xmlns:a16="http://schemas.microsoft.com/office/drawing/2014/main" id="{0C2C9C86-4287-4D9E-B14F-AD84A2C9E002}"/>
+              <a:t>设置同步文件夹</a:t>
+            </a:r>
+          </a:p>
+        </p:txBody>
+      </p:sp>
+      <p:sp>
+        <p:nvSpPr>
+          <p:cNvPr id="174" name="矩形 173">
+            <a:extLst>
+              <a:ext uri="{FF2B5EF4-FFF2-40B4-BE49-F238E27FC236}">
+                <a16:creationId xmlns:a16="http://schemas.microsoft.com/office/drawing/2014/main" id="{F5895C0F-935F-4D4C-987C-F4929674D767}"/>
               </a:ext>
             </a:extLst>
           </p:cNvPr>
@@ -5283,187 +5288,8 @@
         </p:nvSpPr>
         <p:spPr>
           <a:xfrm>
-            <a:off x="3614900" y="1330325"/>
-            <a:ext cx="1088527" cy="285750"/>
-          </a:xfrm>
-          <a:prstGeom prst="rect">
-            <a:avLst/>
-          </a:prstGeom>
-        </p:spPr>
-        <p:style>
-          <a:lnRef idx="2">
-            <a:schemeClr val="accent1">
-              <a:shade val="50000"/>
-            </a:schemeClr>
-          </a:lnRef>
-          <a:fillRef idx="1">
-            <a:schemeClr val="accent1"/>
-          </a:fillRef>
-          <a:effectRef idx="0">
-            <a:schemeClr val="accent1"/>
-          </a:effectRef>
-          <a:fontRef idx="minor">
-            <a:schemeClr val="lt1"/>
-          </a:fontRef>
-        </p:style>
-        <p:txBody>
-          <a:bodyPr rtlCol="0" anchor="ctr"/>
-          <a:lstStyle/>
-          <a:p>
-            <a:pPr algn="ctr"/>
-            <a:r>
-              <a:rPr lang="zh-CN" altLang="en-US" sz="1000" dirty="0"/>
-              <a:t>加入新的</a:t>
-            </a:r>
-            <a:r>
-              <a:rPr lang="en-US" altLang="zh-CN" sz="1000" dirty="0"/>
-              <a:t>Client</a:t>
-            </a:r>
-            <a:endParaRPr lang="zh-CN" altLang="en-US" sz="1000" dirty="0"/>
-          </a:p>
-        </p:txBody>
-      </p:sp>
-      <p:cxnSp>
-        <p:nvCxnSpPr>
-          <p:cNvPr id="87" name="直接箭头连接符 86">
-            <a:extLst>
-              <a:ext uri="{FF2B5EF4-FFF2-40B4-BE49-F238E27FC236}">
-                <a16:creationId xmlns:a16="http://schemas.microsoft.com/office/drawing/2014/main" id="{CC4F86EE-A6CA-43DF-B03E-3EF7D5027D9C}"/>
-              </a:ext>
-            </a:extLst>
-          </p:cNvPr>
-          <p:cNvCxnSpPr>
-            <a:endCxn id="85" idx="1"/>
-          </p:cNvCxnSpPr>
-          <p:nvPr/>
-        </p:nvCxnSpPr>
-        <p:spPr>
-          <a:xfrm flipV="1">
-            <a:off x="3076247" y="1473200"/>
-            <a:ext cx="538653" cy="13687"/>
-          </a:xfrm>
-          <a:prstGeom prst="straightConnector1">
-            <a:avLst/>
-          </a:prstGeom>
-          <a:ln>
-            <a:tailEnd type="triangle"/>
-          </a:ln>
-        </p:spPr>
-        <p:style>
-          <a:lnRef idx="1">
-            <a:schemeClr val="accent1"/>
-          </a:lnRef>
-          <a:fillRef idx="0">
-            <a:schemeClr val="accent1"/>
-          </a:fillRef>
-          <a:effectRef idx="0">
-            <a:schemeClr val="accent1"/>
-          </a:effectRef>
-          <a:fontRef idx="minor">
-            <a:schemeClr val="tx1"/>
-          </a:fontRef>
-        </p:style>
-      </p:cxnSp>
-      <p:cxnSp>
-        <p:nvCxnSpPr>
-          <p:cNvPr id="89" name="连接符: 肘形 88">
-            <a:extLst>
-              <a:ext uri="{FF2B5EF4-FFF2-40B4-BE49-F238E27FC236}">
-                <a16:creationId xmlns:a16="http://schemas.microsoft.com/office/drawing/2014/main" id="{2D257313-0E64-4ED9-887D-1E500533E67C}"/>
-              </a:ext>
-            </a:extLst>
-          </p:cNvPr>
-          <p:cNvCxnSpPr>
-            <a:stCxn id="85" idx="3"/>
-            <a:endCxn id="81" idx="1"/>
-          </p:cNvCxnSpPr>
-          <p:nvPr/>
-        </p:nvCxnSpPr>
-        <p:spPr>
-          <a:xfrm flipV="1">
-            <a:off x="4703427" y="781069"/>
-            <a:ext cx="3075970" cy="692131"/>
-          </a:xfrm>
-          <a:prstGeom prst="bentConnector3">
-            <a:avLst/>
-          </a:prstGeom>
-          <a:ln>
-            <a:prstDash val="dash"/>
-          </a:ln>
-        </p:spPr>
-        <p:style>
-          <a:lnRef idx="1">
-            <a:schemeClr val="accent1"/>
-          </a:lnRef>
-          <a:fillRef idx="0">
-            <a:schemeClr val="accent1"/>
-          </a:fillRef>
-          <a:effectRef idx="0">
-            <a:schemeClr val="accent1"/>
-          </a:effectRef>
-          <a:fontRef idx="minor">
-            <a:schemeClr val="tx1"/>
-          </a:fontRef>
-        </p:style>
-      </p:cxnSp>
-      <p:cxnSp>
-        <p:nvCxnSpPr>
-          <p:cNvPr id="91" name="直接箭头连接符 90">
-            <a:extLst>
-              <a:ext uri="{FF2B5EF4-FFF2-40B4-BE49-F238E27FC236}">
-                <a16:creationId xmlns:a16="http://schemas.microsoft.com/office/drawing/2014/main" id="{D1EE39E1-1F25-44F5-B7DA-9EFE005823DD}"/>
-              </a:ext>
-            </a:extLst>
-          </p:cNvPr>
-          <p:cNvCxnSpPr>
-            <a:stCxn id="74" idx="2"/>
-            <a:endCxn id="80" idx="0"/>
-          </p:cNvCxnSpPr>
-          <p:nvPr/>
-        </p:nvCxnSpPr>
-        <p:spPr>
-          <a:xfrm>
-            <a:off x="9687323" y="2637323"/>
-            <a:ext cx="0" cy="292600"/>
-          </a:xfrm>
-          <a:prstGeom prst="straightConnector1">
-            <a:avLst/>
-          </a:prstGeom>
-          <a:ln>
-            <a:tailEnd type="triangle"/>
-          </a:ln>
-        </p:spPr>
-        <p:style>
-          <a:lnRef idx="1">
-            <a:schemeClr val="accent1"/>
-          </a:lnRef>
-          <a:fillRef idx="0">
-            <a:schemeClr val="accent1"/>
-          </a:fillRef>
-          <a:effectRef idx="0">
-            <a:schemeClr val="accent1"/>
-          </a:effectRef>
-          <a:fontRef idx="minor">
-            <a:schemeClr val="tx1"/>
-          </a:fontRef>
-        </p:style>
-      </p:cxnSp>
-      <p:sp>
-        <p:nvSpPr>
-          <p:cNvPr id="92" name="矩形 91">
-            <a:extLst>
-              <a:ext uri="{FF2B5EF4-FFF2-40B4-BE49-F238E27FC236}">
-                <a16:creationId xmlns:a16="http://schemas.microsoft.com/office/drawing/2014/main" id="{3DE96E19-06EC-49CE-9B43-493077F5A26F}"/>
-              </a:ext>
-            </a:extLst>
-          </p:cNvPr>
-          <p:cNvSpPr/>
-          <p:nvPr/>
-        </p:nvSpPr>
-        <p:spPr>
-          <a:xfrm>
-            <a:off x="9090939" y="3498334"/>
-            <a:ext cx="1187416" cy="285750"/>
+            <a:off x="7629848" y="3008089"/>
+            <a:ext cx="877349" cy="285750"/>
           </a:xfrm>
           <a:prstGeom prst="rect">
             <a:avLst/>
@@ -5497,111 +5323,25 @@
             <a:pPr algn="ctr"/>
             <a:r>
               <a:rPr lang="zh-CN" altLang="en-US" sz="1000" dirty="0"/>
-              <a:t>收到</a:t>
+              <a:t>文件</a:t>
             </a:r>
             <a:r>
               <a:rPr lang="en-US" altLang="zh-CN" sz="1000" dirty="0"/>
-              <a:t>Server</a:t>
+              <a:t>x</a:t>
             </a:r>
             <a:r>
               <a:rPr lang="zh-CN" altLang="en-US" sz="1000" dirty="0"/>
-              <a:t>回复？</a:t>
-            </a:r>
-          </a:p>
-        </p:txBody>
-      </p:sp>
-      <p:cxnSp>
-        <p:nvCxnSpPr>
-          <p:cNvPr id="94" name="直接箭头连接符 93">
-            <a:extLst>
-              <a:ext uri="{FF2B5EF4-FFF2-40B4-BE49-F238E27FC236}">
-                <a16:creationId xmlns:a16="http://schemas.microsoft.com/office/drawing/2014/main" id="{D0A5281B-4A06-4967-ADB1-9F79F6792D02}"/>
-              </a:ext>
-            </a:extLst>
-          </p:cNvPr>
-          <p:cNvCxnSpPr>
-            <a:stCxn id="80" idx="2"/>
-            <a:endCxn id="92" idx="0"/>
-          </p:cNvCxnSpPr>
-          <p:nvPr/>
-        </p:nvCxnSpPr>
-        <p:spPr>
-          <a:xfrm flipH="1">
-            <a:off x="9684647" y="3215673"/>
-            <a:ext cx="2676" cy="282661"/>
-          </a:xfrm>
-          <a:prstGeom prst="straightConnector1">
-            <a:avLst/>
-          </a:prstGeom>
-          <a:ln>
-            <a:tailEnd type="triangle"/>
-          </a:ln>
-        </p:spPr>
-        <p:style>
-          <a:lnRef idx="1">
-            <a:schemeClr val="accent1"/>
-          </a:lnRef>
-          <a:fillRef idx="0">
-            <a:schemeClr val="accent1"/>
-          </a:fillRef>
-          <a:effectRef idx="0">
-            <a:schemeClr val="accent1"/>
-          </a:effectRef>
-          <a:fontRef idx="minor">
-            <a:schemeClr val="tx1"/>
-          </a:fontRef>
-        </p:style>
-      </p:cxnSp>
-      <p:cxnSp>
-        <p:nvCxnSpPr>
-          <p:cNvPr id="96" name="连接符: 肘形 95">
-            <a:extLst>
-              <a:ext uri="{FF2B5EF4-FFF2-40B4-BE49-F238E27FC236}">
-                <a16:creationId xmlns:a16="http://schemas.microsoft.com/office/drawing/2014/main" id="{FFDD148F-CD2A-4FEC-BD1B-A4C852DFFBB5}"/>
-              </a:ext>
-            </a:extLst>
-          </p:cNvPr>
-          <p:cNvCxnSpPr>
-            <a:stCxn id="92" idx="3"/>
-            <a:endCxn id="66" idx="3"/>
-          </p:cNvCxnSpPr>
-          <p:nvPr/>
-        </p:nvCxnSpPr>
-        <p:spPr>
-          <a:xfrm flipV="1">
-            <a:off x="10278355" y="1717918"/>
-            <a:ext cx="2678" cy="1923291"/>
-          </a:xfrm>
-          <a:prstGeom prst="bentConnector3">
-            <a:avLst>
-              <a:gd name="adj1" fmla="val 8636221"/>
-            </a:avLst>
-          </a:prstGeom>
-          <a:ln>
-            <a:tailEnd type="triangle"/>
-          </a:ln>
-        </p:spPr>
-        <p:style>
-          <a:lnRef idx="1">
-            <a:schemeClr val="accent1"/>
-          </a:lnRef>
-          <a:fillRef idx="0">
-            <a:schemeClr val="accent1"/>
-          </a:fillRef>
-          <a:effectRef idx="0">
-            <a:schemeClr val="accent1"/>
-          </a:effectRef>
-          <a:fontRef idx="minor">
-            <a:schemeClr val="tx1"/>
-          </a:fontRef>
-        </p:style>
-      </p:cxnSp>
-      <p:sp>
-        <p:nvSpPr>
-          <p:cNvPr id="97" name="矩形 96">
-            <a:extLst>
-              <a:ext uri="{FF2B5EF4-FFF2-40B4-BE49-F238E27FC236}">
-                <a16:creationId xmlns:a16="http://schemas.microsoft.com/office/drawing/2014/main" id="{0911E39C-4832-4704-9883-35BDF762A3A0}"/>
+              <a:t>变动</a:t>
+            </a:r>
+          </a:p>
+        </p:txBody>
+      </p:sp>
+      <p:sp>
+        <p:nvSpPr>
+          <p:cNvPr id="192" name="矩形: 圆角 191">
+            <a:extLst>
+              <a:ext uri="{FF2B5EF4-FFF2-40B4-BE49-F238E27FC236}">
+                <a16:creationId xmlns:a16="http://schemas.microsoft.com/office/drawing/2014/main" id="{BE1E441F-C751-4901-AECD-8089C2D0B22D}"/>
               </a:ext>
             </a:extLst>
           </p:cNvPr>
@@ -5610,10 +5350,10 @@
         </p:nvSpPr>
         <p:spPr>
           <a:xfrm>
-            <a:off x="10982276" y="4070830"/>
-            <a:ext cx="1187416" cy="285750"/>
-          </a:xfrm>
-          <a:prstGeom prst="rect">
+            <a:off x="7362592" y="2246715"/>
+            <a:ext cx="1411860" cy="308491"/>
+          </a:xfrm>
+          <a:prstGeom prst="roundRect">
             <a:avLst/>
           </a:prstGeom>
           <a:solidFill>
@@ -5644,82 +5384,41 @@
           <a:p>
             <a:pPr algn="ctr"/>
             <a:r>
+              <a:rPr lang="en-US" altLang="zh-CN" sz="1000" dirty="0"/>
+              <a:t>Thread2: </a:t>
+            </a:r>
+          </a:p>
+          <a:p>
+            <a:pPr algn="ctr"/>
+            <a:r>
               <a:rPr lang="zh-CN" altLang="en-US" sz="1000" dirty="0"/>
-              <a:t>建立连接</a:t>
-            </a:r>
-          </a:p>
-        </p:txBody>
-      </p:sp>
-      <p:sp>
-        <p:nvSpPr>
-          <p:cNvPr id="103" name="矩形 102">
-            <a:extLst>
-              <a:ext uri="{FF2B5EF4-FFF2-40B4-BE49-F238E27FC236}">
-                <a16:creationId xmlns:a16="http://schemas.microsoft.com/office/drawing/2014/main" id="{A1473793-4503-4C1D-8E25-4A106AC0EF71}"/>
-              </a:ext>
-            </a:extLst>
-          </p:cNvPr>
-          <p:cNvSpPr/>
-          <p:nvPr/>
-        </p:nvSpPr>
-        <p:spPr>
-          <a:xfrm>
-            <a:off x="485824" y="3469689"/>
-            <a:ext cx="1187416" cy="285750"/>
-          </a:xfrm>
-          <a:prstGeom prst="rect">
-            <a:avLst/>
-          </a:prstGeom>
-        </p:spPr>
-        <p:style>
-          <a:lnRef idx="2">
-            <a:schemeClr val="accent1">
-              <a:shade val="50000"/>
-            </a:schemeClr>
-          </a:lnRef>
-          <a:fillRef idx="1">
-            <a:schemeClr val="accent1"/>
-          </a:fillRef>
-          <a:effectRef idx="0">
-            <a:schemeClr val="accent1"/>
-          </a:effectRef>
-          <a:fontRef idx="minor">
-            <a:schemeClr val="lt1"/>
-          </a:fontRef>
-        </p:style>
-        <p:txBody>
-          <a:bodyPr rtlCol="0" anchor="ctr"/>
-          <a:lstStyle/>
-          <a:p>
-            <a:pPr algn="ctr"/>
-            <a:r>
-              <a:rPr lang="zh-CN" altLang="en-US" sz="1000" dirty="0"/>
-              <a:t>建立连接</a:t>
+              <a:t>监听文件夹状态状态</a:t>
             </a:r>
           </a:p>
         </p:txBody>
       </p:sp>
       <p:cxnSp>
         <p:nvCxnSpPr>
-          <p:cNvPr id="112" name="连接符: 肘形 111">
-            <a:extLst>
-              <a:ext uri="{FF2B5EF4-FFF2-40B4-BE49-F238E27FC236}">
-                <a16:creationId xmlns:a16="http://schemas.microsoft.com/office/drawing/2014/main" id="{04EF1328-2E4E-4FE3-A5EA-2747BB4856F8}"/>
+          <p:cNvPr id="195" name="直接箭头连接符 194">
+            <a:extLst>
+              <a:ext uri="{FF2B5EF4-FFF2-40B4-BE49-F238E27FC236}">
+                <a16:creationId xmlns:a16="http://schemas.microsoft.com/office/drawing/2014/main" id="{FD985504-EC8B-4AC0-BA38-AD5E688247CF}"/>
               </a:ext>
             </a:extLst>
           </p:cNvPr>
           <p:cNvCxnSpPr>
-            <a:stCxn id="12" idx="2"/>
-            <a:endCxn id="103" idx="3"/>
+            <a:cxnSpLocks/>
+            <a:stCxn id="192" idx="2"/>
+            <a:endCxn id="174" idx="0"/>
           </p:cNvCxnSpPr>
           <p:nvPr/>
         </p:nvCxnSpPr>
         <p:spPr>
-          <a:xfrm rot="5400000">
-            <a:off x="1568743" y="2879447"/>
-            <a:ext cx="837614" cy="628620"/>
-          </a:xfrm>
-          <a:prstGeom prst="bentConnector2">
+          <a:xfrm>
+            <a:off x="8068522" y="2555206"/>
+            <a:ext cx="1" cy="452883"/>
+          </a:xfrm>
+          <a:prstGeom prst="straightConnector1">
             <a:avLst/>
           </a:prstGeom>
           <a:ln>
@@ -5741,96 +5440,12 @@
           </a:fontRef>
         </p:style>
       </p:cxnSp>
-      <p:cxnSp>
-        <p:nvCxnSpPr>
-          <p:cNvPr id="119" name="直接箭头连接符 118">
-            <a:extLst>
-              <a:ext uri="{FF2B5EF4-FFF2-40B4-BE49-F238E27FC236}">
-                <a16:creationId xmlns:a16="http://schemas.microsoft.com/office/drawing/2014/main" id="{7879123E-7536-423D-A5A2-A47797D55D7C}"/>
-              </a:ext>
-            </a:extLst>
-          </p:cNvPr>
-          <p:cNvCxnSpPr>
-            <a:stCxn id="103" idx="2"/>
-            <a:endCxn id="8" idx="0"/>
-          </p:cNvCxnSpPr>
-          <p:nvPr/>
-        </p:nvCxnSpPr>
-        <p:spPr>
-          <a:xfrm>
-            <a:off x="1079532" y="3755439"/>
-            <a:ext cx="0" cy="1354838"/>
-          </a:xfrm>
-          <a:prstGeom prst="straightConnector1">
-            <a:avLst/>
-          </a:prstGeom>
-          <a:ln>
-            <a:tailEnd type="triangle"/>
-          </a:ln>
-        </p:spPr>
-        <p:style>
-          <a:lnRef idx="1">
-            <a:schemeClr val="accent1"/>
-          </a:lnRef>
-          <a:fillRef idx="0">
-            <a:schemeClr val="accent1"/>
-          </a:fillRef>
-          <a:effectRef idx="0">
-            <a:schemeClr val="accent1"/>
-          </a:effectRef>
-          <a:fontRef idx="minor">
-            <a:schemeClr val="tx1"/>
-          </a:fontRef>
-        </p:style>
-      </p:cxnSp>
-      <p:cxnSp>
-        <p:nvCxnSpPr>
-          <p:cNvPr id="122" name="连接符: 肘形 121">
-            <a:extLst>
-              <a:ext uri="{FF2B5EF4-FFF2-40B4-BE49-F238E27FC236}">
-                <a16:creationId xmlns:a16="http://schemas.microsoft.com/office/drawing/2014/main" id="{B3F06A96-3E63-4D07-B320-87482038E39D}"/>
-              </a:ext>
-            </a:extLst>
-          </p:cNvPr>
-          <p:cNvCxnSpPr>
-            <a:stCxn id="92" idx="2"/>
-            <a:endCxn id="97" idx="1"/>
-          </p:cNvCxnSpPr>
-          <p:nvPr/>
-        </p:nvCxnSpPr>
-        <p:spPr>
-          <a:xfrm rot="16200000" flipH="1">
-            <a:off x="10118651" y="3350079"/>
-            <a:ext cx="429621" cy="1297629"/>
-          </a:xfrm>
-          <a:prstGeom prst="bentConnector2">
-            <a:avLst/>
-          </a:prstGeom>
-          <a:ln>
-            <a:tailEnd type="triangle"/>
-          </a:ln>
-        </p:spPr>
-        <p:style>
-          <a:lnRef idx="1">
-            <a:schemeClr val="accent1"/>
-          </a:lnRef>
-          <a:fillRef idx="0">
-            <a:schemeClr val="accent1"/>
-          </a:fillRef>
-          <a:effectRef idx="0">
-            <a:schemeClr val="accent1"/>
-          </a:effectRef>
-          <a:fontRef idx="minor">
-            <a:schemeClr val="tx1"/>
-          </a:fontRef>
-        </p:style>
-      </p:cxnSp>
-      <p:sp>
-        <p:nvSpPr>
-          <p:cNvPr id="131" name="矩形 130">
-            <a:extLst>
-              <a:ext uri="{FF2B5EF4-FFF2-40B4-BE49-F238E27FC236}">
-                <a16:creationId xmlns:a16="http://schemas.microsoft.com/office/drawing/2014/main" id="{78206EED-DCD5-4A2E-9566-762E0F4894B8}"/>
+      <p:sp>
+        <p:nvSpPr>
+          <p:cNvPr id="225" name="矩形 224">
+            <a:extLst>
+              <a:ext uri="{FF2B5EF4-FFF2-40B4-BE49-F238E27FC236}">
+                <a16:creationId xmlns:a16="http://schemas.microsoft.com/office/drawing/2014/main" id="{9047DACD-CDA7-4129-BB11-FC7BD9DAF26B}"/>
               </a:ext>
             </a:extLst>
           </p:cNvPr>
@@ -5839,8 +5454,8 @@
         </p:nvSpPr>
         <p:spPr>
           <a:xfrm>
-            <a:off x="4715213" y="5578117"/>
-            <a:ext cx="731090" cy="285750"/>
+            <a:off x="7514293" y="3520650"/>
+            <a:ext cx="457167" cy="285750"/>
           </a:xfrm>
           <a:prstGeom prst="rect">
             <a:avLst/>
@@ -5874,285 +5489,17 @@
             <a:pPr algn="ctr"/>
             <a:r>
               <a:rPr lang="zh-CN" altLang="en-US" sz="1000" dirty="0"/>
-              <a:t>发送请求</a:t>
-            </a:r>
-          </a:p>
-        </p:txBody>
-      </p:sp>
-      <p:cxnSp>
-        <p:nvCxnSpPr>
-          <p:cNvPr id="135" name="连接符: 肘形 134">
-            <a:extLst>
-              <a:ext uri="{FF2B5EF4-FFF2-40B4-BE49-F238E27FC236}">
-                <a16:creationId xmlns:a16="http://schemas.microsoft.com/office/drawing/2014/main" id="{CFBBEE3B-9002-40FE-82B3-131BC3CCAB0C}"/>
-              </a:ext>
-            </a:extLst>
-          </p:cNvPr>
-          <p:cNvCxnSpPr>
-            <a:cxnSpLocks/>
-            <a:stCxn id="12" idx="3"/>
-            <a:endCxn id="66" idx="1"/>
-          </p:cNvCxnSpPr>
-          <p:nvPr/>
-        </p:nvCxnSpPr>
-        <p:spPr>
-          <a:xfrm flipV="1">
-            <a:off x="2895569" y="1717918"/>
-            <a:ext cx="6198045" cy="764932"/>
-          </a:xfrm>
-          <a:prstGeom prst="bentConnector3">
-            <a:avLst>
-              <a:gd name="adj1" fmla="val 73061"/>
-            </a:avLst>
-          </a:prstGeom>
-          <a:ln>
-            <a:prstDash val="dash"/>
-          </a:ln>
-        </p:spPr>
-        <p:style>
-          <a:lnRef idx="1">
-            <a:schemeClr val="accent1"/>
-          </a:lnRef>
-          <a:fillRef idx="0">
-            <a:schemeClr val="accent1"/>
-          </a:fillRef>
-          <a:effectRef idx="0">
-            <a:schemeClr val="accent1"/>
-          </a:effectRef>
-          <a:fontRef idx="minor">
-            <a:schemeClr val="tx1"/>
-          </a:fontRef>
-        </p:style>
-      </p:cxnSp>
-      <p:cxnSp>
-        <p:nvCxnSpPr>
-          <p:cNvPr id="155" name="连接符: 肘形 154">
-            <a:extLst>
-              <a:ext uri="{FF2B5EF4-FFF2-40B4-BE49-F238E27FC236}">
-                <a16:creationId xmlns:a16="http://schemas.microsoft.com/office/drawing/2014/main" id="{9666DC92-5204-4478-9031-4EC451C69E7F}"/>
-              </a:ext>
-            </a:extLst>
-          </p:cNvPr>
-          <p:cNvCxnSpPr>
-            <a:cxnSpLocks/>
-            <a:stCxn id="42" idx="2"/>
-            <a:endCxn id="131" idx="0"/>
-          </p:cNvCxnSpPr>
-          <p:nvPr/>
-        </p:nvCxnSpPr>
-        <p:spPr>
-          <a:xfrm rot="16200000" flipH="1">
-            <a:off x="3476967" y="3974325"/>
-            <a:ext cx="1839935" cy="1367647"/>
-          </a:xfrm>
-          <a:prstGeom prst="bentConnector3">
-            <a:avLst>
-              <a:gd name="adj1" fmla="val 50000"/>
-            </a:avLst>
-          </a:prstGeom>
-          <a:ln>
-            <a:prstDash val="dash"/>
-          </a:ln>
-        </p:spPr>
-        <p:style>
-          <a:lnRef idx="1">
-            <a:schemeClr val="accent1"/>
-          </a:lnRef>
-          <a:fillRef idx="0">
-            <a:schemeClr val="accent1"/>
-          </a:fillRef>
-          <a:effectRef idx="0">
-            <a:schemeClr val="accent1"/>
-          </a:effectRef>
-          <a:fontRef idx="minor">
-            <a:schemeClr val="tx1"/>
-          </a:fontRef>
-        </p:style>
-      </p:cxnSp>
-      <p:cxnSp>
-        <p:nvCxnSpPr>
-          <p:cNvPr id="157" name="连接符: 肘形 156">
-            <a:extLst>
-              <a:ext uri="{FF2B5EF4-FFF2-40B4-BE49-F238E27FC236}">
-                <a16:creationId xmlns:a16="http://schemas.microsoft.com/office/drawing/2014/main" id="{1D273203-51FE-4372-8818-7468A339F1DA}"/>
-              </a:ext>
-            </a:extLst>
-          </p:cNvPr>
-          <p:cNvCxnSpPr>
-            <a:cxnSpLocks/>
-            <a:stCxn id="36" idx="2"/>
-            <a:endCxn id="131" idx="0"/>
-          </p:cNvCxnSpPr>
-          <p:nvPr/>
-        </p:nvCxnSpPr>
-        <p:spPr>
-          <a:xfrm rot="16200000" flipH="1">
-            <a:off x="3979353" y="4476711"/>
-            <a:ext cx="1839935" cy="362876"/>
-          </a:xfrm>
-          <a:prstGeom prst="bentConnector3">
-            <a:avLst>
-              <a:gd name="adj1" fmla="val 50000"/>
-            </a:avLst>
-          </a:prstGeom>
-          <a:ln>
-            <a:prstDash val="dash"/>
-          </a:ln>
-        </p:spPr>
-        <p:style>
-          <a:lnRef idx="1">
-            <a:schemeClr val="accent1"/>
-          </a:lnRef>
-          <a:fillRef idx="0">
-            <a:schemeClr val="accent1"/>
-          </a:fillRef>
-          <a:effectRef idx="0">
-            <a:schemeClr val="accent1"/>
-          </a:effectRef>
-          <a:fontRef idx="minor">
-            <a:schemeClr val="tx1"/>
-          </a:fontRef>
-        </p:style>
-      </p:cxnSp>
-      <p:cxnSp>
-        <p:nvCxnSpPr>
-          <p:cNvPr id="159" name="连接符: 肘形 158">
-            <a:extLst>
-              <a:ext uri="{FF2B5EF4-FFF2-40B4-BE49-F238E27FC236}">
-                <a16:creationId xmlns:a16="http://schemas.microsoft.com/office/drawing/2014/main" id="{E393B572-96B1-4376-B93B-B5AF1E115FD0}"/>
-              </a:ext>
-            </a:extLst>
-          </p:cNvPr>
-          <p:cNvCxnSpPr>
-            <a:cxnSpLocks/>
-            <a:stCxn id="40" idx="2"/>
-            <a:endCxn id="131" idx="0"/>
-          </p:cNvCxnSpPr>
-          <p:nvPr/>
-        </p:nvCxnSpPr>
-        <p:spPr>
-          <a:xfrm rot="5400000">
-            <a:off x="4420461" y="4398480"/>
-            <a:ext cx="1839935" cy="519339"/>
-          </a:xfrm>
-          <a:prstGeom prst="bentConnector3">
-            <a:avLst>
-              <a:gd name="adj1" fmla="val 50000"/>
-            </a:avLst>
-          </a:prstGeom>
-          <a:ln>
-            <a:prstDash val="dash"/>
-          </a:ln>
-        </p:spPr>
-        <p:style>
-          <a:lnRef idx="1">
-            <a:schemeClr val="accent1"/>
-          </a:lnRef>
-          <a:fillRef idx="0">
-            <a:schemeClr val="accent1"/>
-          </a:fillRef>
-          <a:effectRef idx="0">
-            <a:schemeClr val="accent1"/>
-          </a:effectRef>
-          <a:fontRef idx="minor">
-            <a:schemeClr val="tx1"/>
-          </a:fontRef>
-        </p:style>
-      </p:cxnSp>
-      <p:cxnSp>
-        <p:nvCxnSpPr>
-          <p:cNvPr id="161" name="连接符: 肘形 160">
-            <a:extLst>
-              <a:ext uri="{FF2B5EF4-FFF2-40B4-BE49-F238E27FC236}">
-                <a16:creationId xmlns:a16="http://schemas.microsoft.com/office/drawing/2014/main" id="{3D260AF5-F896-434A-8572-020AB5CD083F}"/>
-              </a:ext>
-            </a:extLst>
-          </p:cNvPr>
-          <p:cNvCxnSpPr>
-            <a:cxnSpLocks/>
-            <a:stCxn id="41" idx="2"/>
-            <a:endCxn id="131" idx="0"/>
-          </p:cNvCxnSpPr>
-          <p:nvPr/>
-        </p:nvCxnSpPr>
-        <p:spPr>
-          <a:xfrm rot="5400000">
-            <a:off x="4864921" y="3954020"/>
-            <a:ext cx="1839935" cy="1408259"/>
-          </a:xfrm>
-          <a:prstGeom prst="bentConnector3">
-            <a:avLst>
-              <a:gd name="adj1" fmla="val 50000"/>
-            </a:avLst>
-          </a:prstGeom>
-          <a:ln>
-            <a:prstDash val="dash"/>
-          </a:ln>
-        </p:spPr>
-        <p:style>
-          <a:lnRef idx="1">
-            <a:schemeClr val="accent1"/>
-          </a:lnRef>
-          <a:fillRef idx="0">
-            <a:schemeClr val="accent1"/>
-          </a:fillRef>
-          <a:effectRef idx="0">
-            <a:schemeClr val="accent1"/>
-          </a:effectRef>
-          <a:fontRef idx="minor">
-            <a:schemeClr val="tx1"/>
-          </a:fontRef>
-        </p:style>
-      </p:cxnSp>
-      <p:cxnSp>
-        <p:nvCxnSpPr>
-          <p:cNvPr id="163" name="连接符: 肘形 162">
-            <a:extLst>
-              <a:ext uri="{FF2B5EF4-FFF2-40B4-BE49-F238E27FC236}">
-                <a16:creationId xmlns:a16="http://schemas.microsoft.com/office/drawing/2014/main" id="{61E6A884-C1B0-499A-B1D9-7EE978E78DB1}"/>
-              </a:ext>
-            </a:extLst>
-          </p:cNvPr>
-          <p:cNvCxnSpPr>
-            <a:cxnSpLocks/>
-            <a:stCxn id="57" idx="1"/>
-            <a:endCxn id="164" idx="3"/>
-          </p:cNvCxnSpPr>
-          <p:nvPr/>
-        </p:nvCxnSpPr>
-        <p:spPr>
-          <a:xfrm rot="10800000">
-            <a:off x="8867924" y="362245"/>
-            <a:ext cx="819400" cy="408109"/>
-          </a:xfrm>
-          <a:prstGeom prst="bentConnector3">
-            <a:avLst/>
-          </a:prstGeom>
-          <a:ln>
-            <a:tailEnd type="triangle"/>
-          </a:ln>
-        </p:spPr>
-        <p:style>
-          <a:lnRef idx="1">
-            <a:schemeClr val="accent1"/>
-          </a:lnRef>
-          <a:fillRef idx="0">
-            <a:schemeClr val="accent1"/>
-          </a:fillRef>
-          <a:effectRef idx="0">
-            <a:schemeClr val="accent1"/>
-          </a:effectRef>
-          <a:fontRef idx="minor">
-            <a:schemeClr val="tx1"/>
-          </a:fontRef>
-        </p:style>
-      </p:cxnSp>
-      <p:sp>
-        <p:nvSpPr>
-          <p:cNvPr id="164" name="矩形 163">
-            <a:extLst>
-              <a:ext uri="{FF2B5EF4-FFF2-40B4-BE49-F238E27FC236}">
-                <a16:creationId xmlns:a16="http://schemas.microsoft.com/office/drawing/2014/main" id="{7ED956A3-A2D1-489D-8EB4-CC0C082A8BBF}"/>
+              <a:t>添加</a:t>
+            </a:r>
+          </a:p>
+        </p:txBody>
+      </p:sp>
+      <p:sp>
+        <p:nvSpPr>
+          <p:cNvPr id="226" name="矩形 225">
+            <a:extLst>
+              <a:ext uri="{FF2B5EF4-FFF2-40B4-BE49-F238E27FC236}">
+                <a16:creationId xmlns:a16="http://schemas.microsoft.com/office/drawing/2014/main" id="{17135D35-25CA-4722-84BA-45DC410CD51D}"/>
               </a:ext>
             </a:extLst>
           </p:cNvPr>
@@ -6161,8 +5508,8 @@
         </p:nvSpPr>
         <p:spPr>
           <a:xfrm>
-            <a:off x="7779397" y="219369"/>
-            <a:ext cx="1088527" cy="285750"/>
+            <a:off x="8172767" y="3520650"/>
+            <a:ext cx="457167" cy="285750"/>
           </a:xfrm>
           <a:prstGeom prst="rect">
             <a:avLst/>
@@ -6196,17 +5543,101 @@
             <a:pPr algn="ctr"/>
             <a:r>
               <a:rPr lang="zh-CN" altLang="en-US" sz="1000" dirty="0"/>
-              <a:t>设置同步文件夹</a:t>
-            </a:r>
-          </a:p>
-        </p:txBody>
-      </p:sp>
-      <p:sp>
-        <p:nvSpPr>
-          <p:cNvPr id="174" name="矩形 173">
-            <a:extLst>
-              <a:ext uri="{FF2B5EF4-FFF2-40B4-BE49-F238E27FC236}">
-                <a16:creationId xmlns:a16="http://schemas.microsoft.com/office/drawing/2014/main" id="{F5895C0F-935F-4D4C-987C-F4929674D767}"/>
+              <a:t>修改</a:t>
+            </a:r>
+          </a:p>
+        </p:txBody>
+      </p:sp>
+      <p:cxnSp>
+        <p:nvCxnSpPr>
+          <p:cNvPr id="228" name="连接符: 肘形 227">
+            <a:extLst>
+              <a:ext uri="{FF2B5EF4-FFF2-40B4-BE49-F238E27FC236}">
+                <a16:creationId xmlns:a16="http://schemas.microsoft.com/office/drawing/2014/main" id="{50E410C5-881A-4487-9D43-2FD0B2AD7F09}"/>
+              </a:ext>
+            </a:extLst>
+          </p:cNvPr>
+          <p:cNvCxnSpPr>
+            <a:stCxn id="174" idx="2"/>
+            <a:endCxn id="225" idx="0"/>
+          </p:cNvCxnSpPr>
+          <p:nvPr/>
+        </p:nvCxnSpPr>
+        <p:spPr>
+          <a:xfrm rot="5400000">
+            <a:off x="7792295" y="3244421"/>
+            <a:ext cx="226811" cy="325646"/>
+          </a:xfrm>
+          <a:prstGeom prst="bentConnector3">
+            <a:avLst/>
+          </a:prstGeom>
+          <a:ln>
+            <a:tailEnd type="triangle"/>
+          </a:ln>
+        </p:spPr>
+        <p:style>
+          <a:lnRef idx="1">
+            <a:schemeClr val="accent1"/>
+          </a:lnRef>
+          <a:fillRef idx="0">
+            <a:schemeClr val="accent1"/>
+          </a:fillRef>
+          <a:effectRef idx="0">
+            <a:schemeClr val="accent1"/>
+          </a:effectRef>
+          <a:fontRef idx="minor">
+            <a:schemeClr val="tx1"/>
+          </a:fontRef>
+        </p:style>
+      </p:cxnSp>
+      <p:cxnSp>
+        <p:nvCxnSpPr>
+          <p:cNvPr id="230" name="连接符: 肘形 229">
+            <a:extLst>
+              <a:ext uri="{FF2B5EF4-FFF2-40B4-BE49-F238E27FC236}">
+                <a16:creationId xmlns:a16="http://schemas.microsoft.com/office/drawing/2014/main" id="{EF8456BC-7AFA-4E98-BBBB-4BE169CE1242}"/>
+              </a:ext>
+            </a:extLst>
+          </p:cNvPr>
+          <p:cNvCxnSpPr>
+            <a:stCxn id="174" idx="2"/>
+            <a:endCxn id="226" idx="0"/>
+          </p:cNvCxnSpPr>
+          <p:nvPr/>
+        </p:nvCxnSpPr>
+        <p:spPr>
+          <a:xfrm rot="16200000" flipH="1">
+            <a:off x="8121532" y="3240830"/>
+            <a:ext cx="226811" cy="332828"/>
+          </a:xfrm>
+          <a:prstGeom prst="bentConnector3">
+            <a:avLst/>
+          </a:prstGeom>
+          <a:ln>
+            <a:tailEnd type="triangle"/>
+          </a:ln>
+        </p:spPr>
+        <p:style>
+          <a:lnRef idx="1">
+            <a:schemeClr val="accent1"/>
+          </a:lnRef>
+          <a:fillRef idx="0">
+            <a:schemeClr val="accent1"/>
+          </a:fillRef>
+          <a:effectRef idx="0">
+            <a:schemeClr val="accent1"/>
+          </a:effectRef>
+          <a:fontRef idx="minor">
+            <a:schemeClr val="tx1"/>
+          </a:fontRef>
+        </p:style>
+      </p:cxnSp>
+      <p:sp>
+        <p:nvSpPr>
+          <p:cNvPr id="252" name="矩形: 圆角 251">
+            <a:extLst>
+              <a:ext uri="{FF2B5EF4-FFF2-40B4-BE49-F238E27FC236}">
+                <a16:creationId xmlns:a16="http://schemas.microsoft.com/office/drawing/2014/main" id="{FD4293A4-F64D-4347-86C5-5AD11099B5D7}"/>
               </a:ext>
             </a:extLst>
           </p:cNvPr>
@@ -6215,10 +5646,10 @@
         </p:nvSpPr>
         <p:spPr>
           <a:xfrm>
-            <a:off x="7668855" y="3243918"/>
-            <a:ext cx="877349" cy="285750"/>
-          </a:xfrm>
-          <a:prstGeom prst="rect">
+            <a:off x="8867924" y="5488081"/>
+            <a:ext cx="1187419" cy="465820"/>
+          </a:xfrm>
+          <a:prstGeom prst="roundRect">
             <a:avLst/>
           </a:prstGeom>
           <a:solidFill>
@@ -6249,33 +5680,40 @@
           <a:p>
             <a:pPr algn="ctr"/>
             <a:r>
+              <a:rPr lang="en-US" altLang="zh-CN" sz="1000" dirty="0"/>
+              <a:t>Thread3: </a:t>
+            </a:r>
+          </a:p>
+          <a:p>
+            <a:pPr algn="ctr"/>
+            <a:r>
               <a:rPr lang="zh-CN" altLang="en-US" sz="1000" dirty="0"/>
-              <a:t>文件夹变动</a:t>
+              <a:t>监听用户请求（用户发出）</a:t>
             </a:r>
           </a:p>
         </p:txBody>
       </p:sp>
       <p:cxnSp>
         <p:nvCxnSpPr>
-          <p:cNvPr id="189" name="直接箭头连接符 188">
-            <a:extLst>
-              <a:ext uri="{FF2B5EF4-FFF2-40B4-BE49-F238E27FC236}">
-                <a16:creationId xmlns:a16="http://schemas.microsoft.com/office/drawing/2014/main" id="{3ABAB4BF-151A-4BE1-9B44-BA9E847743A1}"/>
+          <p:cNvPr id="257" name="连接符: 肘形 256">
+            <a:extLst>
+              <a:ext uri="{FF2B5EF4-FFF2-40B4-BE49-F238E27FC236}">
+                <a16:creationId xmlns:a16="http://schemas.microsoft.com/office/drawing/2014/main" id="{716FB4CD-404D-43A9-AC8C-639C6A7A5AED}"/>
               </a:ext>
             </a:extLst>
           </p:cNvPr>
           <p:cNvCxnSpPr>
-            <a:stCxn id="97" idx="2"/>
-            <a:endCxn id="61" idx="0"/>
+            <a:stCxn id="252" idx="1"/>
+            <a:endCxn id="131" idx="3"/>
           </p:cNvCxnSpPr>
           <p:nvPr/>
         </p:nvCxnSpPr>
         <p:spPr>
-          <a:xfrm>
-            <a:off x="11575984" y="4356580"/>
-            <a:ext cx="10260" cy="1793144"/>
-          </a:xfrm>
-          <a:prstGeom prst="straightConnector1">
+          <a:xfrm rot="10800000" flipV="1">
+            <a:off x="5446304" y="5720990"/>
+            <a:ext cx="3421621" cy="1"/>
+          </a:xfrm>
+          <a:prstGeom prst="bentConnector3">
             <a:avLst/>
           </a:prstGeom>
           <a:ln>
@@ -6297,12 +5735,54 @@
           </a:fontRef>
         </p:style>
       </p:cxnSp>
-      <p:sp>
-        <p:nvSpPr>
-          <p:cNvPr id="192" name="矩形: 圆角 191">
-            <a:extLst>
-              <a:ext uri="{FF2B5EF4-FFF2-40B4-BE49-F238E27FC236}">
-                <a16:creationId xmlns:a16="http://schemas.microsoft.com/office/drawing/2014/main" id="{BE1E441F-C751-4901-AECD-8089C2D0B22D}"/>
+      <p:cxnSp>
+        <p:nvCxnSpPr>
+          <p:cNvPr id="6" name="连接符: 肘形 5">
+            <a:extLst>
+              <a:ext uri="{FF2B5EF4-FFF2-40B4-BE49-F238E27FC236}">
+                <a16:creationId xmlns:a16="http://schemas.microsoft.com/office/drawing/2014/main" id="{58C59F61-A90D-4392-8AB1-2F5A5A0461EB}"/>
+              </a:ext>
+            </a:extLst>
+          </p:cNvPr>
+          <p:cNvCxnSpPr>
+            <a:stCxn id="25" idx="3"/>
+            <a:endCxn id="85" idx="1"/>
+          </p:cNvCxnSpPr>
+          <p:nvPr/>
+        </p:nvCxnSpPr>
+        <p:spPr>
+          <a:xfrm flipV="1">
+            <a:off x="2680845" y="142874"/>
+            <a:ext cx="544263" cy="1"/>
+          </a:xfrm>
+          <a:prstGeom prst="bentConnector3">
+            <a:avLst/>
+          </a:prstGeom>
+          <a:ln>
+            <a:tailEnd type="triangle"/>
+          </a:ln>
+        </p:spPr>
+        <p:style>
+          <a:lnRef idx="1">
+            <a:schemeClr val="accent1"/>
+          </a:lnRef>
+          <a:fillRef idx="0">
+            <a:schemeClr val="accent1"/>
+          </a:fillRef>
+          <a:effectRef idx="0">
+            <a:schemeClr val="accent1"/>
+          </a:effectRef>
+          <a:fontRef idx="minor">
+            <a:schemeClr val="tx1"/>
+          </a:fontRef>
+        </p:style>
+      </p:cxnSp>
+      <p:sp>
+        <p:nvSpPr>
+          <p:cNvPr id="105" name="矩形: 圆角 104">
+            <a:extLst>
+              <a:ext uri="{FF2B5EF4-FFF2-40B4-BE49-F238E27FC236}">
+                <a16:creationId xmlns:a16="http://schemas.microsoft.com/office/drawing/2014/main" id="{411AA454-5B27-4FBF-9015-E16777498799}"/>
               </a:ext>
             </a:extLst>
           </p:cNvPr>
@@ -6311,10 +5791,116 @@
         </p:nvSpPr>
         <p:spPr>
           <a:xfrm>
-            <a:off x="7513821" y="2450065"/>
-            <a:ext cx="1187419" cy="465820"/>
+            <a:off x="1499904" y="1886691"/>
+            <a:ext cx="1187419" cy="369332"/>
           </a:xfrm>
           <a:prstGeom prst="roundRect">
+            <a:avLst/>
+          </a:prstGeom>
+        </p:spPr>
+        <p:style>
+          <a:lnRef idx="2">
+            <a:schemeClr val="accent1">
+              <a:shade val="50000"/>
+            </a:schemeClr>
+          </a:lnRef>
+          <a:fillRef idx="1">
+            <a:schemeClr val="accent1"/>
+          </a:fillRef>
+          <a:effectRef idx="0">
+            <a:schemeClr val="accent1"/>
+          </a:effectRef>
+          <a:fontRef idx="minor">
+            <a:schemeClr val="lt1"/>
+          </a:fontRef>
+        </p:style>
+        <p:txBody>
+          <a:bodyPr rtlCol="0" anchor="ctr"/>
+          <a:lstStyle/>
+          <a:p>
+            <a:pPr algn="ctr"/>
+            <a:r>
+              <a:rPr lang="en-US" altLang="zh-CN" sz="1000" dirty="0"/>
+              <a:t>Thread2: </a:t>
+            </a:r>
+          </a:p>
+          <a:p>
+            <a:pPr algn="ctr"/>
+            <a:r>
+              <a:rPr lang="zh-CN" altLang="en-US" sz="1000" dirty="0"/>
+              <a:t>监听</a:t>
+            </a:r>
+            <a:r>
+              <a:rPr lang="en-US" altLang="zh-CN" sz="1000" dirty="0"/>
+              <a:t>Client</a:t>
+            </a:r>
+            <a:r>
+              <a:rPr lang="zh-CN" altLang="en-US" sz="1000" dirty="0"/>
+              <a:t>连接</a:t>
+            </a:r>
+          </a:p>
+        </p:txBody>
+      </p:sp>
+      <p:cxnSp>
+        <p:nvCxnSpPr>
+          <p:cNvPr id="245" name="直接箭头连接符 244">
+            <a:extLst>
+              <a:ext uri="{FF2B5EF4-FFF2-40B4-BE49-F238E27FC236}">
+                <a16:creationId xmlns:a16="http://schemas.microsoft.com/office/drawing/2014/main" id="{5B070183-DDCC-4C6D-9224-B6F2221A49F0}"/>
+              </a:ext>
+            </a:extLst>
+          </p:cNvPr>
+          <p:cNvCxnSpPr>
+            <a:stCxn id="103" idx="3"/>
+            <a:endCxn id="105" idx="1"/>
+          </p:cNvCxnSpPr>
+          <p:nvPr/>
+        </p:nvCxnSpPr>
+        <p:spPr>
+          <a:xfrm>
+            <a:off x="1228898" y="2071357"/>
+            <a:ext cx="271006" cy="0"/>
+          </a:xfrm>
+          <a:prstGeom prst="straightConnector1">
+            <a:avLst/>
+          </a:prstGeom>
+          <a:ln>
+            <a:tailEnd type="triangle"/>
+          </a:ln>
+        </p:spPr>
+        <p:style>
+          <a:lnRef idx="1">
+            <a:schemeClr val="accent1"/>
+          </a:lnRef>
+          <a:fillRef idx="0">
+            <a:schemeClr val="accent1"/>
+          </a:fillRef>
+          <a:effectRef idx="0">
+            <a:schemeClr val="accent1"/>
+          </a:effectRef>
+          <a:fontRef idx="minor">
+            <a:schemeClr val="tx1"/>
+          </a:fontRef>
+        </p:style>
+      </p:cxnSp>
+      <p:sp>
+        <p:nvSpPr>
+          <p:cNvPr id="111" name="矩形 110">
+            <a:extLst>
+              <a:ext uri="{FF2B5EF4-FFF2-40B4-BE49-F238E27FC236}">
+                <a16:creationId xmlns:a16="http://schemas.microsoft.com/office/drawing/2014/main" id="{550574D1-B885-4278-AE83-8EC0113E6264}"/>
+              </a:ext>
+            </a:extLst>
+          </p:cNvPr>
+          <p:cNvSpPr/>
+          <p:nvPr/>
+        </p:nvSpPr>
+        <p:spPr>
+          <a:xfrm>
+            <a:off x="9176423" y="4388343"/>
+            <a:ext cx="1187416" cy="285750"/>
+          </a:xfrm>
+          <a:prstGeom prst="rect">
             <a:avLst/>
           </a:prstGeom>
           <a:solidFill>
@@ -6345,113 +5931,23 @@
           <a:p>
             <a:pPr algn="ctr"/>
             <a:r>
+              <a:rPr lang="zh-CN" altLang="en-US" sz="1000" dirty="0"/>
+              <a:t>尝试建立连接</a:t>
+            </a:r>
+            <a:r>
               <a:rPr lang="en-US" altLang="zh-CN" sz="1000" dirty="0"/>
-              <a:t>Thread2: </a:t>
-            </a:r>
-          </a:p>
-          <a:p>
-            <a:pPr algn="ctr"/>
-            <a:r>
-              <a:rPr lang="zh-CN" altLang="en-US" sz="1000" dirty="0"/>
-              <a:t>监听文件夹状态状态</a:t>
-            </a:r>
-          </a:p>
-        </p:txBody>
-      </p:sp>
-      <p:cxnSp>
-        <p:nvCxnSpPr>
-          <p:cNvPr id="195" name="直接箭头连接符 194">
-            <a:extLst>
-              <a:ext uri="{FF2B5EF4-FFF2-40B4-BE49-F238E27FC236}">
-                <a16:creationId xmlns:a16="http://schemas.microsoft.com/office/drawing/2014/main" id="{FD985504-EC8B-4AC0-BA38-AD5E688247CF}"/>
-              </a:ext>
-            </a:extLst>
-          </p:cNvPr>
-          <p:cNvCxnSpPr>
-            <a:stCxn id="192" idx="2"/>
-            <a:endCxn id="174" idx="0"/>
-          </p:cNvCxnSpPr>
-          <p:nvPr/>
-        </p:nvCxnSpPr>
-        <p:spPr>
-          <a:xfrm flipH="1">
-            <a:off x="8107530" y="2915885"/>
-            <a:ext cx="1" cy="328033"/>
-          </a:xfrm>
-          <a:prstGeom prst="straightConnector1">
-            <a:avLst/>
-          </a:prstGeom>
-          <a:ln>
-            <a:tailEnd type="triangle"/>
-          </a:ln>
-        </p:spPr>
-        <p:style>
-          <a:lnRef idx="1">
-            <a:schemeClr val="accent1"/>
-          </a:lnRef>
-          <a:fillRef idx="0">
-            <a:schemeClr val="accent1"/>
-          </a:fillRef>
-          <a:effectRef idx="0">
-            <a:schemeClr val="accent1"/>
-          </a:effectRef>
-          <a:fontRef idx="minor">
-            <a:schemeClr val="tx1"/>
-          </a:fontRef>
-        </p:style>
-      </p:cxnSp>
-      <p:cxnSp>
-        <p:nvCxnSpPr>
-          <p:cNvPr id="203" name="连接符: 肘形 202">
-            <a:extLst>
-              <a:ext uri="{FF2B5EF4-FFF2-40B4-BE49-F238E27FC236}">
-                <a16:creationId xmlns:a16="http://schemas.microsoft.com/office/drawing/2014/main" id="{B039E4DF-CDFE-4CC0-987C-5226E9128660}"/>
-              </a:ext>
-            </a:extLst>
-          </p:cNvPr>
-          <p:cNvCxnSpPr>
-            <a:stCxn id="97" idx="2"/>
-            <a:endCxn id="192" idx="0"/>
-          </p:cNvCxnSpPr>
-          <p:nvPr/>
-        </p:nvCxnSpPr>
-        <p:spPr>
-          <a:xfrm rot="5400000" flipH="1">
-            <a:off x="8888500" y="1669097"/>
-            <a:ext cx="1906515" cy="3468453"/>
-          </a:xfrm>
-          <a:prstGeom prst="bentConnector5">
-            <a:avLst>
-              <a:gd name="adj1" fmla="val -6402"/>
-              <a:gd name="adj2" fmla="val 78923"/>
-              <a:gd name="adj3" fmla="val 111990"/>
-            </a:avLst>
-          </a:prstGeom>
-          <a:ln>
-            <a:tailEnd type="triangle"/>
-          </a:ln>
-        </p:spPr>
-        <p:style>
-          <a:lnRef idx="1">
-            <a:schemeClr val="accent1"/>
-          </a:lnRef>
-          <a:fillRef idx="0">
-            <a:schemeClr val="accent1"/>
-          </a:fillRef>
-          <a:effectRef idx="0">
-            <a:schemeClr val="accent1"/>
-          </a:effectRef>
-          <a:fontRef idx="minor">
-            <a:schemeClr val="tx1"/>
-          </a:fontRef>
-        </p:style>
-      </p:cxnSp>
-      <p:sp>
-        <p:nvSpPr>
-          <p:cNvPr id="225" name="矩形 224">
-            <a:extLst>
-              <a:ext uri="{FF2B5EF4-FFF2-40B4-BE49-F238E27FC236}">
-                <a16:creationId xmlns:a16="http://schemas.microsoft.com/office/drawing/2014/main" id="{9047DACD-CDA7-4129-BB11-FC7BD9DAF26B}"/>
+              <a:t>?</a:t>
+            </a:r>
+            <a:endParaRPr lang="zh-CN" altLang="en-US" sz="1000" dirty="0"/>
+          </a:p>
+        </p:txBody>
+      </p:sp>
+      <p:sp>
+        <p:nvSpPr>
+          <p:cNvPr id="120" name="矩形: 圆角 119">
+            <a:extLst>
+              <a:ext uri="{FF2B5EF4-FFF2-40B4-BE49-F238E27FC236}">
+                <a16:creationId xmlns:a16="http://schemas.microsoft.com/office/drawing/2014/main" id="{8F06B483-173A-4357-B775-04AB5567CC06}"/>
               </a:ext>
             </a:extLst>
           </p:cNvPr>
@@ -6460,10 +5956,10 @@
         </p:nvSpPr>
         <p:spPr>
           <a:xfrm>
-            <a:off x="7550813" y="3981754"/>
-            <a:ext cx="457167" cy="285750"/>
-          </a:xfrm>
-          <a:prstGeom prst="rect">
+            <a:off x="9151691" y="1534894"/>
+            <a:ext cx="1187419" cy="396359"/>
+          </a:xfrm>
+          <a:prstGeom prst="roundRect">
             <a:avLst/>
           </a:prstGeom>
           <a:solidFill>
@@ -6494,18 +5990,29 @@
           <a:p>
             <a:pPr algn="ctr"/>
             <a:r>
+              <a:rPr lang="en-US" altLang="zh-CN" sz="1000" dirty="0"/>
+              <a:t>Thread1: </a:t>
+            </a:r>
+          </a:p>
+          <a:p>
+            <a:pPr algn="ctr"/>
+            <a:r>
+              <a:rPr lang="en-US" altLang="zh-CN" sz="1000" dirty="0"/>
+              <a:t>Client</a:t>
+            </a:r>
+            <a:r>
               <a:rPr lang="zh-CN" altLang="en-US" sz="1000" dirty="0"/>
-              <a:t>添加</a:t>
-            </a:r>
-          </a:p>
-        </p:txBody>
-      </p:sp>
-      <p:sp>
-        <p:nvSpPr>
-          <p:cNvPr id="226" name="矩形 225">
-            <a:extLst>
-              <a:ext uri="{FF2B5EF4-FFF2-40B4-BE49-F238E27FC236}">
-                <a16:creationId xmlns:a16="http://schemas.microsoft.com/office/drawing/2014/main" id="{17135D35-25CA-4722-84BA-45DC410CD51D}"/>
+              <a:t>线程</a:t>
+            </a:r>
+          </a:p>
+        </p:txBody>
+      </p:sp>
+      <p:sp>
+        <p:nvSpPr>
+          <p:cNvPr id="133" name="矩形: 圆角 132">
+            <a:extLst>
+              <a:ext uri="{FF2B5EF4-FFF2-40B4-BE49-F238E27FC236}">
+                <a16:creationId xmlns:a16="http://schemas.microsoft.com/office/drawing/2014/main" id="{CB78BF90-A5EB-4C52-B5ED-5E831EDD9539}"/>
               </a:ext>
             </a:extLst>
           </p:cNvPr>
@@ -6514,10 +6021,10 @@
         </p:nvSpPr>
         <p:spPr>
           <a:xfrm>
-            <a:off x="8220881" y="3976066"/>
-            <a:ext cx="457167" cy="285750"/>
-          </a:xfrm>
-          <a:prstGeom prst="rect">
+            <a:off x="9161737" y="2246715"/>
+            <a:ext cx="1187419" cy="396359"/>
+          </a:xfrm>
+          <a:prstGeom prst="roundRect">
             <a:avLst/>
           </a:prstGeom>
           <a:solidFill>
@@ -6548,33 +6055,40 @@
           <a:p>
             <a:pPr algn="ctr"/>
             <a:r>
+              <a:rPr lang="en-US" altLang="zh-CN" sz="1000" dirty="0"/>
+              <a:t>Thread1.1: </a:t>
+            </a:r>
+          </a:p>
+          <a:p>
+            <a:pPr algn="ctr"/>
+            <a:r>
               <a:rPr lang="zh-CN" altLang="en-US" sz="1000" dirty="0"/>
-              <a:t>修改</a:t>
+              <a:t>监听局域网状态</a:t>
             </a:r>
           </a:p>
         </p:txBody>
       </p:sp>
       <p:cxnSp>
         <p:nvCxnSpPr>
-          <p:cNvPr id="228" name="连接符: 肘形 227">
-            <a:extLst>
-              <a:ext uri="{FF2B5EF4-FFF2-40B4-BE49-F238E27FC236}">
-                <a16:creationId xmlns:a16="http://schemas.microsoft.com/office/drawing/2014/main" id="{50E410C5-881A-4487-9D43-2FD0B2AD7F09}"/>
+          <p:cNvPr id="63" name="直接箭头连接符 62">
+            <a:extLst>
+              <a:ext uri="{FF2B5EF4-FFF2-40B4-BE49-F238E27FC236}">
+                <a16:creationId xmlns:a16="http://schemas.microsoft.com/office/drawing/2014/main" id="{8C9D61DB-50FF-442E-8518-AAC93FCDDFB6}"/>
               </a:ext>
             </a:extLst>
           </p:cNvPr>
           <p:cNvCxnSpPr>
-            <a:stCxn id="174" idx="2"/>
-            <a:endCxn id="225" idx="0"/>
+            <a:stCxn id="133" idx="2"/>
+            <a:endCxn id="92" idx="0"/>
           </p:cNvCxnSpPr>
           <p:nvPr/>
         </p:nvCxnSpPr>
         <p:spPr>
-          <a:xfrm rot="5400000">
-            <a:off x="7717421" y="3591645"/>
-            <a:ext cx="452086" cy="328133"/>
-          </a:xfrm>
-          <a:prstGeom prst="bentConnector3">
+          <a:xfrm>
+            <a:off x="9755447" y="2643074"/>
+            <a:ext cx="14684" cy="686537"/>
+          </a:xfrm>
+          <a:prstGeom prst="straightConnector1">
             <a:avLst/>
           </a:prstGeom>
           <a:ln>
@@ -6598,25 +6112,25 @@
       </p:cxnSp>
       <p:cxnSp>
         <p:nvCxnSpPr>
-          <p:cNvPr id="230" name="连接符: 肘形 229">
-            <a:extLst>
-              <a:ext uri="{FF2B5EF4-FFF2-40B4-BE49-F238E27FC236}">
-                <a16:creationId xmlns:a16="http://schemas.microsoft.com/office/drawing/2014/main" id="{EF8456BC-7AFA-4E98-BBBB-4BE169CE1242}"/>
+          <p:cNvPr id="268" name="直接箭头连接符 267">
+            <a:extLst>
+              <a:ext uri="{FF2B5EF4-FFF2-40B4-BE49-F238E27FC236}">
+                <a16:creationId xmlns:a16="http://schemas.microsoft.com/office/drawing/2014/main" id="{70FB4AC9-8FBA-4BA2-A570-9DC22B0413D6}"/>
               </a:ext>
             </a:extLst>
           </p:cNvPr>
           <p:cNvCxnSpPr>
-            <a:stCxn id="174" idx="2"/>
-            <a:endCxn id="226" idx="0"/>
+            <a:stCxn id="120" idx="2"/>
+            <a:endCxn id="133" idx="0"/>
           </p:cNvCxnSpPr>
           <p:nvPr/>
         </p:nvCxnSpPr>
         <p:spPr>
-          <a:xfrm rot="16200000" flipH="1">
-            <a:off x="8055298" y="3581899"/>
-            <a:ext cx="446398" cy="341935"/>
-          </a:xfrm>
-          <a:prstGeom prst="bentConnector3">
+          <a:xfrm>
+            <a:off x="9745401" y="1931253"/>
+            <a:ext cx="10046" cy="315462"/>
+          </a:xfrm>
+          <a:prstGeom prst="straightConnector1">
             <a:avLst/>
           </a:prstGeom>
           <a:ln>
@@ -6638,12 +6152,56 @@
           </a:fontRef>
         </p:style>
       </p:cxnSp>
-      <p:sp>
-        <p:nvSpPr>
-          <p:cNvPr id="252" name="矩形: 圆角 251">
-            <a:extLst>
-              <a:ext uri="{FF2B5EF4-FFF2-40B4-BE49-F238E27FC236}">
-                <a16:creationId xmlns:a16="http://schemas.microsoft.com/office/drawing/2014/main" id="{FD4293A4-F64D-4347-86C5-5AD11099B5D7}"/>
+      <p:cxnSp>
+        <p:nvCxnSpPr>
+          <p:cNvPr id="274" name="连接符: 肘形 273">
+            <a:extLst>
+              <a:ext uri="{FF2B5EF4-FFF2-40B4-BE49-F238E27FC236}">
+                <a16:creationId xmlns:a16="http://schemas.microsoft.com/office/drawing/2014/main" id="{D6F814CE-D6C9-4217-A036-47B3ED287CAC}"/>
+              </a:ext>
+            </a:extLst>
+          </p:cNvPr>
+          <p:cNvCxnSpPr>
+            <a:stCxn id="120" idx="3"/>
+            <a:endCxn id="111" idx="3"/>
+          </p:cNvCxnSpPr>
+          <p:nvPr/>
+        </p:nvCxnSpPr>
+        <p:spPr>
+          <a:xfrm>
+            <a:off x="10339110" y="1733074"/>
+            <a:ext cx="24729" cy="2798144"/>
+          </a:xfrm>
+          <a:prstGeom prst="bentConnector3">
+            <a:avLst>
+              <a:gd name="adj1" fmla="val 1562918"/>
+            </a:avLst>
+          </a:prstGeom>
+          <a:ln>
+            <a:tailEnd type="triangle"/>
+          </a:ln>
+        </p:spPr>
+        <p:style>
+          <a:lnRef idx="1">
+            <a:schemeClr val="accent1"/>
+          </a:lnRef>
+          <a:fillRef idx="0">
+            <a:schemeClr val="accent1"/>
+          </a:fillRef>
+          <a:effectRef idx="0">
+            <a:schemeClr val="accent1"/>
+          </a:effectRef>
+          <a:fontRef idx="minor">
+            <a:schemeClr val="tx1"/>
+          </a:fontRef>
+        </p:style>
+      </p:cxnSp>
+      <p:sp>
+        <p:nvSpPr>
+          <p:cNvPr id="156" name="矩形 155">
+            <a:extLst>
+              <a:ext uri="{FF2B5EF4-FFF2-40B4-BE49-F238E27FC236}">
+                <a16:creationId xmlns:a16="http://schemas.microsoft.com/office/drawing/2014/main" id="{222DF503-7587-479C-844C-E3E0F3F26BBF}"/>
               </a:ext>
             </a:extLst>
           </p:cNvPr>
@@ -6652,10 +6210,10 @@
         </p:nvSpPr>
         <p:spPr>
           <a:xfrm>
-            <a:off x="8867924" y="5488081"/>
-            <a:ext cx="1187419" cy="465820"/>
-          </a:xfrm>
-          <a:prstGeom prst="roundRect">
+            <a:off x="9176423" y="3738673"/>
+            <a:ext cx="1187416" cy="285750"/>
+          </a:xfrm>
+          <a:prstGeom prst="rect">
             <a:avLst/>
           </a:prstGeom>
           <a:solidFill>
@@ -6686,40 +6244,38 @@
           <a:p>
             <a:pPr algn="ctr"/>
             <a:r>
+              <a:rPr lang="zh-CN" altLang="en-US" sz="1000" dirty="0"/>
+              <a:t>告知</a:t>
+            </a:r>
+            <a:r>
               <a:rPr lang="en-US" altLang="zh-CN" sz="1000" dirty="0"/>
-              <a:t>Thread3: </a:t>
-            </a:r>
-          </a:p>
-          <a:p>
-            <a:pPr algn="ctr"/>
-            <a:r>
-              <a:rPr lang="zh-CN" altLang="en-US" sz="1000" dirty="0"/>
-              <a:t>监听下载请求（用户发出）</a:t>
-            </a:r>
+              <a:t>Thread1</a:t>
+            </a:r>
+            <a:endParaRPr lang="zh-CN" altLang="en-US" sz="1000" dirty="0"/>
           </a:p>
         </p:txBody>
       </p:sp>
       <p:cxnSp>
         <p:nvCxnSpPr>
-          <p:cNvPr id="254" name="连接符: 肘形 253">
-            <a:extLst>
-              <a:ext uri="{FF2B5EF4-FFF2-40B4-BE49-F238E27FC236}">
-                <a16:creationId xmlns:a16="http://schemas.microsoft.com/office/drawing/2014/main" id="{A4F7BA67-8341-4628-BFC5-74BF0114196F}"/>
+          <p:cNvPr id="279" name="直接箭头连接符 278">
+            <a:extLst>
+              <a:ext uri="{FF2B5EF4-FFF2-40B4-BE49-F238E27FC236}">
+                <a16:creationId xmlns:a16="http://schemas.microsoft.com/office/drawing/2014/main" id="{1F155A7D-BC04-4BDA-AB74-41A14430D0DE}"/>
               </a:ext>
             </a:extLst>
           </p:cNvPr>
           <p:cNvCxnSpPr>
-            <a:stCxn id="97" idx="2"/>
-            <a:endCxn id="252" idx="3"/>
+            <a:stCxn id="92" idx="2"/>
+            <a:endCxn id="156" idx="0"/>
           </p:cNvCxnSpPr>
           <p:nvPr/>
         </p:nvCxnSpPr>
         <p:spPr>
-          <a:xfrm rot="5400000">
-            <a:off x="10133459" y="4278465"/>
-            <a:ext cx="1364411" cy="1520641"/>
-          </a:xfrm>
-          <a:prstGeom prst="bentConnector2">
+          <a:xfrm>
+            <a:off x="9770131" y="3615361"/>
+            <a:ext cx="0" cy="123312"/>
+          </a:xfrm>
+          <a:prstGeom prst="straightConnector1">
             <a:avLst/>
           </a:prstGeom>
           <a:ln>
@@ -6743,26 +6299,28 @@
       </p:cxnSp>
       <p:cxnSp>
         <p:nvCxnSpPr>
-          <p:cNvPr id="257" name="连接符: 肘形 256">
-            <a:extLst>
-              <a:ext uri="{FF2B5EF4-FFF2-40B4-BE49-F238E27FC236}">
-                <a16:creationId xmlns:a16="http://schemas.microsoft.com/office/drawing/2014/main" id="{716FB4CD-404D-43A9-AC8C-639C6A7A5AED}"/>
+          <p:cNvPr id="281" name="连接符: 肘形 280">
+            <a:extLst>
+              <a:ext uri="{FF2B5EF4-FFF2-40B4-BE49-F238E27FC236}">
+                <a16:creationId xmlns:a16="http://schemas.microsoft.com/office/drawing/2014/main" id="{60EE2A5B-A886-4A11-AFF9-F581765E5B65}"/>
               </a:ext>
             </a:extLst>
           </p:cNvPr>
           <p:cNvCxnSpPr>
-            <a:stCxn id="252" idx="1"/>
-            <a:endCxn id="131" idx="3"/>
+            <a:stCxn id="92" idx="3"/>
+            <a:endCxn id="133" idx="3"/>
           </p:cNvCxnSpPr>
           <p:nvPr/>
         </p:nvCxnSpPr>
         <p:spPr>
-          <a:xfrm rot="10800000" flipV="1">
-            <a:off x="5446304" y="5720990"/>
-            <a:ext cx="3421621" cy="1"/>
+          <a:xfrm flipH="1" flipV="1">
+            <a:off x="10349156" y="2444895"/>
+            <a:ext cx="14683" cy="1027591"/>
           </a:xfrm>
           <a:prstGeom prst="bentConnector3">
-            <a:avLst/>
+            <a:avLst>
+              <a:gd name="adj1" fmla="val -1556903"/>
+            </a:avLst>
           </a:prstGeom>
           <a:ln>
             <a:tailEnd type="triangle"/>
@@ -6785,26 +6343,70 @@
       </p:cxnSp>
       <p:cxnSp>
         <p:nvCxnSpPr>
-          <p:cNvPr id="261" name="连接符: 肘形 260">
-            <a:extLst>
-              <a:ext uri="{FF2B5EF4-FFF2-40B4-BE49-F238E27FC236}">
-                <a16:creationId xmlns:a16="http://schemas.microsoft.com/office/drawing/2014/main" id="{AD8C214D-8953-47AC-A28B-D0D64FE3D967}"/>
+          <p:cNvPr id="285" name="直接连接符 284">
+            <a:extLst>
+              <a:ext uri="{FF2B5EF4-FFF2-40B4-BE49-F238E27FC236}">
+                <a16:creationId xmlns:a16="http://schemas.microsoft.com/office/drawing/2014/main" id="{D1016A88-5AFE-499C-9142-09D916D67F39}"/>
               </a:ext>
             </a:extLst>
           </p:cNvPr>
           <p:cNvCxnSpPr>
-            <a:stCxn id="225" idx="2"/>
-            <a:endCxn id="131" idx="3"/>
+            <a:stCxn id="156" idx="2"/>
+            <a:endCxn id="111" idx="0"/>
           </p:cNvCxnSpPr>
           <p:nvPr/>
         </p:nvCxnSpPr>
         <p:spPr>
-          <a:xfrm rot="5400000">
-            <a:off x="5886106" y="3827701"/>
-            <a:ext cx="1453488" cy="2333094"/>
-          </a:xfrm>
-          <a:prstGeom prst="bentConnector2">
-            <a:avLst/>
+          <a:xfrm>
+            <a:off x="9770131" y="4024423"/>
+            <a:ext cx="0" cy="363920"/>
+          </a:xfrm>
+          <a:prstGeom prst="line">
+            <a:avLst/>
+          </a:prstGeom>
+          <a:ln>
+            <a:prstDash val="dash"/>
+          </a:ln>
+        </p:spPr>
+        <p:style>
+          <a:lnRef idx="1">
+            <a:schemeClr val="accent1"/>
+          </a:lnRef>
+          <a:fillRef idx="0">
+            <a:schemeClr val="accent1"/>
+          </a:fillRef>
+          <a:effectRef idx="0">
+            <a:schemeClr val="accent1"/>
+          </a:effectRef>
+          <a:fontRef idx="minor">
+            <a:schemeClr val="tx1"/>
+          </a:fontRef>
+        </p:style>
+      </p:cxnSp>
+      <p:cxnSp>
+        <p:nvCxnSpPr>
+          <p:cNvPr id="65" name="连接符: 肘形 64">
+            <a:extLst>
+              <a:ext uri="{FF2B5EF4-FFF2-40B4-BE49-F238E27FC236}">
+                <a16:creationId xmlns:a16="http://schemas.microsoft.com/office/drawing/2014/main" id="{BED1933F-B92B-4B43-9E43-47303034D2EA}"/>
+              </a:ext>
+            </a:extLst>
+          </p:cNvPr>
+          <p:cNvCxnSpPr>
+            <a:stCxn id="111" idx="1"/>
+            <a:endCxn id="133" idx="1"/>
+          </p:cNvCxnSpPr>
+          <p:nvPr/>
+        </p:nvCxnSpPr>
+        <p:spPr>
+          <a:xfrm rot="10800000">
+            <a:off x="9161737" y="2444896"/>
+            <a:ext cx="14686" cy="2086323"/>
+          </a:xfrm>
+          <a:prstGeom prst="bentConnector3">
+            <a:avLst>
+              <a:gd name="adj1" fmla="val 1656585"/>
+            </a:avLst>
           </a:prstGeom>
           <a:ln>
             <a:tailEnd type="triangle"/>
@@ -6827,26 +6429,29 @@
       </p:cxnSp>
       <p:cxnSp>
         <p:nvCxnSpPr>
-          <p:cNvPr id="263" name="连接符: 肘形 262">
-            <a:extLst>
-              <a:ext uri="{FF2B5EF4-FFF2-40B4-BE49-F238E27FC236}">
-                <a16:creationId xmlns:a16="http://schemas.microsoft.com/office/drawing/2014/main" id="{D251ECB2-B935-47B4-A4F5-6FFBCCF04470}"/>
+          <p:cNvPr id="75" name="连接符: 肘形 74">
+            <a:extLst>
+              <a:ext uri="{FF2B5EF4-FFF2-40B4-BE49-F238E27FC236}">
+                <a16:creationId xmlns:a16="http://schemas.microsoft.com/office/drawing/2014/main" id="{59C0F857-9D1E-478C-8746-B823FB29BAD2}"/>
               </a:ext>
             </a:extLst>
           </p:cNvPr>
           <p:cNvCxnSpPr>
-            <a:stCxn id="226" idx="2"/>
-            <a:endCxn id="131" idx="3"/>
+            <a:cxnSpLocks/>
+            <a:stCxn id="120" idx="2"/>
+            <a:endCxn id="192" idx="0"/>
           </p:cNvCxnSpPr>
           <p:nvPr/>
         </p:nvCxnSpPr>
         <p:spPr>
           <a:xfrm rot="5400000">
-            <a:off x="6218296" y="3489823"/>
-            <a:ext cx="1459176" cy="3003162"/>
-          </a:xfrm>
-          <a:prstGeom prst="bentConnector2">
-            <a:avLst/>
+            <a:off x="8749231" y="1250545"/>
+            <a:ext cx="315462" cy="1676879"/>
+          </a:xfrm>
+          <a:prstGeom prst="bentConnector3">
+            <a:avLst>
+              <a:gd name="adj1" fmla="val 50000"/>
+            </a:avLst>
           </a:prstGeom>
           <a:ln>
             <a:tailEnd type="triangle"/>
@@ -6867,6 +6472,1221 @@
           </a:fontRef>
         </p:style>
       </p:cxnSp>
+      <p:sp>
+        <p:nvSpPr>
+          <p:cNvPr id="188" name="矩形 187">
+            <a:extLst>
+              <a:ext uri="{FF2B5EF4-FFF2-40B4-BE49-F238E27FC236}">
+                <a16:creationId xmlns:a16="http://schemas.microsoft.com/office/drawing/2014/main" id="{9BFC6542-9CC8-40B9-9C6D-5D02C6A89670}"/>
+              </a:ext>
+            </a:extLst>
+          </p:cNvPr>
+          <p:cNvSpPr/>
+          <p:nvPr/>
+        </p:nvSpPr>
+        <p:spPr>
+          <a:xfrm>
+            <a:off x="7655269" y="4110629"/>
+            <a:ext cx="826506" cy="414485"/>
+          </a:xfrm>
+          <a:prstGeom prst="rect">
+            <a:avLst/>
+          </a:prstGeom>
+          <a:solidFill>
+            <a:schemeClr val="accent6">
+              <a:lumMod val="75000"/>
+            </a:schemeClr>
+          </a:solidFill>
+        </p:spPr>
+        <p:style>
+          <a:lnRef idx="2">
+            <a:schemeClr val="accent1">
+              <a:shade val="50000"/>
+            </a:schemeClr>
+          </a:lnRef>
+          <a:fillRef idx="1">
+            <a:schemeClr val="accent1"/>
+          </a:fillRef>
+          <a:effectRef idx="0">
+            <a:schemeClr val="accent1"/>
+          </a:effectRef>
+          <a:fontRef idx="minor">
+            <a:schemeClr val="lt1"/>
+          </a:fontRef>
+        </p:style>
+        <p:txBody>
+          <a:bodyPr rtlCol="0" anchor="ctr"/>
+          <a:lstStyle/>
+          <a:p>
+            <a:pPr algn="ctr"/>
+            <a:r>
+              <a:rPr lang="zh-CN" altLang="en-US" sz="1000" dirty="0"/>
+              <a:t>更新状态至参数文件</a:t>
+            </a:r>
+          </a:p>
+        </p:txBody>
+      </p:sp>
+      <p:cxnSp>
+        <p:nvCxnSpPr>
+          <p:cNvPr id="104" name="连接符: 肘形 103">
+            <a:extLst>
+              <a:ext uri="{FF2B5EF4-FFF2-40B4-BE49-F238E27FC236}">
+                <a16:creationId xmlns:a16="http://schemas.microsoft.com/office/drawing/2014/main" id="{D43A5FB1-D7F7-478F-B316-AC33867F8DD3}"/>
+              </a:ext>
+            </a:extLst>
+          </p:cNvPr>
+          <p:cNvCxnSpPr>
+            <a:cxnSpLocks/>
+            <a:stCxn id="225" idx="2"/>
+            <a:endCxn id="188" idx="0"/>
+          </p:cNvCxnSpPr>
+          <p:nvPr/>
+        </p:nvCxnSpPr>
+        <p:spPr>
+          <a:xfrm rot="16200000" flipH="1">
+            <a:off x="7753585" y="3795691"/>
+            <a:ext cx="304229" cy="325645"/>
+          </a:xfrm>
+          <a:prstGeom prst="bentConnector3">
+            <a:avLst/>
+          </a:prstGeom>
+          <a:ln>
+            <a:tailEnd type="triangle"/>
+          </a:ln>
+        </p:spPr>
+        <p:style>
+          <a:lnRef idx="1">
+            <a:schemeClr val="accent1"/>
+          </a:lnRef>
+          <a:fillRef idx="0">
+            <a:schemeClr val="accent1"/>
+          </a:fillRef>
+          <a:effectRef idx="0">
+            <a:schemeClr val="accent1"/>
+          </a:effectRef>
+          <a:fontRef idx="minor">
+            <a:schemeClr val="tx1"/>
+          </a:fontRef>
+        </p:style>
+      </p:cxnSp>
+      <p:cxnSp>
+        <p:nvCxnSpPr>
+          <p:cNvPr id="107" name="连接符: 肘形 106">
+            <a:extLst>
+              <a:ext uri="{FF2B5EF4-FFF2-40B4-BE49-F238E27FC236}">
+                <a16:creationId xmlns:a16="http://schemas.microsoft.com/office/drawing/2014/main" id="{1D50E8F8-155D-42D0-96A5-4AC36D001137}"/>
+              </a:ext>
+            </a:extLst>
+          </p:cNvPr>
+          <p:cNvCxnSpPr>
+            <a:cxnSpLocks/>
+            <a:stCxn id="226" idx="2"/>
+            <a:endCxn id="188" idx="0"/>
+          </p:cNvCxnSpPr>
+          <p:nvPr/>
+        </p:nvCxnSpPr>
+        <p:spPr>
+          <a:xfrm rot="5400000">
+            <a:off x="8082823" y="3792100"/>
+            <a:ext cx="304229" cy="332829"/>
+          </a:xfrm>
+          <a:prstGeom prst="bentConnector3">
+            <a:avLst/>
+          </a:prstGeom>
+          <a:ln>
+            <a:tailEnd type="triangle"/>
+          </a:ln>
+        </p:spPr>
+        <p:style>
+          <a:lnRef idx="1">
+            <a:schemeClr val="accent1"/>
+          </a:lnRef>
+          <a:fillRef idx="0">
+            <a:schemeClr val="accent1"/>
+          </a:fillRef>
+          <a:effectRef idx="0">
+            <a:schemeClr val="accent1"/>
+          </a:effectRef>
+          <a:fontRef idx="minor">
+            <a:schemeClr val="tx1"/>
+          </a:fontRef>
+        </p:style>
+      </p:cxnSp>
+      <p:sp>
+        <p:nvSpPr>
+          <p:cNvPr id="197" name="矩形 196">
+            <a:extLst>
+              <a:ext uri="{FF2B5EF4-FFF2-40B4-BE49-F238E27FC236}">
+                <a16:creationId xmlns:a16="http://schemas.microsoft.com/office/drawing/2014/main" id="{8FD88093-7AA8-409D-AC78-9B0DB415BE29}"/>
+              </a:ext>
+            </a:extLst>
+          </p:cNvPr>
+          <p:cNvSpPr/>
+          <p:nvPr/>
+        </p:nvSpPr>
+        <p:spPr>
+          <a:xfrm>
+            <a:off x="7605873" y="719312"/>
+            <a:ext cx="1233128" cy="285750"/>
+          </a:xfrm>
+          <a:prstGeom prst="rect">
+            <a:avLst/>
+          </a:prstGeom>
+          <a:solidFill>
+            <a:schemeClr val="accent6">
+              <a:lumMod val="75000"/>
+            </a:schemeClr>
+          </a:solidFill>
+        </p:spPr>
+        <p:style>
+          <a:lnRef idx="2">
+            <a:schemeClr val="accent1">
+              <a:shade val="50000"/>
+            </a:schemeClr>
+          </a:lnRef>
+          <a:fillRef idx="1">
+            <a:schemeClr val="accent1"/>
+          </a:fillRef>
+          <a:effectRef idx="0">
+            <a:schemeClr val="accent1"/>
+          </a:effectRef>
+          <a:fontRef idx="minor">
+            <a:schemeClr val="lt1"/>
+          </a:fontRef>
+        </p:style>
+        <p:txBody>
+          <a:bodyPr rtlCol="0" anchor="ctr"/>
+          <a:lstStyle/>
+          <a:p>
+            <a:pPr algn="ctr"/>
+            <a:r>
+              <a:rPr lang="zh-CN" altLang="en-US" sz="1000" dirty="0"/>
+              <a:t>配置文件状态参数</a:t>
+            </a:r>
+          </a:p>
+        </p:txBody>
+      </p:sp>
+      <p:cxnSp>
+        <p:nvCxnSpPr>
+          <p:cNvPr id="123" name="连接符: 肘形 122">
+            <a:extLst>
+              <a:ext uri="{FF2B5EF4-FFF2-40B4-BE49-F238E27FC236}">
+                <a16:creationId xmlns:a16="http://schemas.microsoft.com/office/drawing/2014/main" id="{AA1658BD-5930-46B8-8743-5E146978DBAE}"/>
+              </a:ext>
+            </a:extLst>
+          </p:cNvPr>
+          <p:cNvCxnSpPr>
+            <a:stCxn id="57" idx="1"/>
+            <a:endCxn id="81" idx="3"/>
+          </p:cNvCxnSpPr>
+          <p:nvPr/>
+        </p:nvCxnSpPr>
+        <p:spPr>
+          <a:xfrm rot="10800000">
+            <a:off x="8831634" y="142875"/>
+            <a:ext cx="855690" cy="627478"/>
+          </a:xfrm>
+          <a:prstGeom prst="bentConnector3">
+            <a:avLst/>
+          </a:prstGeom>
+          <a:ln>
+            <a:tailEnd type="triangle"/>
+          </a:ln>
+        </p:spPr>
+        <p:style>
+          <a:lnRef idx="1">
+            <a:schemeClr val="accent1"/>
+          </a:lnRef>
+          <a:fillRef idx="0">
+            <a:schemeClr val="accent1"/>
+          </a:fillRef>
+          <a:effectRef idx="0">
+            <a:schemeClr val="accent1"/>
+          </a:effectRef>
+          <a:fontRef idx="minor">
+            <a:schemeClr val="tx1"/>
+          </a:fontRef>
+        </p:style>
+      </p:cxnSp>
+      <p:sp>
+        <p:nvSpPr>
+          <p:cNvPr id="205" name="矩形 204">
+            <a:extLst>
+              <a:ext uri="{FF2B5EF4-FFF2-40B4-BE49-F238E27FC236}">
+                <a16:creationId xmlns:a16="http://schemas.microsoft.com/office/drawing/2014/main" id="{697BFF7A-721B-4936-AB93-348D3C5090CC}"/>
+              </a:ext>
+            </a:extLst>
+          </p:cNvPr>
+          <p:cNvSpPr/>
+          <p:nvPr/>
+        </p:nvSpPr>
+        <p:spPr>
+          <a:xfrm>
+            <a:off x="4927215" y="0"/>
+            <a:ext cx="1341736" cy="285750"/>
+          </a:xfrm>
+          <a:prstGeom prst="rect">
+            <a:avLst/>
+          </a:prstGeom>
+          <a:solidFill>
+            <a:srgbClr val="C00000"/>
+          </a:solidFill>
+        </p:spPr>
+        <p:style>
+          <a:lnRef idx="2">
+            <a:schemeClr val="accent1">
+              <a:shade val="50000"/>
+            </a:schemeClr>
+          </a:lnRef>
+          <a:fillRef idx="1">
+            <a:schemeClr val="accent1"/>
+          </a:fillRef>
+          <a:effectRef idx="0">
+            <a:schemeClr val="accent1"/>
+          </a:effectRef>
+          <a:fontRef idx="minor">
+            <a:schemeClr val="lt1"/>
+          </a:fontRef>
+        </p:style>
+        <p:txBody>
+          <a:bodyPr rtlCol="0" anchor="ctr"/>
+          <a:lstStyle/>
+          <a:p>
+            <a:pPr algn="ctr"/>
+            <a:r>
+              <a:rPr lang="zh-CN" altLang="en-US" sz="1000" dirty="0"/>
+              <a:t>使用二维码密钥交换</a:t>
+            </a:r>
+          </a:p>
+        </p:txBody>
+      </p:sp>
+      <p:cxnSp>
+        <p:nvCxnSpPr>
+          <p:cNvPr id="125" name="连接符: 肘形 124">
+            <a:extLst>
+              <a:ext uri="{FF2B5EF4-FFF2-40B4-BE49-F238E27FC236}">
+                <a16:creationId xmlns:a16="http://schemas.microsoft.com/office/drawing/2014/main" id="{E00113F9-89B9-4BB1-9AB1-D02D18E1E2BE}"/>
+              </a:ext>
+            </a:extLst>
+          </p:cNvPr>
+          <p:cNvCxnSpPr>
+            <a:stCxn id="81" idx="1"/>
+            <a:endCxn id="205" idx="3"/>
+          </p:cNvCxnSpPr>
+          <p:nvPr/>
+        </p:nvCxnSpPr>
+        <p:spPr>
+          <a:xfrm rot="10800000">
+            <a:off x="6268951" y="142875"/>
+            <a:ext cx="1474156" cy="12700"/>
+          </a:xfrm>
+          <a:prstGeom prst="bentConnector3">
+            <a:avLst/>
+          </a:prstGeom>
+          <a:ln>
+            <a:prstDash val="dash"/>
+          </a:ln>
+        </p:spPr>
+        <p:style>
+          <a:lnRef idx="1">
+            <a:schemeClr val="accent1"/>
+          </a:lnRef>
+          <a:fillRef idx="0">
+            <a:schemeClr val="accent1"/>
+          </a:fillRef>
+          <a:effectRef idx="0">
+            <a:schemeClr val="accent1"/>
+          </a:effectRef>
+          <a:fontRef idx="minor">
+            <a:schemeClr val="tx1"/>
+          </a:fontRef>
+        </p:style>
+      </p:cxnSp>
+      <p:sp>
+        <p:nvSpPr>
+          <p:cNvPr id="212" name="矩形 211">
+            <a:extLst>
+              <a:ext uri="{FF2B5EF4-FFF2-40B4-BE49-F238E27FC236}">
+                <a16:creationId xmlns:a16="http://schemas.microsoft.com/office/drawing/2014/main" id="{5E183C4F-F051-437B-B6D4-757FFACE251A}"/>
+              </a:ext>
+            </a:extLst>
+          </p:cNvPr>
+          <p:cNvSpPr/>
+          <p:nvPr/>
+        </p:nvSpPr>
+        <p:spPr>
+          <a:xfrm>
+            <a:off x="3742547" y="1286636"/>
+            <a:ext cx="1341736" cy="285750"/>
+          </a:xfrm>
+          <a:prstGeom prst="rect">
+            <a:avLst/>
+          </a:prstGeom>
+          <a:solidFill>
+            <a:srgbClr val="C00000"/>
+          </a:solidFill>
+        </p:spPr>
+        <p:style>
+          <a:lnRef idx="2">
+            <a:schemeClr val="accent1">
+              <a:shade val="50000"/>
+            </a:schemeClr>
+          </a:lnRef>
+          <a:fillRef idx="1">
+            <a:schemeClr val="accent1"/>
+          </a:fillRef>
+          <a:effectRef idx="0">
+            <a:schemeClr val="accent1"/>
+          </a:effectRef>
+          <a:fontRef idx="minor">
+            <a:schemeClr val="lt1"/>
+          </a:fontRef>
+        </p:style>
+        <p:txBody>
+          <a:bodyPr rtlCol="0" anchor="ctr"/>
+          <a:lstStyle/>
+          <a:p>
+            <a:pPr algn="ctr"/>
+            <a:r>
+              <a:rPr lang="zh-CN" altLang="en-US" sz="1000" dirty="0"/>
+              <a:t>双方进行身份验证</a:t>
+            </a:r>
+          </a:p>
+        </p:txBody>
+      </p:sp>
+      <p:sp>
+        <p:nvSpPr>
+          <p:cNvPr id="215" name="矩形 214">
+            <a:extLst>
+              <a:ext uri="{FF2B5EF4-FFF2-40B4-BE49-F238E27FC236}">
+                <a16:creationId xmlns:a16="http://schemas.microsoft.com/office/drawing/2014/main" id="{F539E8D8-081E-432D-872F-17A975186228}"/>
+              </a:ext>
+            </a:extLst>
+          </p:cNvPr>
+          <p:cNvSpPr/>
+          <p:nvPr/>
+        </p:nvSpPr>
+        <p:spPr>
+          <a:xfrm>
+            <a:off x="9176423" y="4798490"/>
+            <a:ext cx="1187416" cy="285750"/>
+          </a:xfrm>
+          <a:prstGeom prst="rect">
+            <a:avLst/>
+          </a:prstGeom>
+          <a:solidFill>
+            <a:schemeClr val="accent6">
+              <a:lumMod val="75000"/>
+            </a:schemeClr>
+          </a:solidFill>
+        </p:spPr>
+        <p:style>
+          <a:lnRef idx="2">
+            <a:schemeClr val="accent1">
+              <a:shade val="50000"/>
+            </a:schemeClr>
+          </a:lnRef>
+          <a:fillRef idx="1">
+            <a:schemeClr val="accent1"/>
+          </a:fillRef>
+          <a:effectRef idx="0">
+            <a:schemeClr val="accent1"/>
+          </a:effectRef>
+          <a:fontRef idx="minor">
+            <a:schemeClr val="lt1"/>
+          </a:fontRef>
+        </p:style>
+        <p:txBody>
+          <a:bodyPr rtlCol="0" anchor="ctr"/>
+          <a:lstStyle/>
+          <a:p>
+            <a:pPr algn="ctr"/>
+            <a:r>
+              <a:rPr lang="zh-CN" altLang="en-US" sz="1000" dirty="0"/>
+              <a:t>连接成功</a:t>
+            </a:r>
+          </a:p>
+        </p:txBody>
+      </p:sp>
+      <p:cxnSp>
+        <p:nvCxnSpPr>
+          <p:cNvPr id="136" name="直接箭头连接符 135">
+            <a:extLst>
+              <a:ext uri="{FF2B5EF4-FFF2-40B4-BE49-F238E27FC236}">
+                <a16:creationId xmlns:a16="http://schemas.microsoft.com/office/drawing/2014/main" id="{B8DC353D-FE32-4F6E-A1A7-CD05C97380C4}"/>
+              </a:ext>
+            </a:extLst>
+          </p:cNvPr>
+          <p:cNvCxnSpPr>
+            <a:stCxn id="111" idx="2"/>
+            <a:endCxn id="215" idx="0"/>
+          </p:cNvCxnSpPr>
+          <p:nvPr/>
+        </p:nvCxnSpPr>
+        <p:spPr>
+          <a:xfrm>
+            <a:off x="9770131" y="4674093"/>
+            <a:ext cx="0" cy="124397"/>
+          </a:xfrm>
+          <a:prstGeom prst="straightConnector1">
+            <a:avLst/>
+          </a:prstGeom>
+          <a:ln>
+            <a:tailEnd type="triangle"/>
+          </a:ln>
+        </p:spPr>
+        <p:style>
+          <a:lnRef idx="1">
+            <a:schemeClr val="accent1"/>
+          </a:lnRef>
+          <a:fillRef idx="0">
+            <a:schemeClr val="accent1"/>
+          </a:fillRef>
+          <a:effectRef idx="0">
+            <a:schemeClr val="accent1"/>
+          </a:effectRef>
+          <a:fontRef idx="minor">
+            <a:schemeClr val="tx1"/>
+          </a:fontRef>
+        </p:style>
+      </p:cxnSp>
+      <p:cxnSp>
+        <p:nvCxnSpPr>
+          <p:cNvPr id="138" name="连接符: 肘形 137">
+            <a:extLst>
+              <a:ext uri="{FF2B5EF4-FFF2-40B4-BE49-F238E27FC236}">
+                <a16:creationId xmlns:a16="http://schemas.microsoft.com/office/drawing/2014/main" id="{0DD3EB07-757A-4600-B561-F36137116CC9}"/>
+              </a:ext>
+            </a:extLst>
+          </p:cNvPr>
+          <p:cNvCxnSpPr>
+            <a:stCxn id="215" idx="1"/>
+            <a:endCxn id="212" idx="3"/>
+          </p:cNvCxnSpPr>
+          <p:nvPr/>
+        </p:nvCxnSpPr>
+        <p:spPr>
+          <a:xfrm rot="10800000">
+            <a:off x="5084283" y="1429511"/>
+            <a:ext cx="4092140" cy="3511854"/>
+          </a:xfrm>
+          <a:prstGeom prst="bentConnector3">
+            <a:avLst>
+              <a:gd name="adj1" fmla="val 50000"/>
+            </a:avLst>
+          </a:prstGeom>
+          <a:ln>
+            <a:prstDash val="dash"/>
+          </a:ln>
+        </p:spPr>
+        <p:style>
+          <a:lnRef idx="1">
+            <a:schemeClr val="accent1"/>
+          </a:lnRef>
+          <a:fillRef idx="0">
+            <a:schemeClr val="accent1"/>
+          </a:fillRef>
+          <a:effectRef idx="0">
+            <a:schemeClr val="accent1"/>
+          </a:effectRef>
+          <a:fontRef idx="minor">
+            <a:schemeClr val="tx1"/>
+          </a:fontRef>
+        </p:style>
+      </p:cxnSp>
+      <p:sp>
+        <p:nvSpPr>
+          <p:cNvPr id="288" name="矩形 287">
+            <a:extLst>
+              <a:ext uri="{FF2B5EF4-FFF2-40B4-BE49-F238E27FC236}">
+                <a16:creationId xmlns:a16="http://schemas.microsoft.com/office/drawing/2014/main" id="{EB8734F5-4142-4CB1-B004-0554857CA430}"/>
+              </a:ext>
+            </a:extLst>
+          </p:cNvPr>
+          <p:cNvSpPr/>
+          <p:nvPr/>
+        </p:nvSpPr>
+        <p:spPr>
+          <a:xfrm>
+            <a:off x="1549349" y="2528326"/>
+            <a:ext cx="1088527" cy="285750"/>
+          </a:xfrm>
+          <a:prstGeom prst="rect">
+            <a:avLst/>
+          </a:prstGeom>
+        </p:spPr>
+        <p:style>
+          <a:lnRef idx="2">
+            <a:schemeClr val="accent1">
+              <a:shade val="50000"/>
+            </a:schemeClr>
+          </a:lnRef>
+          <a:fillRef idx="1">
+            <a:schemeClr val="accent1"/>
+          </a:fillRef>
+          <a:effectRef idx="0">
+            <a:schemeClr val="accent1"/>
+          </a:effectRef>
+          <a:fontRef idx="minor">
+            <a:schemeClr val="lt1"/>
+          </a:fontRef>
+        </p:style>
+        <p:txBody>
+          <a:bodyPr rtlCol="0" anchor="ctr"/>
+          <a:lstStyle/>
+          <a:p>
+            <a:pPr algn="ctr"/>
+            <a:r>
+              <a:rPr lang="zh-CN" altLang="en-US" sz="1000" dirty="0"/>
+              <a:t>连入新的</a:t>
+            </a:r>
+            <a:r>
+              <a:rPr lang="en-US" altLang="zh-CN" sz="1000" dirty="0"/>
+              <a:t>Client</a:t>
+            </a:r>
+            <a:endParaRPr lang="zh-CN" altLang="en-US" sz="1000" dirty="0"/>
+          </a:p>
+        </p:txBody>
+      </p:sp>
+      <p:cxnSp>
+        <p:nvCxnSpPr>
+          <p:cNvPr id="177" name="连接符: 肘形 176">
+            <a:extLst>
+              <a:ext uri="{FF2B5EF4-FFF2-40B4-BE49-F238E27FC236}">
+                <a16:creationId xmlns:a16="http://schemas.microsoft.com/office/drawing/2014/main" id="{67679B40-008B-44D2-81DA-7D72CDA5FAF9}"/>
+              </a:ext>
+            </a:extLst>
+          </p:cNvPr>
+          <p:cNvCxnSpPr>
+            <a:stCxn id="105" idx="2"/>
+            <a:endCxn id="288" idx="0"/>
+          </p:cNvCxnSpPr>
+          <p:nvPr/>
+        </p:nvCxnSpPr>
+        <p:spPr>
+          <a:xfrm rot="5400000">
+            <a:off x="1957463" y="2392174"/>
+            <a:ext cx="272303" cy="1"/>
+          </a:xfrm>
+          <a:prstGeom prst="bentConnector3">
+            <a:avLst/>
+          </a:prstGeom>
+          <a:ln>
+            <a:tailEnd type="triangle"/>
+          </a:ln>
+        </p:spPr>
+        <p:style>
+          <a:lnRef idx="1">
+            <a:schemeClr val="accent1"/>
+          </a:lnRef>
+          <a:fillRef idx="0">
+            <a:schemeClr val="accent1"/>
+          </a:fillRef>
+          <a:effectRef idx="0">
+            <a:schemeClr val="accent1"/>
+          </a:effectRef>
+          <a:fontRef idx="minor">
+            <a:schemeClr val="tx1"/>
+          </a:fontRef>
+        </p:style>
+      </p:cxnSp>
+      <p:sp>
+        <p:nvSpPr>
+          <p:cNvPr id="289" name="矩形 288">
+            <a:extLst>
+              <a:ext uri="{FF2B5EF4-FFF2-40B4-BE49-F238E27FC236}">
+                <a16:creationId xmlns:a16="http://schemas.microsoft.com/office/drawing/2014/main" id="{70DAE43F-AE20-4019-A276-612A0983DA5E}"/>
+              </a:ext>
+            </a:extLst>
+          </p:cNvPr>
+          <p:cNvSpPr/>
+          <p:nvPr/>
+        </p:nvSpPr>
+        <p:spPr>
+          <a:xfrm>
+            <a:off x="3225108" y="355371"/>
+            <a:ext cx="1088527" cy="285750"/>
+          </a:xfrm>
+          <a:prstGeom prst="rect">
+            <a:avLst/>
+          </a:prstGeom>
+        </p:spPr>
+        <p:style>
+          <a:lnRef idx="2">
+            <a:schemeClr val="accent1">
+              <a:shade val="50000"/>
+            </a:schemeClr>
+          </a:lnRef>
+          <a:fillRef idx="1">
+            <a:schemeClr val="accent1"/>
+          </a:fillRef>
+          <a:effectRef idx="0">
+            <a:schemeClr val="accent1"/>
+          </a:effectRef>
+          <a:fontRef idx="minor">
+            <a:schemeClr val="lt1"/>
+          </a:fontRef>
+        </p:style>
+        <p:txBody>
+          <a:bodyPr rtlCol="0" anchor="ctr"/>
+          <a:lstStyle/>
+          <a:p>
+            <a:pPr algn="ctr"/>
+            <a:r>
+              <a:rPr lang="zh-CN" altLang="en-US" sz="1000" dirty="0"/>
+              <a:t>设置工作目录</a:t>
+            </a:r>
+          </a:p>
+        </p:txBody>
+      </p:sp>
+      <p:cxnSp>
+        <p:nvCxnSpPr>
+          <p:cNvPr id="180" name="连接符: 肘形 179">
+            <a:extLst>
+              <a:ext uri="{FF2B5EF4-FFF2-40B4-BE49-F238E27FC236}">
+                <a16:creationId xmlns:a16="http://schemas.microsoft.com/office/drawing/2014/main" id="{3A4DE62B-8BAA-4CF4-A0F2-FFDF2DB607D0}"/>
+              </a:ext>
+            </a:extLst>
+          </p:cNvPr>
+          <p:cNvCxnSpPr>
+            <a:stCxn id="25" idx="3"/>
+            <a:endCxn id="289" idx="1"/>
+          </p:cNvCxnSpPr>
+          <p:nvPr/>
+        </p:nvCxnSpPr>
+        <p:spPr>
+          <a:xfrm>
+            <a:off x="2680845" y="142875"/>
+            <a:ext cx="544263" cy="355371"/>
+          </a:xfrm>
+          <a:prstGeom prst="bentConnector3">
+            <a:avLst/>
+          </a:prstGeom>
+          <a:ln>
+            <a:tailEnd type="triangle"/>
+          </a:ln>
+        </p:spPr>
+        <p:style>
+          <a:lnRef idx="1">
+            <a:schemeClr val="accent1"/>
+          </a:lnRef>
+          <a:fillRef idx="0">
+            <a:schemeClr val="accent1"/>
+          </a:fillRef>
+          <a:effectRef idx="0">
+            <a:schemeClr val="accent1"/>
+          </a:effectRef>
+          <a:fontRef idx="minor">
+            <a:schemeClr val="tx1"/>
+          </a:fontRef>
+        </p:style>
+      </p:cxnSp>
+      <p:cxnSp>
+        <p:nvCxnSpPr>
+          <p:cNvPr id="187" name="连接符: 肘形 186">
+            <a:extLst>
+              <a:ext uri="{FF2B5EF4-FFF2-40B4-BE49-F238E27FC236}">
+                <a16:creationId xmlns:a16="http://schemas.microsoft.com/office/drawing/2014/main" id="{979EC6B6-91D0-455E-B3CF-7E93CA5B3694}"/>
+              </a:ext>
+            </a:extLst>
+          </p:cNvPr>
+          <p:cNvCxnSpPr>
+            <a:stCxn id="288" idx="3"/>
+            <a:endCxn id="212" idx="1"/>
+          </p:cNvCxnSpPr>
+          <p:nvPr/>
+        </p:nvCxnSpPr>
+        <p:spPr>
+          <a:xfrm flipV="1">
+            <a:off x="2637876" y="1429511"/>
+            <a:ext cx="1104671" cy="1241690"/>
+          </a:xfrm>
+          <a:prstGeom prst="bentConnector3">
+            <a:avLst/>
+          </a:prstGeom>
+          <a:ln>
+            <a:tailEnd type="triangle"/>
+          </a:ln>
+        </p:spPr>
+        <p:style>
+          <a:lnRef idx="1">
+            <a:schemeClr val="accent1"/>
+          </a:lnRef>
+          <a:fillRef idx="0">
+            <a:schemeClr val="accent1"/>
+          </a:fillRef>
+          <a:effectRef idx="0">
+            <a:schemeClr val="accent1"/>
+          </a:effectRef>
+          <a:fontRef idx="minor">
+            <a:schemeClr val="tx1"/>
+          </a:fontRef>
+        </p:style>
+      </p:cxnSp>
+      <p:cxnSp>
+        <p:nvCxnSpPr>
+          <p:cNvPr id="191" name="直接箭头连接符 190">
+            <a:extLst>
+              <a:ext uri="{FF2B5EF4-FFF2-40B4-BE49-F238E27FC236}">
+                <a16:creationId xmlns:a16="http://schemas.microsoft.com/office/drawing/2014/main" id="{7CA002F3-2B22-42B7-8BCB-B40DD4DDD45F}"/>
+              </a:ext>
+            </a:extLst>
+          </p:cNvPr>
+          <p:cNvCxnSpPr>
+            <a:stCxn id="85" idx="3"/>
+            <a:endCxn id="205" idx="1"/>
+          </p:cNvCxnSpPr>
+          <p:nvPr/>
+        </p:nvCxnSpPr>
+        <p:spPr>
+          <a:xfrm>
+            <a:off x="4313635" y="142874"/>
+            <a:ext cx="613580" cy="1"/>
+          </a:xfrm>
+          <a:prstGeom prst="straightConnector1">
+            <a:avLst/>
+          </a:prstGeom>
+          <a:ln>
+            <a:tailEnd type="triangle"/>
+          </a:ln>
+        </p:spPr>
+        <p:style>
+          <a:lnRef idx="1">
+            <a:schemeClr val="accent1"/>
+          </a:lnRef>
+          <a:fillRef idx="0">
+            <a:schemeClr val="accent1"/>
+          </a:fillRef>
+          <a:effectRef idx="0">
+            <a:schemeClr val="accent1"/>
+          </a:effectRef>
+          <a:fontRef idx="minor">
+            <a:schemeClr val="tx1"/>
+          </a:fontRef>
+        </p:style>
+      </p:cxnSp>
+      <p:cxnSp>
+        <p:nvCxnSpPr>
+          <p:cNvPr id="296" name="直接箭头连接符 295">
+            <a:extLst>
+              <a:ext uri="{FF2B5EF4-FFF2-40B4-BE49-F238E27FC236}">
+                <a16:creationId xmlns:a16="http://schemas.microsoft.com/office/drawing/2014/main" id="{CF02F917-438D-4606-8FF3-82BB713FB62C}"/>
+              </a:ext>
+            </a:extLst>
+          </p:cNvPr>
+          <p:cNvCxnSpPr>
+            <a:stCxn id="212" idx="2"/>
+            <a:endCxn id="18" idx="0"/>
+          </p:cNvCxnSpPr>
+          <p:nvPr/>
+        </p:nvCxnSpPr>
+        <p:spPr>
+          <a:xfrm>
+            <a:off x="4413415" y="1572386"/>
+            <a:ext cx="6777" cy="291948"/>
+          </a:xfrm>
+          <a:prstGeom prst="straightConnector1">
+            <a:avLst/>
+          </a:prstGeom>
+          <a:ln>
+            <a:tailEnd type="triangle"/>
+          </a:ln>
+        </p:spPr>
+        <p:style>
+          <a:lnRef idx="1">
+            <a:schemeClr val="accent1"/>
+          </a:lnRef>
+          <a:fillRef idx="0">
+            <a:schemeClr val="accent1"/>
+          </a:fillRef>
+          <a:effectRef idx="0">
+            <a:schemeClr val="accent1"/>
+          </a:effectRef>
+          <a:fontRef idx="minor">
+            <a:schemeClr val="tx1"/>
+          </a:fontRef>
+        </p:style>
+      </p:cxnSp>
+      <p:cxnSp>
+        <p:nvCxnSpPr>
+          <p:cNvPr id="303" name="直接箭头连接符 302">
+            <a:extLst>
+              <a:ext uri="{FF2B5EF4-FFF2-40B4-BE49-F238E27FC236}">
+                <a16:creationId xmlns:a16="http://schemas.microsoft.com/office/drawing/2014/main" id="{CDB973CC-EF8A-434C-B727-C188DFDDDE99}"/>
+              </a:ext>
+            </a:extLst>
+          </p:cNvPr>
+          <p:cNvCxnSpPr>
+            <a:stCxn id="103" idx="2"/>
+            <a:endCxn id="8" idx="0"/>
+          </p:cNvCxnSpPr>
+          <p:nvPr/>
+        </p:nvCxnSpPr>
+        <p:spPr>
+          <a:xfrm>
+            <a:off x="635190" y="2214232"/>
+            <a:ext cx="7603" cy="2831262"/>
+          </a:xfrm>
+          <a:prstGeom prst="straightConnector1">
+            <a:avLst/>
+          </a:prstGeom>
+          <a:ln>
+            <a:tailEnd type="triangle"/>
+          </a:ln>
+        </p:spPr>
+        <p:style>
+          <a:lnRef idx="1">
+            <a:schemeClr val="accent1"/>
+          </a:lnRef>
+          <a:fillRef idx="0">
+            <a:schemeClr val="accent1"/>
+          </a:fillRef>
+          <a:effectRef idx="0">
+            <a:schemeClr val="accent1"/>
+          </a:effectRef>
+          <a:fontRef idx="minor">
+            <a:schemeClr val="tx1"/>
+          </a:fontRef>
+        </p:style>
+      </p:cxnSp>
+      <p:cxnSp>
+        <p:nvCxnSpPr>
+          <p:cNvPr id="305" name="直接箭头连接符 304">
+            <a:extLst>
+              <a:ext uri="{FF2B5EF4-FFF2-40B4-BE49-F238E27FC236}">
+                <a16:creationId xmlns:a16="http://schemas.microsoft.com/office/drawing/2014/main" id="{E676A6EA-A63F-483A-B697-36CD1B8318B1}"/>
+              </a:ext>
+            </a:extLst>
+          </p:cNvPr>
+          <p:cNvCxnSpPr>
+            <a:stCxn id="5" idx="3"/>
+            <a:endCxn id="12" idx="1"/>
+          </p:cNvCxnSpPr>
+          <p:nvPr/>
+        </p:nvCxnSpPr>
+        <p:spPr>
+          <a:xfrm flipV="1">
+            <a:off x="957118" y="1285654"/>
+            <a:ext cx="160437" cy="2853"/>
+          </a:xfrm>
+          <a:prstGeom prst="straightConnector1">
+            <a:avLst/>
+          </a:prstGeom>
+          <a:ln>
+            <a:tailEnd type="triangle"/>
+          </a:ln>
+        </p:spPr>
+        <p:style>
+          <a:lnRef idx="1">
+            <a:schemeClr val="accent1"/>
+          </a:lnRef>
+          <a:fillRef idx="0">
+            <a:schemeClr val="accent1"/>
+          </a:fillRef>
+          <a:effectRef idx="0">
+            <a:schemeClr val="accent1"/>
+          </a:effectRef>
+          <a:fontRef idx="minor">
+            <a:schemeClr val="tx1"/>
+          </a:fontRef>
+        </p:style>
+      </p:cxnSp>
+      <p:cxnSp>
+        <p:nvCxnSpPr>
+          <p:cNvPr id="312" name="连接符: 肘形 311">
+            <a:extLst>
+              <a:ext uri="{FF2B5EF4-FFF2-40B4-BE49-F238E27FC236}">
+                <a16:creationId xmlns:a16="http://schemas.microsoft.com/office/drawing/2014/main" id="{1FFD224C-927D-4C21-8EFC-29673AB88762}"/>
+              </a:ext>
+            </a:extLst>
+          </p:cNvPr>
+          <p:cNvCxnSpPr>
+            <a:stCxn id="12" idx="3"/>
+            <a:endCxn id="12" idx="0"/>
+          </p:cNvCxnSpPr>
+          <p:nvPr/>
+        </p:nvCxnSpPr>
+        <p:spPr>
+          <a:xfrm flipH="1" flipV="1">
+            <a:off x="1787900" y="993554"/>
+            <a:ext cx="670345" cy="292100"/>
+          </a:xfrm>
+          <a:prstGeom prst="bentConnector4">
+            <a:avLst>
+              <a:gd name="adj1" fmla="val -34102"/>
+              <a:gd name="adj2" fmla="val 178261"/>
+            </a:avLst>
+          </a:prstGeom>
+          <a:ln>
+            <a:tailEnd type="triangle"/>
+          </a:ln>
+        </p:spPr>
+        <p:style>
+          <a:lnRef idx="1">
+            <a:schemeClr val="accent1"/>
+          </a:lnRef>
+          <a:fillRef idx="0">
+            <a:schemeClr val="accent1"/>
+          </a:fillRef>
+          <a:effectRef idx="0">
+            <a:schemeClr val="accent1"/>
+          </a:effectRef>
+          <a:fontRef idx="minor">
+            <a:schemeClr val="tx1"/>
+          </a:fontRef>
+        </p:style>
+      </p:cxnSp>
+      <p:cxnSp>
+        <p:nvCxnSpPr>
+          <p:cNvPr id="331" name="连接符: 肘形 330">
+            <a:extLst>
+              <a:ext uri="{FF2B5EF4-FFF2-40B4-BE49-F238E27FC236}">
+                <a16:creationId xmlns:a16="http://schemas.microsoft.com/office/drawing/2014/main" id="{50A792B0-DD47-482B-950D-43BE7D9E71EB}"/>
+              </a:ext>
+            </a:extLst>
+          </p:cNvPr>
+          <p:cNvCxnSpPr>
+            <a:stCxn id="105" idx="3"/>
+            <a:endCxn id="105" idx="0"/>
+          </p:cNvCxnSpPr>
+          <p:nvPr/>
+        </p:nvCxnSpPr>
+        <p:spPr>
+          <a:xfrm flipH="1" flipV="1">
+            <a:off x="2093614" y="1886691"/>
+            <a:ext cx="593709" cy="184666"/>
+          </a:xfrm>
+          <a:prstGeom prst="bentConnector4">
+            <a:avLst>
+              <a:gd name="adj1" fmla="val -38504"/>
+              <a:gd name="adj2" fmla="val 223791"/>
+            </a:avLst>
+          </a:prstGeom>
+          <a:ln>
+            <a:tailEnd type="triangle"/>
+          </a:ln>
+        </p:spPr>
+        <p:style>
+          <a:lnRef idx="1">
+            <a:schemeClr val="accent1"/>
+          </a:lnRef>
+          <a:fillRef idx="0">
+            <a:schemeClr val="accent1"/>
+          </a:fillRef>
+          <a:effectRef idx="0">
+            <a:schemeClr val="accent1"/>
+          </a:effectRef>
+          <a:fontRef idx="minor">
+            <a:schemeClr val="tx1"/>
+          </a:fontRef>
+        </p:style>
+      </p:cxnSp>
+      <p:cxnSp>
+        <p:nvCxnSpPr>
+          <p:cNvPr id="342" name="连接符: 肘形 341">
+            <a:extLst>
+              <a:ext uri="{FF2B5EF4-FFF2-40B4-BE49-F238E27FC236}">
+                <a16:creationId xmlns:a16="http://schemas.microsoft.com/office/drawing/2014/main" id="{A683D93F-EC6F-42A7-AE4B-8A634633FD06}"/>
+              </a:ext>
+            </a:extLst>
+          </p:cNvPr>
+          <p:cNvCxnSpPr>
+            <a:stCxn id="57" idx="1"/>
+            <a:endCxn id="164" idx="3"/>
+          </p:cNvCxnSpPr>
+          <p:nvPr/>
+        </p:nvCxnSpPr>
+        <p:spPr>
+          <a:xfrm rot="10800000">
+            <a:off x="8831634" y="465585"/>
+            <a:ext cx="855690" cy="304769"/>
+          </a:xfrm>
+          <a:prstGeom prst="bentConnector3">
+            <a:avLst/>
+          </a:prstGeom>
+          <a:ln>
+            <a:tailEnd type="triangle"/>
+          </a:ln>
+        </p:spPr>
+        <p:style>
+          <a:lnRef idx="1">
+            <a:schemeClr val="accent1"/>
+          </a:lnRef>
+          <a:fillRef idx="0">
+            <a:schemeClr val="accent1"/>
+          </a:fillRef>
+          <a:effectRef idx="0">
+            <a:schemeClr val="accent1"/>
+          </a:effectRef>
+          <a:fontRef idx="minor">
+            <a:schemeClr val="tx1"/>
+          </a:fontRef>
+        </p:style>
+      </p:cxnSp>
+      <p:cxnSp>
+        <p:nvCxnSpPr>
+          <p:cNvPr id="344" name="连接符: 肘形 343">
+            <a:extLst>
+              <a:ext uri="{FF2B5EF4-FFF2-40B4-BE49-F238E27FC236}">
+                <a16:creationId xmlns:a16="http://schemas.microsoft.com/office/drawing/2014/main" id="{7EBE4D35-81DD-452B-B282-4CC6BFCE6FD5}"/>
+              </a:ext>
+            </a:extLst>
+          </p:cNvPr>
+          <p:cNvCxnSpPr>
+            <a:stCxn id="57" idx="1"/>
+            <a:endCxn id="197" idx="3"/>
+          </p:cNvCxnSpPr>
+          <p:nvPr/>
+        </p:nvCxnSpPr>
+        <p:spPr>
+          <a:xfrm rot="10800000" flipV="1">
+            <a:off x="8839002" y="770353"/>
+            <a:ext cx="848323" cy="91834"/>
+          </a:xfrm>
+          <a:prstGeom prst="bentConnector3">
+            <a:avLst/>
+          </a:prstGeom>
+          <a:ln>
+            <a:tailEnd type="triangle"/>
+          </a:ln>
+        </p:spPr>
+        <p:style>
+          <a:lnRef idx="1">
+            <a:schemeClr val="accent1"/>
+          </a:lnRef>
+          <a:fillRef idx="0">
+            <a:schemeClr val="accent1"/>
+          </a:fillRef>
+          <a:effectRef idx="0">
+            <a:schemeClr val="accent1"/>
+          </a:effectRef>
+          <a:fontRef idx="minor">
+            <a:schemeClr val="tx1"/>
+          </a:fontRef>
+        </p:style>
+      </p:cxnSp>
+      <p:sp>
+        <p:nvSpPr>
+          <p:cNvPr id="352" name="文本框 351">
+            <a:extLst>
+              <a:ext uri="{FF2B5EF4-FFF2-40B4-BE49-F238E27FC236}">
+                <a16:creationId xmlns:a16="http://schemas.microsoft.com/office/drawing/2014/main" id="{2687985F-D744-4A79-92DB-8EC72170CECC}"/>
+              </a:ext>
+            </a:extLst>
+          </p:cNvPr>
+          <p:cNvSpPr txBox="1"/>
+          <p:nvPr/>
+        </p:nvSpPr>
+        <p:spPr>
+          <a:xfrm>
+            <a:off x="-10517" y="6035147"/>
+            <a:ext cx="4801314" cy="369332"/>
+          </a:xfrm>
+          <a:prstGeom prst="rect">
+            <a:avLst/>
+          </a:prstGeom>
+          <a:noFill/>
+        </p:spPr>
+        <p:txBody>
+          <a:bodyPr wrap="none" rtlCol="0">
+            <a:spAutoFit/>
+          </a:bodyPr>
+          <a:lstStyle/>
+          <a:p>
+            <a:r>
+              <a:rPr lang="zh-CN" altLang="en-US" dirty="0"/>
+              <a:t>已完成：局域网自动连接、指定单个文件传输</a:t>
+            </a:r>
+          </a:p>
+        </p:txBody>
+      </p:sp>
+      <p:sp>
+        <p:nvSpPr>
+          <p:cNvPr id="353" name="文本框 352">
+            <a:extLst>
+              <a:ext uri="{FF2B5EF4-FFF2-40B4-BE49-F238E27FC236}">
+                <a16:creationId xmlns:a16="http://schemas.microsoft.com/office/drawing/2014/main" id="{C47921F5-7DB7-480F-908D-EA6EC50D4A52}"/>
+              </a:ext>
+            </a:extLst>
+          </p:cNvPr>
+          <p:cNvSpPr txBox="1"/>
+          <p:nvPr/>
+        </p:nvSpPr>
+        <p:spPr>
+          <a:xfrm>
+            <a:off x="-10517" y="6416221"/>
+            <a:ext cx="7340471" cy="369332"/>
+          </a:xfrm>
+          <a:prstGeom prst="rect">
+            <a:avLst/>
+          </a:prstGeom>
+          <a:noFill/>
+        </p:spPr>
+        <p:txBody>
+          <a:bodyPr wrap="none" rtlCol="0">
+            <a:spAutoFit/>
+          </a:bodyPr>
+          <a:lstStyle/>
+          <a:p>
+            <a:r>
+              <a:rPr lang="zh-CN" altLang="en-US" dirty="0"/>
+              <a:t>待完成：初始注册、身份验证、文件管理、、文件状态记录、自动同步</a:t>
+            </a:r>
+          </a:p>
+        </p:txBody>
+      </p:sp>
+      <p:sp>
+        <p:nvSpPr>
+          <p:cNvPr id="354" name="矩形 353">
+            <a:extLst>
+              <a:ext uri="{FF2B5EF4-FFF2-40B4-BE49-F238E27FC236}">
+                <a16:creationId xmlns:a16="http://schemas.microsoft.com/office/drawing/2014/main" id="{C194596D-5A92-4154-8CE7-0F90EA597345}"/>
+              </a:ext>
+            </a:extLst>
+          </p:cNvPr>
+          <p:cNvSpPr/>
+          <p:nvPr/>
+        </p:nvSpPr>
+        <p:spPr>
+          <a:xfrm>
+            <a:off x="4209127" y="4454263"/>
+            <a:ext cx="1341736" cy="285750"/>
+          </a:xfrm>
+          <a:prstGeom prst="rect">
+            <a:avLst/>
+          </a:prstGeom>
+          <a:solidFill>
+            <a:srgbClr val="C00000"/>
+          </a:solidFill>
+        </p:spPr>
+        <p:style>
+          <a:lnRef idx="2">
+            <a:schemeClr val="accent1">
+              <a:shade val="50000"/>
+            </a:schemeClr>
+          </a:lnRef>
+          <a:fillRef idx="1">
+            <a:schemeClr val="accent1"/>
+          </a:fillRef>
+          <a:effectRef idx="0">
+            <a:schemeClr val="accent1"/>
+          </a:effectRef>
+          <a:fontRef idx="minor">
+            <a:schemeClr val="lt1"/>
+          </a:fontRef>
+        </p:style>
+        <p:txBody>
+          <a:bodyPr rtlCol="0" anchor="ctr"/>
+          <a:lstStyle/>
+          <a:p>
+            <a:pPr algn="ctr"/>
+            <a:r>
+              <a:rPr lang="zh-CN" altLang="en-US" sz="1000" dirty="0"/>
+              <a:t>加密传输</a:t>
+            </a:r>
+          </a:p>
+        </p:txBody>
+      </p:sp>
     </p:spTree>
     <p:extLst>
       <p:ext uri="{BB962C8B-B14F-4D97-AF65-F5344CB8AC3E}">

</xml_diff>

<commit_message>
change plan a little
</commit_message>
<xml_diff>
--- a/idea.pptx
+++ b/idea.pptx
@@ -259,7 +259,7 @@
           <a:p>
             <a:fld id="{E285B31C-AA9C-4047-994F-30DECD687B70}" type="datetimeFigureOut">
               <a:rPr lang="zh-CN" altLang="en-US" smtClean="0"/>
-              <a:t>2019/11/22</a:t>
+              <a:t>2019/11/24</a:t>
             </a:fld>
             <a:endParaRPr lang="zh-CN" altLang="en-US"/>
           </a:p>
@@ -457,7 +457,7 @@
           <a:p>
             <a:fld id="{E285B31C-AA9C-4047-994F-30DECD687B70}" type="datetimeFigureOut">
               <a:rPr lang="zh-CN" altLang="en-US" smtClean="0"/>
-              <a:t>2019/11/22</a:t>
+              <a:t>2019/11/24</a:t>
             </a:fld>
             <a:endParaRPr lang="zh-CN" altLang="en-US"/>
           </a:p>
@@ -665,7 +665,7 @@
           <a:p>
             <a:fld id="{E285B31C-AA9C-4047-994F-30DECD687B70}" type="datetimeFigureOut">
               <a:rPr lang="zh-CN" altLang="en-US" smtClean="0"/>
-              <a:t>2019/11/22</a:t>
+              <a:t>2019/11/24</a:t>
             </a:fld>
             <a:endParaRPr lang="zh-CN" altLang="en-US"/>
           </a:p>
@@ -863,7 +863,7 @@
           <a:p>
             <a:fld id="{E285B31C-AA9C-4047-994F-30DECD687B70}" type="datetimeFigureOut">
               <a:rPr lang="zh-CN" altLang="en-US" smtClean="0"/>
-              <a:t>2019/11/22</a:t>
+              <a:t>2019/11/24</a:t>
             </a:fld>
             <a:endParaRPr lang="zh-CN" altLang="en-US"/>
           </a:p>
@@ -1138,7 +1138,7 @@
           <a:p>
             <a:fld id="{E285B31C-AA9C-4047-994F-30DECD687B70}" type="datetimeFigureOut">
               <a:rPr lang="zh-CN" altLang="en-US" smtClean="0"/>
-              <a:t>2019/11/22</a:t>
+              <a:t>2019/11/24</a:t>
             </a:fld>
             <a:endParaRPr lang="zh-CN" altLang="en-US"/>
           </a:p>
@@ -1403,7 +1403,7 @@
           <a:p>
             <a:fld id="{E285B31C-AA9C-4047-994F-30DECD687B70}" type="datetimeFigureOut">
               <a:rPr lang="zh-CN" altLang="en-US" smtClean="0"/>
-              <a:t>2019/11/22</a:t>
+              <a:t>2019/11/24</a:t>
             </a:fld>
             <a:endParaRPr lang="zh-CN" altLang="en-US"/>
           </a:p>
@@ -1815,7 +1815,7 @@
           <a:p>
             <a:fld id="{E285B31C-AA9C-4047-994F-30DECD687B70}" type="datetimeFigureOut">
               <a:rPr lang="zh-CN" altLang="en-US" smtClean="0"/>
-              <a:t>2019/11/22</a:t>
+              <a:t>2019/11/24</a:t>
             </a:fld>
             <a:endParaRPr lang="zh-CN" altLang="en-US"/>
           </a:p>
@@ -1956,7 +1956,7 @@
           <a:p>
             <a:fld id="{E285B31C-AA9C-4047-994F-30DECD687B70}" type="datetimeFigureOut">
               <a:rPr lang="zh-CN" altLang="en-US" smtClean="0"/>
-              <a:t>2019/11/22</a:t>
+              <a:t>2019/11/24</a:t>
             </a:fld>
             <a:endParaRPr lang="zh-CN" altLang="en-US"/>
           </a:p>
@@ -2069,7 +2069,7 @@
           <a:p>
             <a:fld id="{E285B31C-AA9C-4047-994F-30DECD687B70}" type="datetimeFigureOut">
               <a:rPr lang="zh-CN" altLang="en-US" smtClean="0"/>
-              <a:t>2019/11/22</a:t>
+              <a:t>2019/11/24</a:t>
             </a:fld>
             <a:endParaRPr lang="zh-CN" altLang="en-US"/>
           </a:p>
@@ -2380,7 +2380,7 @@
           <a:p>
             <a:fld id="{E285B31C-AA9C-4047-994F-30DECD687B70}" type="datetimeFigureOut">
               <a:rPr lang="zh-CN" altLang="en-US" smtClean="0"/>
-              <a:t>2019/11/22</a:t>
+              <a:t>2019/11/24</a:t>
             </a:fld>
             <a:endParaRPr lang="zh-CN" altLang="en-US"/>
           </a:p>
@@ -2668,7 +2668,7 @@
           <a:p>
             <a:fld id="{E285B31C-AA9C-4047-994F-30DECD687B70}" type="datetimeFigureOut">
               <a:rPr lang="zh-CN" altLang="en-US" smtClean="0"/>
-              <a:t>2019/11/22</a:t>
+              <a:t>2019/11/24</a:t>
             </a:fld>
             <a:endParaRPr lang="zh-CN" altLang="en-US"/>
           </a:p>
@@ -2909,7 +2909,7 @@
           <a:p>
             <a:fld id="{E285B31C-AA9C-4047-994F-30DECD687B70}" type="datetimeFigureOut">
               <a:rPr lang="zh-CN" altLang="en-US" smtClean="0"/>
-              <a:t>2019/11/22</a:t>
+              <a:t>2019/11/24</a:t>
             </a:fld>
             <a:endParaRPr lang="zh-CN" altLang="en-US"/>
           </a:p>
@@ -5323,15 +5323,7 @@
             <a:pPr algn="ctr"/>
             <a:r>
               <a:rPr lang="zh-CN" altLang="en-US" sz="1000" dirty="0"/>
-              <a:t>文件</a:t>
-            </a:r>
-            <a:r>
-              <a:rPr lang="en-US" altLang="zh-CN" sz="1000" dirty="0"/>
-              <a:t>x</a:t>
-            </a:r>
-            <a:r>
-              <a:rPr lang="zh-CN" altLang="en-US" sz="1000" dirty="0"/>
-              <a:t>变动</a:t>
+              <a:t>文件变动</a:t>
             </a:r>
           </a:p>
         </p:txBody>
@@ -5646,8 +5638,8 @@
         </p:nvSpPr>
         <p:spPr>
           <a:xfrm>
-            <a:off x="8867924" y="5488081"/>
-            <a:ext cx="1187419" cy="465820"/>
+            <a:off x="6135572" y="5817000"/>
+            <a:ext cx="2146531" cy="232909"/>
           </a:xfrm>
           <a:prstGeom prst="roundRect">
             <a:avLst/>
@@ -5683,9 +5675,6 @@
               <a:rPr lang="en-US" altLang="zh-CN" sz="1000" dirty="0"/>
               <a:t>Thread3: </a:t>
             </a:r>
-          </a:p>
-          <a:p>
-            <a:pPr algn="ctr"/>
             <a:r>
               <a:rPr lang="zh-CN" altLang="en-US" sz="1000" dirty="0"/>
               <a:t>监听用户请求（用户发出）</a:t>
@@ -5703,15 +5692,16 @@
             </a:extLst>
           </p:cNvPr>
           <p:cNvCxnSpPr>
+            <a:cxnSpLocks/>
             <a:stCxn id="252" idx="1"/>
             <a:endCxn id="131" idx="3"/>
           </p:cNvCxnSpPr>
           <p:nvPr/>
         </p:nvCxnSpPr>
         <p:spPr>
-          <a:xfrm rot="10800000" flipV="1">
-            <a:off x="5446304" y="5720990"/>
-            <a:ext cx="3421621" cy="1"/>
+          <a:xfrm rot="10800000">
+            <a:off x="5446304" y="5720993"/>
+            <a:ext cx="689269" cy="212463"/>
           </a:xfrm>
           <a:prstGeom prst="bentConnector3">
             <a:avLst/>
@@ -6521,7 +6511,7 @@
             <a:pPr algn="ctr"/>
             <a:r>
               <a:rPr lang="zh-CN" altLang="en-US" sz="1000" dirty="0"/>
-              <a:t>更新状态至参数文件</a:t>
+              <a:t>告知</a:t>
             </a:r>
           </a:p>
         </p:txBody>
@@ -6960,15 +6950,16 @@
             </a:extLst>
           </p:cNvPr>
           <p:cNvCxnSpPr>
-            <a:stCxn id="215" idx="1"/>
+            <a:cxnSpLocks/>
+            <a:stCxn id="96" idx="1"/>
             <a:endCxn id="212" idx="3"/>
           </p:cNvCxnSpPr>
           <p:nvPr/>
         </p:nvCxnSpPr>
         <p:spPr>
           <a:xfrm rot="10800000">
-            <a:off x="5084283" y="1429511"/>
-            <a:ext cx="4092140" cy="3511854"/>
+            <a:off x="5084284" y="1429511"/>
+            <a:ext cx="3084189" cy="3511854"/>
           </a:xfrm>
           <a:prstGeom prst="bentConnector3">
             <a:avLst>
@@ -7580,7 +7571,7 @@
         <p:spPr>
           <a:xfrm>
             <a:off x="-10517" y="6035147"/>
-            <a:ext cx="4801314" cy="369332"/>
+            <a:ext cx="6399509" cy="369332"/>
           </a:xfrm>
           <a:prstGeom prst="rect">
             <a:avLst/>
@@ -7595,7 +7586,7 @@
           <a:p>
             <a:r>
               <a:rPr lang="zh-CN" altLang="en-US" dirty="0"/>
-              <a:t>已完成：局域网自动连接、指定单个文件传输</a:t>
+              <a:t>已完成：局域网广播并自动连接、指定路径的单个文件传输</a:t>
             </a:r>
           </a:p>
         </p:txBody>
@@ -7615,7 +7606,7 @@
         <p:spPr>
           <a:xfrm>
             <a:off x="-10517" y="6416221"/>
-            <a:ext cx="7340471" cy="369332"/>
+            <a:ext cx="7108036" cy="369332"/>
           </a:xfrm>
           <a:prstGeom prst="rect">
             <a:avLst/>
@@ -7630,7 +7621,7 @@
           <a:p>
             <a:r>
               <a:rPr lang="zh-CN" altLang="en-US" dirty="0"/>
-              <a:t>待完成：初始注册、身份验证、文件管理、、文件状态记录、自动同步</a:t>
+              <a:t>待完成：初始注册、身份验证、文件变动检测、自动同步、掉线处理</a:t>
             </a:r>
           </a:p>
         </p:txBody>
@@ -7649,7 +7640,7 @@
         </p:nvSpPr>
         <p:spPr>
           <a:xfrm>
-            <a:off x="4209127" y="4454263"/>
+            <a:off x="3878336" y="4419415"/>
             <a:ext cx="1341736" cy="285750"/>
           </a:xfrm>
           <a:prstGeom prst="rect">
@@ -7687,6 +7678,473 @@
           </a:p>
         </p:txBody>
       </p:sp>
+      <p:cxnSp>
+        <p:nvCxnSpPr>
+          <p:cNvPr id="3" name="连接符: 肘形 2">
+            <a:extLst>
+              <a:ext uri="{FF2B5EF4-FFF2-40B4-BE49-F238E27FC236}">
+                <a16:creationId xmlns:a16="http://schemas.microsoft.com/office/drawing/2014/main" id="{CE283222-0668-430A-AE97-1CF500D4F76A}"/>
+              </a:ext>
+            </a:extLst>
+          </p:cNvPr>
+          <p:cNvCxnSpPr>
+            <a:stCxn id="192" idx="2"/>
+            <a:endCxn id="192" idx="1"/>
+          </p:cNvCxnSpPr>
+          <p:nvPr/>
+        </p:nvCxnSpPr>
+        <p:spPr>
+          <a:xfrm rot="5400000" flipH="1">
+            <a:off x="7638434" y="2125119"/>
+            <a:ext cx="154245" cy="705930"/>
+          </a:xfrm>
+          <a:prstGeom prst="bentConnector4">
+            <a:avLst>
+              <a:gd name="adj1" fmla="val -148206"/>
+              <a:gd name="adj2" fmla="val 132383"/>
+            </a:avLst>
+          </a:prstGeom>
+          <a:ln>
+            <a:tailEnd type="triangle"/>
+          </a:ln>
+        </p:spPr>
+        <p:style>
+          <a:lnRef idx="1">
+            <a:schemeClr val="accent1"/>
+          </a:lnRef>
+          <a:fillRef idx="0">
+            <a:schemeClr val="accent1"/>
+          </a:fillRef>
+          <a:effectRef idx="0">
+            <a:schemeClr val="accent1"/>
+          </a:effectRef>
+          <a:fontRef idx="minor">
+            <a:schemeClr val="tx1"/>
+          </a:fontRef>
+        </p:style>
+      </p:cxnSp>
+      <p:sp>
+        <p:nvSpPr>
+          <p:cNvPr id="96" name="矩形 95">
+            <a:extLst>
+              <a:ext uri="{FF2B5EF4-FFF2-40B4-BE49-F238E27FC236}">
+                <a16:creationId xmlns:a16="http://schemas.microsoft.com/office/drawing/2014/main" id="{26D7188A-2C90-46EA-9D28-9EE038AFFA0B}"/>
+              </a:ext>
+            </a:extLst>
+          </p:cNvPr>
+          <p:cNvSpPr/>
+          <p:nvPr/>
+        </p:nvSpPr>
+        <p:spPr>
+          <a:xfrm>
+            <a:off x="8168472" y="4798490"/>
+            <a:ext cx="705818" cy="285750"/>
+          </a:xfrm>
+          <a:prstGeom prst="rect">
+            <a:avLst/>
+          </a:prstGeom>
+          <a:solidFill>
+            <a:schemeClr val="accent6">
+              <a:lumMod val="75000"/>
+            </a:schemeClr>
+          </a:solidFill>
+        </p:spPr>
+        <p:style>
+          <a:lnRef idx="2">
+            <a:schemeClr val="accent1">
+              <a:shade val="50000"/>
+            </a:schemeClr>
+          </a:lnRef>
+          <a:fillRef idx="1">
+            <a:schemeClr val="accent1"/>
+          </a:fillRef>
+          <a:effectRef idx="0">
+            <a:schemeClr val="accent1"/>
+          </a:effectRef>
+          <a:fontRef idx="minor">
+            <a:schemeClr val="lt1"/>
+          </a:fontRef>
+        </p:style>
+        <p:txBody>
+          <a:bodyPr rtlCol="0" anchor="ctr"/>
+          <a:lstStyle/>
+          <a:p>
+            <a:pPr algn="ctr"/>
+            <a:r>
+              <a:rPr lang="zh-CN" altLang="en-US" sz="1000" dirty="0"/>
+              <a:t>告知身份</a:t>
+            </a:r>
+          </a:p>
+        </p:txBody>
+      </p:sp>
+      <p:cxnSp>
+        <p:nvCxnSpPr>
+          <p:cNvPr id="15" name="直接箭头连接符 14">
+            <a:extLst>
+              <a:ext uri="{FF2B5EF4-FFF2-40B4-BE49-F238E27FC236}">
+                <a16:creationId xmlns:a16="http://schemas.microsoft.com/office/drawing/2014/main" id="{6AC46351-EC32-46F4-BD1D-11F5D5B93ED6}"/>
+              </a:ext>
+            </a:extLst>
+          </p:cNvPr>
+          <p:cNvCxnSpPr>
+            <a:stCxn id="215" idx="1"/>
+            <a:endCxn id="96" idx="3"/>
+          </p:cNvCxnSpPr>
+          <p:nvPr/>
+        </p:nvCxnSpPr>
+        <p:spPr>
+          <a:xfrm flipH="1">
+            <a:off x="8874290" y="4941365"/>
+            <a:ext cx="302133" cy="0"/>
+          </a:xfrm>
+          <a:prstGeom prst="straightConnector1">
+            <a:avLst/>
+          </a:prstGeom>
+          <a:ln>
+            <a:tailEnd type="triangle"/>
+          </a:ln>
+        </p:spPr>
+        <p:style>
+          <a:lnRef idx="1">
+            <a:schemeClr val="accent1"/>
+          </a:lnRef>
+          <a:fillRef idx="0">
+            <a:schemeClr val="accent1"/>
+          </a:fillRef>
+          <a:effectRef idx="0">
+            <a:schemeClr val="accent1"/>
+          </a:effectRef>
+          <a:fontRef idx="minor">
+            <a:schemeClr val="tx1"/>
+          </a:fontRef>
+        </p:style>
+      </p:cxnSp>
+      <p:sp>
+        <p:nvSpPr>
+          <p:cNvPr id="106" name="矩形: 圆角 105">
+            <a:extLst>
+              <a:ext uri="{FF2B5EF4-FFF2-40B4-BE49-F238E27FC236}">
+                <a16:creationId xmlns:a16="http://schemas.microsoft.com/office/drawing/2014/main" id="{A537F697-44FD-4BFA-8C5A-E337453162C8}"/>
+              </a:ext>
+            </a:extLst>
+          </p:cNvPr>
+          <p:cNvSpPr/>
+          <p:nvPr/>
+        </p:nvSpPr>
+        <p:spPr>
+          <a:xfrm>
+            <a:off x="6135572" y="5037853"/>
+            <a:ext cx="1653827" cy="243175"/>
+          </a:xfrm>
+          <a:prstGeom prst="roundRect">
+            <a:avLst/>
+          </a:prstGeom>
+          <a:solidFill>
+            <a:schemeClr val="accent6">
+              <a:lumMod val="75000"/>
+            </a:schemeClr>
+          </a:solidFill>
+        </p:spPr>
+        <p:style>
+          <a:lnRef idx="2">
+            <a:schemeClr val="accent1">
+              <a:shade val="50000"/>
+            </a:schemeClr>
+          </a:lnRef>
+          <a:fillRef idx="1">
+            <a:schemeClr val="accent1"/>
+          </a:fillRef>
+          <a:effectRef idx="0">
+            <a:schemeClr val="accent1"/>
+          </a:effectRef>
+          <a:fontRef idx="minor">
+            <a:schemeClr val="lt1"/>
+          </a:fontRef>
+        </p:style>
+        <p:txBody>
+          <a:bodyPr rtlCol="0" anchor="ctr"/>
+          <a:lstStyle/>
+          <a:p>
+            <a:pPr algn="ctr"/>
+            <a:r>
+              <a:rPr lang="en-US" altLang="zh-CN" sz="1000" dirty="0"/>
+              <a:t>Thread1.2: </a:t>
+            </a:r>
+            <a:r>
+              <a:rPr lang="zh-CN" altLang="en-US" sz="1000" dirty="0"/>
+              <a:t>文件发送线程</a:t>
+            </a:r>
+          </a:p>
+        </p:txBody>
+      </p:sp>
+      <p:sp>
+        <p:nvSpPr>
+          <p:cNvPr id="108" name="矩形: 圆角 107">
+            <a:extLst>
+              <a:ext uri="{FF2B5EF4-FFF2-40B4-BE49-F238E27FC236}">
+                <a16:creationId xmlns:a16="http://schemas.microsoft.com/office/drawing/2014/main" id="{9CD51FF2-037E-4EFE-84B8-2034A1FE8C7C}"/>
+              </a:ext>
+            </a:extLst>
+          </p:cNvPr>
+          <p:cNvSpPr/>
+          <p:nvPr/>
+        </p:nvSpPr>
+        <p:spPr>
+          <a:xfrm>
+            <a:off x="6146076" y="5401279"/>
+            <a:ext cx="1653827" cy="243175"/>
+          </a:xfrm>
+          <a:prstGeom prst="roundRect">
+            <a:avLst/>
+          </a:prstGeom>
+          <a:solidFill>
+            <a:schemeClr val="accent6">
+              <a:lumMod val="75000"/>
+            </a:schemeClr>
+          </a:solidFill>
+        </p:spPr>
+        <p:style>
+          <a:lnRef idx="2">
+            <a:schemeClr val="accent1">
+              <a:shade val="50000"/>
+            </a:schemeClr>
+          </a:lnRef>
+          <a:fillRef idx="1">
+            <a:schemeClr val="accent1"/>
+          </a:fillRef>
+          <a:effectRef idx="0">
+            <a:schemeClr val="accent1"/>
+          </a:effectRef>
+          <a:fontRef idx="minor">
+            <a:schemeClr val="lt1"/>
+          </a:fontRef>
+        </p:style>
+        <p:txBody>
+          <a:bodyPr rtlCol="0" anchor="ctr"/>
+          <a:lstStyle/>
+          <a:p>
+            <a:pPr algn="ctr"/>
+            <a:r>
+              <a:rPr lang="en-US" altLang="zh-CN" sz="1000" dirty="0"/>
+              <a:t>Thread1.2: </a:t>
+            </a:r>
+            <a:r>
+              <a:rPr lang="zh-CN" altLang="en-US" sz="1000" dirty="0"/>
+              <a:t>文件接收线程</a:t>
+            </a:r>
+          </a:p>
+        </p:txBody>
+      </p:sp>
+      <p:cxnSp>
+        <p:nvCxnSpPr>
+          <p:cNvPr id="21" name="连接符: 肘形 20">
+            <a:extLst>
+              <a:ext uri="{FF2B5EF4-FFF2-40B4-BE49-F238E27FC236}">
+                <a16:creationId xmlns:a16="http://schemas.microsoft.com/office/drawing/2014/main" id="{7749AF8A-7BC5-4807-B585-FAECD2D0D81B}"/>
+              </a:ext>
+            </a:extLst>
+          </p:cNvPr>
+          <p:cNvCxnSpPr>
+            <a:stCxn id="96" idx="2"/>
+            <a:endCxn id="106" idx="3"/>
+          </p:cNvCxnSpPr>
+          <p:nvPr/>
+        </p:nvCxnSpPr>
+        <p:spPr>
+          <a:xfrm rot="5400000">
+            <a:off x="8117790" y="4755849"/>
+            <a:ext cx="75201" cy="731982"/>
+          </a:xfrm>
+          <a:prstGeom prst="bentConnector2">
+            <a:avLst/>
+          </a:prstGeom>
+          <a:ln>
+            <a:tailEnd type="triangle"/>
+          </a:ln>
+        </p:spPr>
+        <p:style>
+          <a:lnRef idx="1">
+            <a:schemeClr val="accent1"/>
+          </a:lnRef>
+          <a:fillRef idx="0">
+            <a:schemeClr val="accent1"/>
+          </a:fillRef>
+          <a:effectRef idx="0">
+            <a:schemeClr val="accent1"/>
+          </a:effectRef>
+          <a:fontRef idx="minor">
+            <a:schemeClr val="tx1"/>
+          </a:fontRef>
+        </p:style>
+      </p:cxnSp>
+      <p:cxnSp>
+        <p:nvCxnSpPr>
+          <p:cNvPr id="24" name="连接符: 肘形 23">
+            <a:extLst>
+              <a:ext uri="{FF2B5EF4-FFF2-40B4-BE49-F238E27FC236}">
+                <a16:creationId xmlns:a16="http://schemas.microsoft.com/office/drawing/2014/main" id="{377AAA20-6815-45B4-BFA3-48199DE46490}"/>
+              </a:ext>
+            </a:extLst>
+          </p:cNvPr>
+          <p:cNvCxnSpPr>
+            <a:stCxn id="96" idx="2"/>
+            <a:endCxn id="108" idx="3"/>
+          </p:cNvCxnSpPr>
+          <p:nvPr/>
+        </p:nvCxnSpPr>
+        <p:spPr>
+          <a:xfrm rot="5400000">
+            <a:off x="7941329" y="4942814"/>
+            <a:ext cx="438627" cy="721478"/>
+          </a:xfrm>
+          <a:prstGeom prst="bentConnector2">
+            <a:avLst/>
+          </a:prstGeom>
+          <a:ln>
+            <a:tailEnd type="triangle"/>
+          </a:ln>
+        </p:spPr>
+        <p:style>
+          <a:lnRef idx="1">
+            <a:schemeClr val="accent1"/>
+          </a:lnRef>
+          <a:fillRef idx="0">
+            <a:schemeClr val="accent1"/>
+          </a:fillRef>
+          <a:effectRef idx="0">
+            <a:schemeClr val="accent1"/>
+          </a:effectRef>
+          <a:fontRef idx="minor">
+            <a:schemeClr val="tx1"/>
+          </a:fontRef>
+        </p:style>
+      </p:cxnSp>
+      <p:cxnSp>
+        <p:nvCxnSpPr>
+          <p:cNvPr id="28" name="连接符: 肘形 27">
+            <a:extLst>
+              <a:ext uri="{FF2B5EF4-FFF2-40B4-BE49-F238E27FC236}">
+                <a16:creationId xmlns:a16="http://schemas.microsoft.com/office/drawing/2014/main" id="{23F5BCF7-25BF-4639-B9A8-204086010DB0}"/>
+              </a:ext>
+            </a:extLst>
+          </p:cNvPr>
+          <p:cNvCxnSpPr>
+            <a:stCxn id="188" idx="1"/>
+            <a:endCxn id="106" idx="0"/>
+          </p:cNvCxnSpPr>
+          <p:nvPr/>
+        </p:nvCxnSpPr>
+        <p:spPr>
+          <a:xfrm rot="10800000" flipV="1">
+            <a:off x="6962487" y="4317871"/>
+            <a:ext cx="692783" cy="719981"/>
+          </a:xfrm>
+          <a:prstGeom prst="bentConnector2">
+            <a:avLst/>
+          </a:prstGeom>
+          <a:ln>
+            <a:prstDash val="dash"/>
+          </a:ln>
+        </p:spPr>
+        <p:style>
+          <a:lnRef idx="1">
+            <a:schemeClr val="accent1"/>
+          </a:lnRef>
+          <a:fillRef idx="0">
+            <a:schemeClr val="accent1"/>
+          </a:fillRef>
+          <a:effectRef idx="0">
+            <a:schemeClr val="accent1"/>
+          </a:effectRef>
+          <a:fontRef idx="minor">
+            <a:schemeClr val="tx1"/>
+          </a:fontRef>
+        </p:style>
+      </p:cxnSp>
+      <p:cxnSp>
+        <p:nvCxnSpPr>
+          <p:cNvPr id="224" name="连接符: 肘形 223">
+            <a:extLst>
+              <a:ext uri="{FF2B5EF4-FFF2-40B4-BE49-F238E27FC236}">
+                <a16:creationId xmlns:a16="http://schemas.microsoft.com/office/drawing/2014/main" id="{AA4099D0-D4D0-46DF-84A0-DC33A9229F4B}"/>
+              </a:ext>
+            </a:extLst>
+          </p:cNvPr>
+          <p:cNvCxnSpPr>
+            <a:stCxn id="106" idx="1"/>
+            <a:endCxn id="131" idx="3"/>
+          </p:cNvCxnSpPr>
+          <p:nvPr/>
+        </p:nvCxnSpPr>
+        <p:spPr>
+          <a:xfrm rot="10800000" flipV="1">
+            <a:off x="5446304" y="5159440"/>
+            <a:ext cx="689269" cy="561551"/>
+          </a:xfrm>
+          <a:prstGeom prst="bentConnector3">
+            <a:avLst/>
+          </a:prstGeom>
+          <a:ln>
+            <a:tailEnd type="triangle"/>
+          </a:ln>
+        </p:spPr>
+        <p:style>
+          <a:lnRef idx="1">
+            <a:schemeClr val="accent1"/>
+          </a:lnRef>
+          <a:fillRef idx="0">
+            <a:schemeClr val="accent1"/>
+          </a:fillRef>
+          <a:effectRef idx="0">
+            <a:schemeClr val="accent1"/>
+          </a:effectRef>
+          <a:fontRef idx="minor">
+            <a:schemeClr val="tx1"/>
+          </a:fontRef>
+        </p:style>
+      </p:cxnSp>
+      <p:cxnSp>
+        <p:nvCxnSpPr>
+          <p:cNvPr id="232" name="连接符: 肘形 231">
+            <a:extLst>
+              <a:ext uri="{FF2B5EF4-FFF2-40B4-BE49-F238E27FC236}">
+                <a16:creationId xmlns:a16="http://schemas.microsoft.com/office/drawing/2014/main" id="{70C228F0-D3E9-42AA-9A68-47B0704DAD54}"/>
+              </a:ext>
+            </a:extLst>
+          </p:cNvPr>
+          <p:cNvCxnSpPr>
+            <a:stCxn id="108" idx="1"/>
+            <a:endCxn id="131" idx="3"/>
+          </p:cNvCxnSpPr>
+          <p:nvPr/>
+        </p:nvCxnSpPr>
+        <p:spPr>
+          <a:xfrm rot="10800000" flipV="1">
+            <a:off x="5446304" y="5522866"/>
+            <a:ext cx="699773" cy="198125"/>
+          </a:xfrm>
+          <a:prstGeom prst="bentConnector3">
+            <a:avLst/>
+          </a:prstGeom>
+          <a:ln>
+            <a:tailEnd type="triangle"/>
+          </a:ln>
+        </p:spPr>
+        <p:style>
+          <a:lnRef idx="1">
+            <a:schemeClr val="accent1"/>
+          </a:lnRef>
+          <a:fillRef idx="0">
+            <a:schemeClr val="accent1"/>
+          </a:fillRef>
+          <a:effectRef idx="0">
+            <a:schemeClr val="accent1"/>
+          </a:effectRef>
+          <a:fontRef idx="minor">
+            <a:schemeClr val="tx1"/>
+          </a:fontRef>
+        </p:style>
+      </p:cxnSp>
     </p:spTree>
     <p:extLst>
       <p:ext uri="{BB962C8B-B14F-4D97-AF65-F5344CB8AC3E}">

</xml_diff>

<commit_message>
finish auto uploading mutiple directories and files in the observing directory, a problem is that the thread would be killed for unkown reasons...
</commit_message>
<xml_diff>
--- a/idea.pptx
+++ b/idea.pptx
@@ -3871,7 +3871,7 @@
           <a:lstStyle/>
           <a:p>
             <a:r>
-              <a:rPr lang="zh-CN" altLang="en-US" dirty="0"/>
+              <a:rPr lang="zh-CN" altLang="en-US" b="1" dirty="0"/>
               <a:t>程序逻辑</a:t>
             </a:r>
           </a:p>
@@ -8145,6 +8145,41 @@
           </a:fontRef>
         </p:style>
       </p:cxnSp>
+      <p:sp>
+        <p:nvSpPr>
+          <p:cNvPr id="122" name="文本框 121">
+            <a:extLst>
+              <a:ext uri="{FF2B5EF4-FFF2-40B4-BE49-F238E27FC236}">
+                <a16:creationId xmlns:a16="http://schemas.microsoft.com/office/drawing/2014/main" id="{F8E2138E-57DE-4770-95A9-E761447565BB}"/>
+              </a:ext>
+            </a:extLst>
+          </p:cNvPr>
+          <p:cNvSpPr txBox="1"/>
+          <p:nvPr/>
+        </p:nvSpPr>
+        <p:spPr>
+          <a:xfrm>
+            <a:off x="7514293" y="6411494"/>
+            <a:ext cx="2587568" cy="369332"/>
+          </a:xfrm>
+          <a:prstGeom prst="rect">
+            <a:avLst/>
+          </a:prstGeom>
+          <a:noFill/>
+        </p:spPr>
+        <p:txBody>
+          <a:bodyPr wrap="none" rtlCol="0">
+            <a:spAutoFit/>
+          </a:bodyPr>
+          <a:lstStyle/>
+          <a:p>
+            <a:r>
+              <a:rPr lang="zh-CN" altLang="en-US" dirty="0"/>
+              <a:t>难点：树状文件夹结构</a:t>
+            </a:r>
+          </a:p>
+        </p:txBody>
+      </p:sp>
     </p:spTree>
     <p:extLst>
       <p:ext uri="{BB962C8B-B14F-4D97-AF65-F5344CB8AC3E}">

</xml_diff>